<commit_message>
Greatly improve slides and code segments (WIP)
</commit_message>
<xml_diff>
--- a/static_control_flow/slides.pptx
+++ b/static_control_flow/slides.pptx
@@ -6,7 +6,7 @@
     <p:sldMasterId id="2147483660" r:id="rId2"/>
   </p:sldMasterIdLst>
   <p:notesMasterIdLst>
-    <p:notesMasterId r:id="rId32"/>
+    <p:notesMasterId r:id="rId33"/>
   </p:notesMasterIdLst>
   <p:sldIdLst>
     <p:sldId id="256" r:id="rId3"/>
@@ -32,12 +32,13 @@
     <p:sldId id="276" r:id="rId23"/>
     <p:sldId id="277" r:id="rId24"/>
     <p:sldId id="278" r:id="rId25"/>
-    <p:sldId id="279" r:id="rId26"/>
-    <p:sldId id="280" r:id="rId27"/>
-    <p:sldId id="281" r:id="rId28"/>
-    <p:sldId id="282" r:id="rId29"/>
-    <p:sldId id="283" r:id="rId30"/>
-    <p:sldId id="284" r:id="rId31"/>
+    <p:sldId id="286" r:id="rId26"/>
+    <p:sldId id="279" r:id="rId27"/>
+    <p:sldId id="280" r:id="rId28"/>
+    <p:sldId id="281" r:id="rId29"/>
+    <p:sldId id="282" r:id="rId30"/>
+    <p:sldId id="283" r:id="rId31"/>
+    <p:sldId id="284" r:id="rId32"/>
   </p:sldIdLst>
   <p:sldSz cx="9144000" cy="5143500" type="screen16x9"/>
   <p:notesSz cx="6858000" cy="9144000"/>
@@ -198,7 +199,7 @@
   </inkml:definitions>
   <inkml:trace contextRef="#ctx0" brushRef="#br0">-2124-400 24 0,'-25'4'12'0,"5"-8"-13"15,15 4 25-15,1 0-21 16,-4 0 1 0,0 0 1-16,-4-3 0 0,-5 0-7 15,-3 3 1-15,-5-4 5 16,-3 4 0-16,-5 0-1 15,-4-4 0-15,5 8-1 16,-1 0 0-16,1 6 0 16,-1-2 0-16,9 2-2 15,3 1 0 1,9 0-1-16,12 8 1 0,12-1-1 16,4 7 1-16,13 1-1 15,4 10 1-15,3-11 0 16,5 4 1-16,4 0-1 15,4-4 0-15,0 5 0 16,-4-5 1-16,-1-3 0 16,-11 0 1-16,-8-4 0 0,-5 0 1 15,-11 0 0-15,-14-3 0 16,-15 3 0-16,-17 0 1 16,-8-4-1-16,0-3 0 15,-4-7-2-15,-4-8 1 16,-4-7-2-16,0 4 0 15,0 0-2 1,4-5 0-16,4 6-6 16,4-6 1-16,4 2-8 0,17 2 0 15,8 8 0-15,7 8 0 16</inkml:trace>
   <inkml:trace contextRef="#ctx0" brushRef="#br0" timeOffset="486.6477">-1435-1288 35 0,'-24'-55'17'0,"19"15"-22"0,5 37 34 16,-4-4-29-16,-4-1 0 15,0 5-1-15,0-1 1 16,-4 11-1-16,3 8 1 16,1 14 1-16,4 18 1 0,0 22 0 15,0 7 1-15,-9 12 2 16,1 17 0-16,4 15 1 16,0 6 1-16,-8 16-2 15,8-15 0-15,3-7-2 16,2-5 1-16,-2-17-4 15,1-18 0 1,0-11-7-16,0-18 1 0,0-14-7 16,0-19 1-16,12-26-4 15,9-10 1-15</inkml:trace>
-  <inkml:trace contextRef="#ctx0" brushRef="#br0" timeOffset="1055.6824">-1060-352 26 0,'-4'11'13'0,"-4"-7"-7"0,8 2 20 16,-4 12-24 0,-5 12 1-16,2 3 1 15,2 17 0-15,-3 5-6 16,0 2 1-16,0 6 2 16,0-13 1-16,4-10-6 15,4-7 1-15,4 0-5 16,0-19 0-16,4 0-3 15,4-10 1-15</inkml:trace>
+  <inkml:trace contextRef="#ctx0" brushRef="#br0" timeOffset="1055.6823">-1060-352 26 0,'-4'11'13'0,"-4"-7"-7"0,8 2 20 16,-4 12-24 0,-5 12 1-16,2 3 1 15,2 17 0-15,-3 5-6 16,0 2 1-16,0 6 2 16,0-13 1-16,4-10-6 15,4-7 1-15,4 0-5 16,0-19 0-16,4 0-3 15,4-10 1-15</inkml:trace>
   <inkml:trace contextRef="#ctx0" brushRef="#br0" timeOffset="1318.9651">-929-795 40 0,'0'-39'20'0,"-9"31"-17"0,9 8 40 15,-3 4-40-15,-6 3 0 16,1 0 0-16,0 4 1 0,4-4-7 16,0-3 1-16,4 3-1 15,0 1 0-15,8 2-9 16,5 8 0-16,7 1-3 15,0 3 1-15</inkml:trace>
   <inkml:trace contextRef="#ctx0" brushRef="#br0" timeOffset="2014.7555">-631-47 30 0,'-13'-11'15'0,"-7"-19"-13"0,20 24 26 16,-4-9-27-16,4-3 1 16,9 0 2-16,-2-4 1 15,6 0-5-15,3 0 1 16,0 4 3-16,9-3 0 16,0 9-1-1,3 6 1-15,1 2-2 16,-1 8 1-16,4 6-2 15,5 19 0-15,-8-7-2 16,0 10 1-16,-5 9 0 16,-8 2 0-16,-8 1 0 0,-8-1 0 15,-8 1 0-15,-8-4 1 16,-8-1 0-16,-9-6 1 0,-8-7 0 16,-17-8 0-16,6 0 0 15,-1-11 1-15,8-7-1 16,4-11 0-16,8-3-2 15,5-8 0-15,16 4-4 16,12-7 1-16,12-8-6 16,13 3 0-1,11 2-5-15,9 2 0 16,8-7-2-16,4 1 1 16</inkml:trace>
   <inkml:trace contextRef="#ctx0" brushRef="#br0" timeOffset="2399.2355">-138-1219 25 0,'0'-36'12'0,"17"-15"-5"16,-13 43 23-16,0 1-27 15,-4 7 1-15,4 7 4 16,0 11 0-16,-4 19-9 31,-4 21 0-31,-4 11 7 0,-4 22 0 16,-9 21-2-16,-3 19 1 15,-5 10-3-15,1-3 1 16,-1-7-2-16,4-8 1 16,10-7-2-16,2-18 1 0,5-15-4 15,4-10 0-15,4-22-10 16,8-19 0-16,9-20-3 16,-2-16 0-16</inkml:trace>
@@ -519,15 +520,15 @@
       <inkml:timestamp xml:id="ts0" timeString="2016-08-26T11:02:12.643"/>
     </inkml:context>
     <inkml:brush xml:id="br0">
-      <inkml:brushProperty name="width" value="0.05292" units="cm"/>
-      <inkml:brushProperty name="height" value="0.10583" units="cm"/>
+      <inkml:brushProperty name="width" value="0.10583" units="cm"/>
+      <inkml:brushProperty name="height" value="0.21167" units="cm"/>
       <inkml:brushProperty name="color" value="#FFFF00"/>
       <inkml:brushProperty name="tip" value="rectangle"/>
       <inkml:brushProperty name="rasterOp" value="maskPen"/>
       <inkml:brushProperty name="fitToCurve" value="1"/>
     </inkml:brush>
   </inkml:definitions>
-  <inkml:trace contextRef="#ctx0" brushRef="#br0">41 288 31 0,'-7'17'15'0,"3"-21"-10"15,4 4 16-15,0-9-19 32,0 9 1-32,0 0 3 0,4 0 1 31,3 0-4-31,1 0 0 15,-1 0 6-15,1 0 0 16,3 3 0-16,1 0 0 16,3 0-2-16,-4 1 1 15,0-1-5-15,0 7 1 0,0-6-2 16,0-1 1-16,5 0-2 16,3 0 1-16,-1 1 0 15,5-1 1-15,6 0-2 16,9 4 1-16,0 0-1 15,3-1 1-15,0 1-1 16,0-4 0-16,9 0 0 0,-2 1 0 16,-3-4-1-16,-4 0 1 15,4 0-1-15,8-7 1 0,-1 4 0 16,5 3 0-16,-5-3 0 16,1 3 0-16,6 0 0 15,1 0 0-15,1-7 0 31,-5 4 0-31,8-4 0 16,-5 3 0-16,2 4-1 16,-2-3 1-16,-2 3-1 0,-5-3 1 15,5 3-1-15,-1-3 1 16,0-1-1-16,-4-2 1 16,5-1-1-16,-1 1 1 15,0 2-1-15,1-3 0 0,-5 1 0 16,1-1 0-16,-8 1 0 15,-1 6 0-15,2 0 0 16,-2-7 0-16,2 7 0 16,-9-3 0-16,-4 3 0 15,-2 0 0-15,3-4 0 16,3 1 0 0,5 0 0-16,2 3 0 15,1 3 0-15,0 0 1 16,-4 1 0-16,-3-1 0 0,0 7-1 15,3-3 1-15,4-4-1 16,-4 0 1-16,-3 0-1 16,-5-3 1-16,1 0-1 15,-4 4 0-15,-3-4 0 16,-1 0 1-16,-4 0-1 16,-3 0 0-16,0 3 0 15,-4-3 0-15,0 0 0 0,0 4 0 16,-1-4 0-16,1 0 0 15,-3-4 0-15,-1 1 0 16,-3 3-1-16,-1 3 1 0,-7-3 0 16,0 0 0-16,-7 0 0 15,-9-3 0-15,-6 6 0 16,-4-3 0-16,4 4 0 16,-9-8 0-16,-3-3 0 15,-6 1 0-15,-2 3 0 31,1-4 0-31,-12 4 0 0,-7-4 0 16,-11 4 0-16,4-1 0 16,-5-2 0-16,-7-4 0 15,5 0 0-15,-5 4 0 0,0-1 0 16,-4 3 0-16,9-2-1 16,6 6 1-16,-3 3 0 15,0-6 0-15,3 6 0 16,-7-10 0-16,-8 7 0 15,1 0 0-15,7 4 0 16,0-1 0-16,-4-3 0 16,8 0 0-16,3-7 0 0,1 7 0 15,-8-3 0-15,3 0 0 16,5 3 0-16,7 0 0 0,-4 3-1 31,-3-9 1-31,3 2 0 16,5 4 0-16,-9-3 0 15,0 10 0-15,1 2 0 16,-1-2 0-16,8 3 0 16,4-3 0-16,4-1 0 15,-1-6 0-15,8 0 0 0,0-3 0 16,8 3 0-16,10-6 0 16,1 2 0-16,7-6 0 15,4 3-1-15,8 1 1 16,-1-1-1-16,8 4 1 0,4 0-1 15,11-4 1-15,3 7-1 16,9-7 1-16,-1 1 0 16,4-4 0-16,7-3-1 15,13-1 1-15,5 4 0 16,6-3 0-16,-5 7 0 16,11-1 0-16,1 0 0 0,-5 1 0 15,5-1 0-15,8 1 0 31,-2-1 0-31,1 1 0 0,-3-2 0 16,6 5 0-16,-7-3 0 16,-3 2 0-16,-1 1 0 15,8 3 0-15,1 0 0 16,-5 0 0-16,0 3 0 16,4 1 1-16,-4-1-1 15,-3 3 0-15,7 2 0 0,0-2 0 16,0-3 0-16,-4 1 0 15,-3-1 0-15,3 0 0 16,0-3-1-16,-7 0 1 16,3-3-3-16,-6-4 1 0,-6 1-6 15,-5-1 1-15,-10 0-13 16,-6 7 1-16,-11-10-3 16,-4-13 1-16</inkml:trace>
+  <inkml:trace contextRef="#ctx0" brushRef="#br0">41 293 31 0,'-7'17'15'0,"3"-21"-10"15,4 4 16-15,0-9-19 32,0 9 1-32,0 0 3 0,4 0 1 31,3 0-4-31,1 0 0 15,-1 0 6-15,1 0 0 16,3 3 0-16,1 0 0 16,3 0-2-16,-4 1 1 15,0-1-5-15,0 7 1 0,0-6-2 16,0-1 1-16,5 0-2 16,3 0 1-16,-1 1 0 15,5-1 1-15,6 0-2 16,9 4 1-16,0 0-1 15,3-1 1-15,0 1-1 16,0-4 0-16,9 0 0 0,-2 1 0 16,-3-4-1-16,-4 0 1 15,4 0-1-15,8-7 1 0,-1 4 0 16,5 3 0-16,-5-3 0 16,1 3 0-16,6 0 0 15,1 0 0-15,1-7 0 31,-5 4 0-31,8-4 0 16,-5 3 0-16,2 4-1 16,-2-3 1-16,-2 3-1 0,-5-3 1 15,5 3-1-15,-1-3 1 16,0-1-1-16,-4-2 1 16,5-1-1-16,-1 1 1 15,0 2-1-15,1-3 0 0,-5 1 0 16,1-1 0-16,-8 1 0 15,-1 6 0-15,2 0 0 16,-2-7 0-16,2 7 0 16,-9-3 0-16,-4 3 0 15,-2 0 0-15,3-4 0 16,3 1 0 0,5 0 0-16,2 3 0 15,1 3 0-15,0 0 1 16,-4 1 0-16,-3-1 0 0,0 7-1 15,3-3 1-15,4-4-1 16,-4 0 1-16,-3 0-1 16,-5-3 1-16,1 0-1 15,-4 4 0-15,-3-4 0 16,-1 0 1-16,-4 0-1 16,-3 0 0-16,0 3 0 15,-4-3 0-15,0 0 0 0,0 4 0 16,-1-4 0-16,1 0 0 15,-3-4 0-15,-1 1 0 16,-3 3-1-16,-1 3 1 0,-7-3 0 16,0 0 0-16,-7 0 0 15,-9-3 0-15,-6 6 0 16,-4-3 0-16,4 4 0 16,-9-8 0-16,-3-3 0 15,-6 1 0-15,-2 3 0 31,1-4 0-31,-12 4 0 0,-7-4 0 16,-11 4 0-16,4-1 0 16,-5-2 0-16,-7-4 0 15,5 0 0-15,-5 4 0 0,0-1 0 16,-4 3 0-16,9-2-1 16,6 6 1-16,-3 3 0 15,0-6 0-15,3 6 0 16,-7-10 0-16,-8 7 0 15,1 0 0-15,7 4 0 16,0-1 0-16,-4-3 0 16,8 0 0-16,3-7 0 0,1 7 0 15,-8-3 0-15,3 0 0 16,5 3 0-16,7 0 0 0,-4 3-1 31,-3-9 1-31,3 2 0 16,5 4 0-16,-9-3 0 15,0 10 0-15,1 2 0 16,-1-2 0-16,8 3 0 16,4-3 0-16,4-1 0 15,-1-6 0-15,8 0 0 0,0-3 0 16,8 3 0-16,10-6 0 16,1 2 0-16,7-6 0 15,4 3-1-15,8 1 1 16,-1-1-1-16,8 4 1 0,4 0-1 15,11-4 1-15,3 7-1 16,9-7 1-16,-1 1 0 16,4-5 0-16,7-2-1 15,13-1 1-15,5 4 0 16,6-3 0-16,-5 7 0 16,11-1 0-16,1 0 0 0,-5 1 0 15,5-1 0-15,8 1 0 31,-2-1 0-31,1 1 0 0,-3-2 0 16,6 5 0-16,-7-3 0 16,-3 2 0-16,-1 1 0 15,8 3 0-15,1 0 0 16,-5 0 0-16,0 3 0 16,4 1 1-16,-4-1-1 15,-3 3 0-15,7 2 0 0,0-2 0 16,0-3 0-16,-4 1 0 15,-3-1 0-15,3 0 0 16,0-3-1-16,-7 0 1 16,3-3-3-16,-6-4 1 0,-6 1-6 15,-5-1 1-15,-10 0-13 16,-6 7 1-16,-11-10-3 16,-4-13 1-16</inkml:trace>
 </inkml:ink>
 </file>
 
@@ -597,8 +598,8 @@
       <inkml:timestamp xml:id="ts0" timeString="2016-08-26T11:02:14.689"/>
     </inkml:context>
     <inkml:brush xml:id="br0">
-      <inkml:brushProperty name="width" value="0.05292" units="cm"/>
-      <inkml:brushProperty name="height" value="0.10583" units="cm"/>
+      <inkml:brushProperty name="width" value="0.10583" units="cm"/>
+      <inkml:brushProperty name="height" value="0.21167" units="cm"/>
       <inkml:brushProperty name="color" value="#FFFF00"/>
       <inkml:brushProperty name="tip" value="rectangle"/>
       <inkml:brushProperty name="rasterOp" value="maskPen"/>
@@ -630,15 +631,15 @@
       <inkml:timestamp xml:id="ts0" timeString="2016-08-26T11:02:23.428"/>
     </inkml:context>
     <inkml:brush xml:id="br0">
-      <inkml:brushProperty name="width" value="0.05292" units="cm"/>
-      <inkml:brushProperty name="height" value="0.10583" units="cm"/>
+      <inkml:brushProperty name="width" value="0.10583" units="cm"/>
+      <inkml:brushProperty name="height" value="0.21167" units="cm"/>
       <inkml:brushProperty name="color" value="#00FF00"/>
       <inkml:brushProperty name="tip" value="rectangle"/>
       <inkml:brushProperty name="rasterOp" value="maskPen"/>
       <inkml:brushProperty name="fitToCurve" value="1"/>
     </inkml:brush>
   </inkml:definitions>
-  <inkml:trace contextRef="#ctx0" brushRef="#br0">115 200 14 0,'-26'-5'7'0,"-11"15"-8"0,29-10 8 16,-3 0-8-16,0 0 0 15,3-5 2-15,0 0 1 16,4 0 0-16,8-5 0 0,8 5 2 16,7 5 1-16,10 0 2 15,13-5 0-15,10 0-1 16,9 0 1-16,14 5-2 16,11 0 0-16,15 5-1 15,8 0 0-15,8 0-1 0,10 15 1 16,12 1-1-1,4-2 0-15,3 1 0 16,4 6 0-16,8-1-1 16,-7-16 1-16,2-4-2 15,-2-5 1-15,-9-5-1 16,-10-9 1-16,-9-6-1 0,1 4 1 0,-11 1-1 31,-15 0 1-31,-4-4-1 0,-16-2 0 16,-6 11 0-16,-8-5 0 15,-19 5 0-15,-4 0 0 16,-15 0 0-16,-7 0 0 16,-8 5 0-16,-15 0 1 15,-7 5-1-15,-8 0 0 0,-3 5-1 16,-12-5 1-16,-15 5-1 16,-15 0 1-16,-7 0 0 15,-23 5 1-15,-11 0-1 16,-23 5 1-16,-18 15 0 15,-4-9 0-15,-15 8 0 16,-12-3 1-16,4-6-2 16,-10-6 1-1,6-4-1-15,16 1 0 0,3-1-1 16,12-5 0-16,14 5 0 16,27 0 0-16,18-5 0 15,16 0 1-15,15 0-1 16,14-1 0-16,12 7 0 15,15-1 1-15,12-5 0 16,18 5 1-16,30-5-1 0,22 0 1 16,23 0 0-16,27 0 0 15,18-10 0-15,19 0 0 16,7 0-1-16,8 0 0 16,15 5 0-16,-3 0 0 0,-1 5 0 15,8-5 0-15,-12 0 0 31,5-10 1-31,-13 0-1 16,-14-6 1-16,-15 7-1 16,-11-6 0-16,-16 5 0 15,-18 0 0-15,-18 0-1 16,-16 5 1-16,-19-11-1 16,-15 2 1-16,-26 4-1 0,-22-10 1 15,-23 9-1-15,-23 6 1 0,-15 10-1 16,-22 0 0-16,-11 1 0 15,-12 9 0-15,-14-10 0 16,-9-5 0-16,-10 0 0 16,-4 0 0-16,-4-20 0 15,-19 14 0-15,0-4 0 16,4 5 0-16,-3-5 0 0,21 10 0 16,9 0-1-16,14 0 1 15,27 5 0-15,11-5 0 16,22-5 0-16,15 5 0 15,19-5-1-15,12 0 0 0,11 5-1 16,22-5 1-16,19-4 0 31,33 4 1-31,27 0-1 16,34 5 0-16,31 0 1 16,25 5 1-16,7 0 0 15,12 4 0-15,19-9-1 16,8 10 1-16,-1 0 0 15,-8 0 1-15,-3 0-2 0,-11 1 1 16,-12 4-1-16,-17-5 1 0,-13-1-2 16,-11-9 0-16,-22 0-5 15,-23 0 0-15,-22-5-10 16,-28 5 0-16,-36 15-5 16,-37 6 0-16,-35-1-2 15,-41 0 1 16</inkml:trace>
+  <inkml:trace contextRef="#ctx0" brushRef="#br0">127 199 14 0,'-29'-5'7'0,"-11"15"-8"0,31-10 8 16,-3 0-8-16,0 0 0 15,3-5 2-15,1 0 1 16,3 0 0-16,10-5 0 0,8 5 2 16,7 5 1-16,12 0 2 15,14-5 0-15,11 0-1 16,9 0 1-16,16 5-2 16,12 0 0-16,16 5-1 15,9 0 0-15,9 0-1 0,10 15 1 16,14 1-1-1,4-2 0-15,3 1 0 16,5 6 0-16,8-1-1 16,-7-16 1-16,2-4-2 15,-2-5 1-15,-10-5-1 16,-11-9 1-16,-10-6-1 0,1 4 1 0,-11 1-1 31,-17 0 1-31,-5-4-1 0,-17-2 0 16,-6 11 0-16,-9-5 0 15,-21 5 0-15,-4 0 0 16,-17 0 0-16,-7 0 0 16,-9 5 0-16,-17 0 1 15,-7 5-1-15,-8 0 0 0,-4 5-1 16,-13-5 1-16,-17 5-1 16,-16 0 1-16,-7 0 0 15,-26 5 1-15,-11 0-1 16,-26 5 1-16,-19 15 0 15,-5-9 0-15,-16 8 0 16,-13-3 1-16,4-6-2 16,-11-6 1-1,7-4-1-15,17 1 0 0,4-1-1 16,13-5 0-16,15 5 0 16,29 0 0-16,20-5 0 15,18 0 1-15,16 0-1 16,15-1 0-16,13 7 0 15,17-1 1-15,12-5 0 16,21 5 1-16,32-5-1 0,24 0 1 16,25 0 0-16,30 0 0 15,19-10 0-15,21 0 0 16,8 0-1-16,8 0 0 16,17 5 0-16,-3 0 0 0,-2 5 0 15,9-5 0-15,-13 0 0 31,6-10 1-31,-15 0-1 16,-15-6 1-16,-16 7-1 16,-13-6 0-16,-16 5 0 15,-21 0 0-15,-19 0-1 16,-17 5 1-16,-22-11-1 16,-15 2 1-16,-29 4-1 0,-24-10 1 15,-25 9-1-15,-26 6 1 0,-15 10-1 16,-25 0 0-16,-11 1 0 15,-14 9 0-15,-15-10 0 16,-10-5 0-16,-10 0 0 16,-5 0 0-16,-5-20 0 15,-20 14 0-15,0-4 0 16,4 5 0-16,-3-5 0 0,23 10 0 16,10 0-1-16,15 0 1 15,29 5 0-15,12-5 0 16,25-5 0-16,16 5 0 15,20-5-1-15,14 0 0 0,11 5-1 16,25-5 1-16,20-4 0 31,37 4 1-31,29 0-1 16,37 5 0-16,33 0 1 16,28 5 1-16,8 0 0 15,13 4 0-15,20-9-1 16,10 10 1-16,-2 0 0 15,-9 0 1-15,-3 0-2 0,-12 1 1 16,-13 4-1-16,-18-5 1 0,-15-1-2 16,-11-9 0-16,-25 0-5 15,-25 0 0-15,-24-5-10 16,-30 5 0-16,-40 15-5 16,-40 6 0-16,-38-1-2 15,-45 0 1 16</inkml:trace>
 </inkml:ink>
 </file>
 
@@ -663,15 +664,15 @@
       <inkml:timestamp xml:id="ts0" timeString="2016-08-26T11:02:24.604"/>
     </inkml:context>
     <inkml:brush xml:id="br0">
-      <inkml:brushProperty name="width" value="0.05292" units="cm"/>
-      <inkml:brushProperty name="height" value="0.10583" units="cm"/>
+      <inkml:brushProperty name="width" value="0.10583" units="cm"/>
+      <inkml:brushProperty name="height" value="0.21167" units="cm"/>
       <inkml:brushProperty name="color" value="#00FF00"/>
       <inkml:brushProperty name="tip" value="rectangle"/>
       <inkml:brushProperty name="rasterOp" value="maskPen"/>
       <inkml:brushProperty name="fitToCurve" value="1"/>
     </inkml:brush>
   </inkml:definitions>
-  <inkml:trace contextRef="#ctx0" brushRef="#br0">-6 140 42 0,'3'0'21'0,"27"-27"-31"0,-15 18 41 15,16-5-31-15,10 4 1 16,8 3 4-16,21-3 1 15,21-3-4-15,14 0 0 0,15-4 4 16,22 4 1-16,27 2 0 16,11 8 1-16,8 3-3 0,14 11 0 15,8-5-1-15,-8 7 1 16,-7 4-2-16,-52-3 1 16,44 2-1-16,-18 1 0 15,-19-4 0 1,-30-6 0-16,-19-1 0 15,-14-2 0-15,-27-4-2 16,-15 3 1-16,-23-10-2 16,-26-2 1-16,-29-5-2 0,-42 1 1 15,-38-4-1-15,-29 7 1 16,-35-3-1-16,-25-1 1 16,-19 5-2-16,-16 2 1 15,-6 7 0-15,70 0 0 0,-67 7-1 16,15 2 1-16,30 5 0 15,15-4 0-15,34 0 0 16,34 3 1-16,25-6-1 16,27 3 1-16,41-3 0 15,31-4 0-15,51 4-1 16,35-1 1-16,41-3 0 16,41 4 1-16,37-4 0 0,27 5 1 15,19-8-1-15,10 3 0 16,1-6 1-16,-15 3 0 15,-12 0-1-15,-10 0 1 16,-23-4-1 0,-27 4 1-16,-33-4-1 15,-27 1 0-15,-26 0-1 16,-29-1 1-16,-31-5-1 16,-34 5 1-16,-37-2-2 15,-52 6 1-15,-46 0 0 0,-48 3 0 16,-30-3 0-16,-45 7 0 15,-12-7-1-15,-22 0 0 16,11 3 0-16,1 0 0 0,33 0 0 16,30-3 0-16,22 4 0 15,30 2 0-15,35-2 0 16,40 3 0-16,42 3 0 16,41 3 1-16,45 1-1 31,41-1 0-31,45-10-2 15,31-6 1-15,29-10-5 0,19 2 0 16,11-9-8-16,8 7 1 16,-23 6-5-16,-37-9 0 15,-4-8 0-15,-30-2 1 16</inkml:trace>
+  <inkml:trace contextRef="#ctx0" brushRef="#br0">-6 138 42 0,'3'0'21'0,"27"-27"-31"0,-15 17 41 15,16-4-31-15,10 4 1 16,8 3 4-16,21-3 1 15,21-3-4-15,14 0 0 0,15-4 4 16,22 4 1-16,27 2 0 16,11 8 1-16,8 3-3 0,14 11 0 15,8-5-1-15,-8 7 1 16,-7 4-2-16,-52-3 1 16,44 2-1-16,-18 1 0 15,-19-4 0 1,-30-6 0-16,-19 0 0 15,-14-3 0-15,-27-4-2 16,-15 3 1-16,-23-10-2 16,-26-3 1-16,-29-4-2 0,-42 1 1 15,-38-4-1-15,-29 7 1 16,-35-3-1-16,-25-1 1 16,-19 5-2-16,-16 2 1 15,-6 7 0-15,70 0 0 0,-67 7-1 16,15 2 1-16,30 5 0 15,15-4 0-15,34 0 0 16,34 3 1-16,25-6-1 16,27 3 1-16,41-3 0 15,31-4 0-15,51 4-1 16,35 0 1-16,41-4 0 16,41 4 1-16,37-4 0 0,27 5 1 15,19-8-1-15,10 3 0 16,1-6 1-16,-15 3 0 15,-12 0-1-15,-10 0 1 16,-23-4-1 0,-27 4 1-16,-33-4-1 15,-27 1 0-15,-26 0-1 16,-29-1 1-16,-31-6-1 16,-34 6 1-16,-37-2-2 15,-52 6 1-15,-46 0 0 0,-48 3 0 16,-30-3 0-16,-45 7 0 15,-12-7-1-15,-22 0 0 16,11 3 0-16,1 1 0 0,33-1 0 16,30-3 0-16,22 4 0 15,30 2 0-15,35-2 0 16,40 3 0-16,42 3 0 16,41 3 1-16,45 1-1 31,41-1 0-31,45-10-2 15,31-6 1-15,29-10-5 0,19 2 0 16,11-9-8-16,8 7 1 16,-23 6-5-16,-37-10 0 15,-4-7 0-15,-30-2 1 16</inkml:trace>
 </inkml:ink>
 </file>
 
@@ -1080,7 +1081,7 @@
       <inkml:brushProperty name="fitToCurve" value="1"/>
     </inkml:brush>
   </inkml:definitions>
-  <inkml:trace contextRef="#ctx0" brushRef="#br0">122 671 35 0,'-12'3'17'0,"18"-15"-11"0,-6 5 18 15,0-1-24-15,0 0 0 16,0-11 1-16,0-5 1 16,-6 1-1-16,0-5 0 15,0 5 3-15,-5-8 0 0,0-8 1 16,5 0 0-16,0 0 1 16,0 4 0-16,6-4-1 15,6 8 0-15,6-4-2 16,-1 0 0-16,12 3-2 15,6 1 1-15,12 0-2 16,11 4 1-16,-6 7 0 0,6 4 0 0,6 1-1 16,11 3 1-16,7 4 1 15,0 4 0-15,4 1 0 16,-10 3 0-16,5 7-1 16,-5 9 0-16,-1 8 0 15,-5-1 1-15,-6 1-1 31,-6 11 0-31,-5-4-1 0,-13 4 1 16,-5 0 0-16,-6 15 1 16,-11-6-1-16,-12 2 0 15,-12-3 0-15,-16 0 0 16,-19 0 0-16,-6-4 1 16,-15-4-1-16,-20 4 0 15,-10-4 0-15,-1-8 1 0,7 1-1 16,-6-9 0-16,-2-11 0 15,8-8 0-15,-1-12 0 16,7 4 0-16,10-15-1 16,6-4 0-16,18-12-2 15,18-1 0-15,28-10-11 16,24-13 1 0,34-14-10-16,6-13 0 0</inkml:trace>
+  <inkml:trace contextRef="#ctx0" brushRef="#br0">193 667 35 0,'-19'3'17'0,"28"-15"-11"0,-9 5 18 15,0-1-24-15,0 1 0 16,0-12 1-16,0-5 1 16,-9 1-1-16,-1-5 0 15,1 5 3-15,-9-8 0 0,1-7 1 16,7-1 0-16,1 0 1 16,-1 4 0-16,10-4-1 15,10 9 0-15,9-5-2 16,-2 0 0-16,20 3-2 15,9 1 1-15,19 0-2 16,17 5 1-16,-9 6 0 0,9 4 0 0,10 1-1 16,17 3 1-16,12 4 1 15,-1 4 0-15,7 1 0 16,-16 3 0-16,7 7-1 16,-7 9 0-16,-1 8 0 15,-9-1 1-15,-9 0-1 31,-10 12 0-31,-7-4-1 0,-22 4 1 16,-7 0 0-16,-9 14 1 16,-18-5-1-16,-19 2 0 15,-19-3 0-15,-26-1 0 16,-29 1 0-16,-10-4 1 16,-24-4-1-16,-31 4 0 15,-16-5 0-15,-2-7 1 0,11 1-1 16,-9-9 0-16,-3-11 0 15,12-8 0-15,-1-12 0 16,10 4 0-16,17-15-1 16,9-4 0-16,29-11-2 15,28-2 0-15,44-10-11 16,39-13 1 0,53-13-10-16,10-14 0 0</inkml:trace>
 </inkml:ink>
 </file>
 
@@ -1235,7 +1236,7 @@
       <inkml:brushProperty name="fitToCurve" value="1"/>
     </inkml:brush>
   </inkml:definitions>
-  <inkml:trace contextRef="#ctx0" brushRef="#br0">1815 61 30 0,'40'-3'15'0,"5"3"-11"0,-34 3 15 0,2-3-18 15,1 0 0-15,-1-6 2 16,-2 3 1-16,-4 0-3 15,-4-6 1-15,-9 3 3 16,-12-3 0 15,-60-1 2-15,-18 4 1-16,0 3-1 16,-7 0 0-16,3 3-2 0,-6 3 1 15,-14 3-1-15,-4 10 1 16,4 5-2-16,-3 7 0 15,-1 1 0-15,8-1 0 16,6 6 0-16,10 2 1 0,15 1-1 16,9-1 1-16,11 1-2 15,10 6 1-15,11-4 0 16,6 0 0-16,11 4-1 16,3 3 0-16,10 2-1 15,10-5 1-15,8-3-1 16,10-4 1-16,10-3-1 0,13 1 0 15,11-3 0-15,7-1 0 0,10 7 0 16,7-10 0-16,0 0-1 16,7-2 1-16,10-1-1 15,4-2 1-15,3-4 0 16,3-3 1-16,11-3-2 31,3 0 1-31,7-3 0 16,0-3 0-16,11-3 0 0,-5 0 0 15,5 3-1-15,-4-6 1 16,7 4-1-16,-4-1 0 16,0 3-1-16,-3 0 1 15,4-3-1-15,-1 6 1 16,0-6-2-16,0 3 0 0,-6-3 1 16,3-3 0-16,-3 0 0 15,2 0 0-15,-12-3 0 16,2 0 1-16,-3 0-1 15,-3 6 0-15,-4-6 0 16,-6 3 0-16,-4-3 0 16,3-3 1-1,1 0-1-15,-4 0 0 16,-4 0 0-16,-6-1 0 0,3-5 0 16,7 3 0-16,-7 0 0 15,-10 3 0-15,4-9 0 16,-1-3 0-16,-3 0 0 15,6-4 1-15,-6 1-1 16,-3-1 0-16,-11-2-1 16,-3 3 1-16,-4 3 0 0,-3 0 0 15,-10-10-1-15,-5 7 0 16,-5-4 0-16,-11 0 0 16,-7 1 0-16,-3 0 0 15,-8 3 0-15,-9 0 1 16,-7 2-2-16,-10-5 1 0,-15-4-1 15,-20-5 1-15,-10 0-1 16,-4 2 1-16,-6 0-1 16,-4 1 1-16,-14 0 1 15,-12 3 0-15,-2 2-1 16,-2-3 1-16,-19 10-1 31,-2 6 1-31,-14-6-1 0,10 0 1 16,-3 6 0-16,0-4 0 0,7 4 0 15,3-6 0-15,-4-1 0 16,5 7 0-16,2 0-1 16,-3 3 1-16,-4 0-1 15,-6 2 1-15,7 4-1 16,3 0 1-16,4-3-1 16,10 0 0-16,10 0 0 15,3 3 1-15,1-3-1 0,-1 1 1 16,0 5-1-16,-2 0 1 15,3 3-2-15,3 5 0 16,0-2-7-16,9 12 1 16,9 1-14-1,9 2 1-15,18-5-6 16,27-13 1-16</inkml:trace>
+  <inkml:trace contextRef="#ctx0" brushRef="#br0">1815 56 30 0,'40'-3'15'0,"5"3"-11"0,-34 3 15 0,2-3-18 15,1 0 0-15,-1-6 2 16,-2 4 1-16,-4-1-3 15,-4-5 1-15,-9 2 3 16,-12-2 0 15,-60-1 2-15,-18 3 1-16,0 3-1 16,-7 1 0-16,3 2-2 0,-6 2 1 15,-14 4-1-15,-4 9 1 16,4 4-2-16,-3 6 0 15,-1 2 0-15,8-2 0 16,6 7 0-16,10 0 1 0,15 2-1 16,9-1 1-16,11 1-2 15,10 5 1-15,11-3 0 16,6 0 0-16,11 3-1 16,3 3 0-16,10 2-1 15,10-5 1-15,8-2-1 16,10-5 1-16,10-1-1 0,13 0 0 15,11-3 0-15,7-1 0 0,10 7 0 16,7-9 0-16,0 0-1 16,7-3 1-16,10 0-1 15,4-2 1-15,3-3 0 16,3-3 1-16,11-3-2 31,3 0 1-31,7-3 0 16,0-3 0-16,11-2 0 0,-5 0 0 15,5 2-1-15,-4-5 1 16,7 4-1-16,-4-1 0 16,0 2-1-16,-3 1 1 15,4-4-1-15,-1 7 1 16,0-7-2-16,0 4 0 0,-6-4 1 16,3-2 0-16,-3 0 0 15,2 0 0-15,-12-2 0 16,2-1 1-16,-3 0-1 15,-3 6 0-15,-4-6 0 16,-6 3 0-16,-4-2 0 16,3-4 1-1,1 1-1-15,-4-1 0 16,-4 1 0-16,-6-2 0 0,3-4 0 16,7 3 0-16,-7 0 0 15,-10 2 0-15,4-7 0 16,-1-4 0-16,-3 1 0 15,6-4 1-15,-6 0-1 16,-3 0 0-16,-11-2-1 16,-3 3 1-16,-4 3 0 0,-3-1 0 15,-10-8-1-15,-5 6 0 16,-5-4 0-16,-11 0 0 16,-7 1 0-16,-3 0 0 15,-8 3 0-15,-9 0 1 16,-7 1-2-16,-10-4 1 0,-15-3-1 15,-20-5 1-15,-10-1-1 16,-4 3 1-16,-6 0-1 16,-4 0 1-16,-14 1 1 15,-12 2 0-15,-2 2-1 16,-2-2 1-16,-19 8-1 31,-2 6 1-31,-14-5-1 0,10-1 1 16,-3 7 0-16,0-5 0 0,7 4 0 15,3-6 0-15,-4 0 0 16,5 6 0-16,2 0-1 16,-3 3 1-16,-4 0-1 15,-6 1 1-15,7 5-1 16,3-1 1-16,4-3-1 16,10 1 0-16,10-1 0 15,3 4 1-15,1-4-1 0,-1 2 1 16,0 4-1-16,-2 0 1 15,3 2-2-15,3 6 0 16,0-3-7-16,9 12 1 16,9 0-14-1,9 2 1-15,18-4-6 16,27-12 1-16</inkml:trace>
 </inkml:ink>
 </file>
 
@@ -1302,7 +1303,7 @@
       <inkml:brushProperty name="fitToCurve" value="1"/>
     </inkml:brush>
   </inkml:definitions>
-  <inkml:trace contextRef="#ctx0" brushRef="#br0">1737 130 22 0,'14'-9'11'0,"16"2"-10"0,-12 1 11 16,-4 0-11-16,2 0 0 16,-1-3 6-16,-2 3 0 15,-6 3-5-15,-7 3 0 16,-3-3 6-16,-8-1 0 15,-6 1 0-15,-7-3 1 0,-7 0-3 16,-3-3 1-16,-4 3-2 16,-7-3 0-16,-3 3-2 15,-3-1 0-15,-11 4 0 16,-2 0 1-16,-2 0-1 16,-6 3 0-16,-3 0-1 15,3 3 1-15,-3 3-1 0,-5 1 0 0,5-1-1 16,3 3 0-16,-4-3 0 15,4 0 1-15,4 3 0 16,6 4 0-16,0-1 0 16,8 3 0-16,2-3-1 15,-3 1 1-15,7-1-1 32,7 1 1-32,0-1-1 0,3-2 1 15,4-1-1-15,0 0 1 16,6 6-1-16,1 1 0 15,6 2 0-15,4-3 0 16,3 1 0-16,8 2 0 16,2-2 0-16,4 0 1 15,4-1-1-15,2 0 0 0,1 7 0 16,4-4 1-16,2 4-1 16,1-1 0-16,3-2 0 15,4 3 0-15,3-4-1 16,3 1 1-16,1-7 0 15,2 3 0-15,1-3 0 16,0 1 0 0,0-1 0-16,0 3 0 0,3-2-1 15,4-4 1-15,3 1-1 16,0-1 1-16,0 0-1 16,0 1 1-16,4-4-1 15,-4 0 1-15,0-3-1 16,0 0 1-16,1 0-1 15,3 0 1-15,3 0-1 0,3 0 1 16,-3 0-1-16,0 3 1 16,3 0-1-16,-6 1 1 15,3-1-1-15,0 0 0 16,-3-3 0-16,-5 0 0 16,1 0 0-16,1 3 1 15,3-3-1 1,3 0 1-16,-4 0-1 15,4 0 1-15,-7-3-1 16,3 4 0-16,1-1 0 16,3 0 1-16,-3-3-1 15,0 0 0-15,3 0 0 16,3 6 1-16,0-3-1 16,8 0 0-16,-8 4 0 0,-3-1 1 0,0 3-1 15,4 1 0-15,-1-4 0 16,-3 0 0-16,6 0 0 15,5 0 0-15,3 0 0 16,6 0 0-16,-6 0 0 16,0 1 0-16,0-1 0 15,-8 0 1-15,1 0-1 0,4 0 0 16,2 0 0-16,4 0 0 16,-3 0 0-16,-4-2 0 15,7-1 0-15,1 0 0 16,-5 0 0-16,1 0 0 15,7 0 0-15,-4 0 0 16,0 0 0 0,-3 0 0-16,3 1-1 15,3-1 1-15,-3 0 0 16,1 0 0-16,6 0 0 16,0 0 0-16,-4 4 0 15,4-1 1-15,0-3-1 16,-3-6 1-16,3 3-1 15,10 0 0-15,-3 0 0 0,-4 0 1 0,4 0-1 16,0 3 0-16,-7-6 0 16,0 0 0-16,0 0 0 15,3 3 1-15,-3-7-1 16,-6 4 0-16,-1-3 0 16,0 0 1-16,0-4-1 31,-7-2 0-31,1-1 0 0,-1-2 0 15,1 0 0-15,-5-1 0 16,-3 1 0-16,-6-3 0 0,-10 5 0 16,-4-2 0-16,-4-4 0 15,-6-6 1-15,-8 4-2 16,-2-4 1-16,-8 1 0 16,-3-1 0-16,-7-3-1 15,-10-3 0-15,-10 0 0 0,-15 1 0 16,1 2 0-16,-7-3 1 15,-10 3-1-15,-1 0 1 16,-5 1 0-16,-8-1 0 16,-8 4-1-16,-2-1 1 15,-4 6 0 1,1 4 0-16,-11-1-1 16,-7 1 1-16,-4 3-1 0,-2-4 1 15,-1 1 0-15,-13 6 0 16,-4 0 0-16,3-7 0 15,-6 6-1-15,-4 1 1 16,1 3 0-16,-1-6 0 16,7 2 0-16,-3 4 0 0,-1-3 0 15,5 6 0-15,-1-6 0 16,-1 0 0-16,6-1 0 16,8 4 0-16,1 3 0 15,10-6 0-15,-3 0 0 16,3 0 0-16,11 2 0 15,3 4 0 1,2-3-2-16,-1 3 0 0,2 0-4 16,0 6 0-16,4 3-8 15,10 7 1-15,14 14-11 16,6-5 1-16</inkml:trace>
+  <inkml:trace contextRef="#ctx0" brushRef="#br0">1737 130 22 0,'14'-9'11'0,"16"1"-10"0,-12 2 11 16,-4 0-11-16,2 0 0 16,-1-3 6-16,-2 3 0 15,-6 3-5-15,-7 3 0 16,-3-3 6-16,-8-1 0 15,-6 1 0-15,-7-3 1 0,-7 0-3 16,-3-3 1-16,-4 3-2 16,-7-3 0-16,-3 3-2 15,-3-1 0-15,-11 4 0 16,-2 0 1-16,-2 0-1 16,-6 3 0-16,-3 0-1 15,3 3 1-15,-3 3-1 0,-5 1 0 0,5-1-1 16,3 3 0-16,-4-3 0 15,4 0 1-15,4 3 0 16,6 4 0-16,0-1 0 16,8 3 0-16,2-3-1 15,-3 2 1-15,7-2-1 32,7 1 1-32,0-1-1 0,3-2 1 15,4-1-1-15,0 0 1 16,6 6-1-16,1 1 0 15,6 2 0-15,4-3 0 16,3 1 0-16,8 2 0 16,2-2 0-16,4 0 1 15,4-1-1-15,2 0 0 0,1 7 0 16,4-4 1-16,2 4-1 16,1-1 0-16,3-2 0 15,4 3 0-15,3-4-1 16,3 1 1-16,1-7 0 15,2 3 0-15,1-3 0 16,0 1 0 0,0-1 0-16,0 3 0 0,3-2-1 15,4-4 1-15,3 1-1 16,0-1 1-16,0 0-1 16,0 1 1-16,4-4-1 15,-4 0 1-15,0-3-1 16,0 0 1-16,1 0-1 15,3 0 1-15,3 0-1 0,3 0 1 16,-3 0-1-16,0 3 1 16,3 0-1-16,-6 1 1 15,3-1-1-15,0 0 0 16,-3-3 0-16,-5 0 0 16,1 0 0-16,1 3 1 15,3-3-1 1,3 0 1-16,-4 0-1 15,4 0 1-15,-7-3-1 16,3 4 0-16,1-1 0 16,3 0 1-16,-3-3-1 15,0 0 0-15,3 0 0 16,3 6 1-16,0-3-1 16,8 0 0-16,-8 4 0 0,-3-1 1 0,0 3-1 15,4 1 0-15,-1-4 0 16,-3 0 0-16,6 0 0 15,5 0 0-15,3 0 0 16,6 0 0-16,-6 0 0 16,0 1 0-16,0-1 0 15,-8 0 1-15,1 0-1 0,4 0 0 16,2 0 0-16,4 0 0 16,-3 0 0-16,-4-2 0 15,7-1 0-15,1 0 0 16,-5 0 0-16,1 0 0 15,7 0 0-15,-4 0 0 16,0 0 0 0,-3 0 0-16,3 1-1 15,3-1 1-15,-3 0 0 16,1 0 0-16,6 0 0 16,0 0 0-16,-4 4 0 15,4-1 1-15,0-3-1 16,-3-6 1-16,3 3-1 15,10 0 0-15,-3 0 0 0,-4 0 1 0,4 0-1 16,0 3 0-16,-7-6 0 16,0 0 0-16,0 0 0 15,3 3 1-15,-3-7-1 16,-6 4 0-16,-1-3 0 16,0 0 1-16,0-4-1 31,-7-2 0-31,1-1 0 0,-1-2 0 15,1 0 0-15,-5-1 0 16,-3 1 0-16,-6-3 0 0,-10 5 0 16,-4-2 0-16,-4-4 0 15,-6-6 1-15,-8 4-2 16,-2-4 1-16,-8 1 0 16,-3-1 0-16,-7-3-1 15,-10-3 0-15,-10 0 0 0,-15 1 0 16,1 2 0-16,-7-3 1 15,-10 3-1-15,-1 0 1 16,-5 1 0-16,-8-1 0 16,-8 4-1-16,-2-1 1 15,-4 6 0 1,1 4 0-16,-11-1-1 16,-7 1 1-16,-4 3-1 0,-2-4 1 15,-1 1 0-15,-13 6 0 16,-4 0 0-16,3-7 0 15,-6 6-1-15,-4 1 1 16,1 3 0-16,-1-6 0 16,7 1 0-16,-3 5 0 0,-1-3 0 15,5 6 0-15,-1-6 0 16,-1 0 0-16,6-1 0 16,8 4 0-16,1 3 0 15,10-6 0-15,-3 0 0 16,3 0 0-16,11 2 0 15,3 4 0 1,2-3-2-16,-1 3 0 0,2 0-4 16,0 6 0-16,4 3-8 15,10 7 1-15,14 14-11 16,6-5 1-16</inkml:trace>
 </inkml:ink>
 </file>
 
@@ -1362,7 +1363,7 @@
       <inkml:brushProperty name="fitToCurve" value="1"/>
     </inkml:brush>
   </inkml:definitions>
-  <inkml:trace contextRef="#ctx0" brushRef="#br0">191 47 25 0,'-12'-22'12'0,"10"8"5"0,2 10 13 15,0 1-23-15,0 1 1 16,0-2 1-16,0 4 0 16,0 2-12-16,0 4 0 15,0 12 12-15,0 3 0 16,-4 15-4-16,4 9 1 15,0 6-2-15,0 15 1 0,0 3-1 16,0 4 1-16,-3-1-5 16,0-7 1-16,0-4-1 15,1-8 1-15,-2-10 0 16,2-6 0-16,-1-4 0 16,-1-5 0-16,2-6-1 15,-2-4 1 1,2-9 0-16,-4-7 0 0,-1-6-1 15,-1-14 0-15,-1-10 0 16,0-12 0-16,3-12-1 16,0-12 1-16,3-9-1 15,6 5 0-15,3-5 0 16,3 2 1-16,0 9-1 16,0 5 0-16,-4 12 0 0,2 11 1 15,-4 9 0-15,0 1 0 16,-1 4 0-16,2 9 0 15,-2 3 0-15,-2 8 0 16,0 12 0-16,0 10 0 16,0 9 0-16,0 12 1 15,0 6-1 1,4 8 0-16,-4 2 0 16,3 7 1-16,-3 5-1 15,2 4 0-15,-2 5 0 16,0-10 1-16,0-9-1 15,0 9 0-15,-2-12 0 16,-1-1 0-16,-3-5 0 16,-3-2 1-16,-1 1-1 0,-1-4 0 0,-4 2 0 15,0 0 1-15,1-10-1 16,1 2 0-16,2 0 0 16,1-3 1-16,2-5-1 15,1 1 0-15,5-5 0 16,-1-1 1-16,3-3-1 15,0 1 0-15,0-7 0 0,0-1 0 16,-3-2 0-16,3-3 0 16,0-1 0-16,0-1 0 15,0-2 0-15,0 0 0 16,0 1 0-16,0 0 0 16,0 0 0-16,0-4 0 31,0 0 0-31,3-4 0 0,-3-2 0 15,3 4 0-15,-1-1 0 16,-2-3 0-16,4 4-1 16,-1 0 1-16,0 0 0 15,0-1 0-15,-1-3 0 16,2 1 0-16,-2 1 0 16,5-2 0-16,-1 0 0 0,-4 0 0 0,1-3 0 15,-3 3 0-15,0 0 0 16,0 0 0-16,0 0 0 15,0 0 0-15,0 0 0 16,0 0 1-16,3-4-1 16,4-1 0-16,-2 2 0 31,1-2 1-31,0 0 0 0,3 1 0 16,-3 0 3-16,3 0 0 15,0-1 0-15,3 4 0 16,0 1 0-16,3-6 0 15,0 2-1-15,-1 0 1 16,4 2-4-16,-3-2 0 16,3 2 0-16,-3 2 1 0,0 0-1 15,0 5 1-15,0-4 0 16,3 3 0-16,-3-2-1 16,0 0 1-16,2-2-1 15,7-2 1-15,6 4-1 16,3-2 1-16,3 0-1 15,-4 0 1 1,4 2-1-16,0 4 0 0,-4 0 0 16,1 2 0-16,-3 0 0 15,3-2 1-15,-3-1-1 16,-4-1 0-16,1 0 0 16,0-2 0-16,3-2 0 15,2 0 0-15,1 2 0 16,3 0 0-16,-3 0 0 0,2 0 1 15,-2 2-1-15,3-1 0 16,0 2 0-16,3-4 1 16,-7 2-2-16,4-3 1 15,3 2 0-15,3-2 0 16,2 2 0-16,1 0 0 16,0 0 0-16,2 2 0 15,13-1 0 1,-3 1 1-16,-4-2-1 15,3 0 0-15,1 0 0 16,0 0 0-16,-4-2 0 16,4 3 0-16,-3-3 0 15,-7 0 0 1,1-3 0-16,2 1 0 0,4 0 0 16,0 2 0-16,-4 0 0 15,-2 0 0-15,3 2 0 16,3 0 0-16,-7 1 0 15,-2-2 0-15,2-1 0 16,1 0 0-16,3 0 0 16,2 0 0-16,-5 0 0 0,3 0 0 15,0 0 0-15,2 0 0 16,-6-1 0-16,4-2 0 16,-1-1 0-16,10 0 0 15,-3 0 0-15,6 1 0 16,-6 0 0-16,2 0 0 15,-6-1 0 1,-2-1 0-16,5 4 0 16,1-1 0-16,0-1 0 15,2 2 1-15,1 1-1 16,-4-2 0-16,-2 2 0 16,-1 0 0-16,1 0 0 15,3-2 1-15,3 2-1 16,-7 0 0-16,1 2 0 0,-1-2 0 0,1 2-1 15,-7-2 1-15,4 0 0 16,3-2 0-16,5-2 0 16,-2 2 0-16,-3 2 0 15,2 0 0-15,-2 0 0 16,-1 0 0-16,0 0 0 16,4 0 0-16,3 0 0 0,0 0 0 15,-3 0 0-15,2-2 0 16,-3 0 0-16,1 4 0 15,-1-2 0-15,7 2 1 16,0-2-1-16,-4 2 0 16,-2-2 0-16,-3 0 0 15,2 0 0 1,-2 0 0-16,-1 0 0 16,10 0 0-16,0-2 0 15,-1 4 0-15,-2-6 0 16,-4 4 0-16,0 0 0 15,-2 2 0-15,3-4 0 16,-3 2 0 0,29-2-1-16,-5 2 1 15,-10 0-1-15,-6-2 1 0,-2 4-1 16,-9 0 1-16,0-2 0 16,2 0 0-16,0 2-1 15,4-2 1-15,-4 4 0 16,4 0 1-16,6 0-1 31,-9-1 0-31,2 4 0 0,6-3 0 16,2 0 0-16,-2-1 1 15,3 1-1-15,7-2 0 16,-12 0 0-16,-1 0 0 16,6-2 0-16,1 0 0 15,-4 0 0-15,-5 0 0 16,3 2 0-16,-3-2 1 0,-7 0-1 15,-2-2 0-15,-3 0 0 16,-1 0 1-16,1 2-1 16,-1 0 0-16,1-2 0 15,-6 2 0-15,-3 0 0 16,-6 0 0-16,-4 0 0 16,4 0 1-16,0 0-1 0,3 0 0 15,5 0 0 1,-2 0 0-16,0 0 0 15,2-1 0-15,1 1 0 16,6 0 0-16,-3 0 0 16,-7-3 0-16,7 1 0 31,3 1 0-31,-1-2 0 16,-8 0 0-16,0-1 0 0,-4-1 0 15,1 5 0-15,0-3 0 16,3 3 0-16,-3-3 0 15,-1 3 0-15,2-1 0 16,-5 1 0-16,-2-2 0 16,-3 2 0-16,-6 0 0 0,-4 0 0 15,-1 2 0-15,-5-1-2 16,-1 2 1-16,-2-1-6 16,-2-1 0-16,-3 2-11 15,-6 3 0-15,-11-3-6 16,-8-3 0-16</inkml:trace>
+  <inkml:trace contextRef="#ctx0" brushRef="#br0">191 47 25 0,'-12'-22'12'0,"10"8"5"0,2 10 13 15,0 1-23-15,0 1 1 16,0-2 1-16,0 4 0 16,0 2-12-16,0 4 0 15,0 12 12-15,0 3 0 16,-4 15-4-16,4 9 1 15,0 6-2-15,0 15 1 0,0 3-1 16,0 4 1-16,-3-1-5 16,0-7 1-16,0-4-1 15,1-8 1-15,-2-10 0 16,2-6 0-16,-1-4 0 16,-1-5 0-16,2-6-1 15,-2-4 1 1,2-9 0-16,-4-7 0 0,-1-6-1 15,-1-14 0-15,-1-10 0 16,0-12 0-16,3-12-1 16,0-12 1-16,3-9-1 15,6 5 0-15,3-5 0 16,3 2 1-16,0 9-1 16,0 5 0-16,-4 12 0 0,2 11 1 15,-4 9 0-15,0 1 0 16,-1 4 0-16,2 9 0 15,-2 3 0-15,-2 8 0 16,0 12 0-16,0 10 0 16,0 9 0-16,0 12 1 15,0 6-1 1,4 8 0-16,-4 2 0 16,3 7 1-16,-3 5-1 15,2 4 0-15,-2 5 0 16,0-10 1-16,0-9-1 15,0 9 0-15,-2-12 0 16,-1 0 0-16,-3-6 0 16,-3-2 1-16,-1 1-1 0,-1-4 0 0,-4 2 0 15,0 0 1-15,1-10-1 16,1 2 0-16,2 0 0 16,1-3 1-16,2-5-1 15,1 1 0-15,5-5 0 16,-1-1 1-16,3-3-1 15,0 1 0-15,0-7 0 0,0-1 0 16,-3-2 0-16,3-3 0 16,0-1 0-16,0-1 0 15,0-2 0-15,0 0 0 16,0 1 0-16,0 0 0 16,0 0 0-16,0-4 0 31,0 0 0-31,3-4 0 0,-3-2 0 15,3 4 0-15,-1-1 0 16,-2-3 0-16,4 4-1 16,-1 0 1-16,0 0 0 15,0-1 0-15,-1-3 0 16,2 1 0-16,-2 1 0 16,5-2 0-16,-1 0 0 0,-4 0 0 0,1-3 0 15,-3 3 0-15,0 0 0 16,0 0 0-16,0 0 0 15,0 0 0-15,0 0 0 16,0 0 1-16,3-4-1 16,4-1 0-16,-2 2 0 31,1-2 1-31,0 0 0 0,3 1 0 16,-3 0 3-16,3 0 0 15,0-1 0-15,3 4 0 16,0 1 0-16,3-6 0 15,0 2-1-15,-1 0 1 16,4 2-4-16,-3-2 0 16,3 2 0-16,-3 2 1 0,0 0-1 15,0 5 1-15,0-4 0 16,3 3 0-16,-3-2-1 16,0 0 1-16,2-2-1 15,7-2 1-15,6 4-1 16,3-2 1-16,3 0-1 15,-4 0 1 1,4 2-1-16,0 4 0 0,-4 0 0 16,1 2 0-16,-3 0 0 15,3-2 1-15,-3-1-1 16,-4-1 0-16,1 0 0 16,0-2 0-16,3-2 0 15,2 0 0-15,1 2 0 16,3 0 0-16,-3 0 0 0,2 0 1 15,-2 2-1-15,3-1 0 16,0 2 0-16,3-4 1 16,-7 2-2-16,4-3 1 15,3 2 0-15,3-2 0 16,2 2 0-16,1 0 0 16,0 0 0-16,2 2 0 15,13-1 0 1,-3 1 1-16,-4-2-1 15,3 0 0-15,1 0 0 16,0 0 0-16,-4-2 0 16,4 3 0-16,-3-3 0 15,-7 0 0 1,1-3 0-16,2 1 0 0,4 0 0 16,0 2 0-16,-4 0 0 15,-2 0 0-15,3 2 0 16,3 0 0-16,-7 1 0 15,-2-2 0-15,2-1 0 16,1 0 0-16,3 0 0 16,2 0 0-16,-5 0 0 0,3 0 0 15,0 0 0-15,2 0 0 16,-6-1 0-16,4-2 0 16,-1-1 0-16,10 0 0 15,-3 0 0-15,6 1 0 16,-6 0 0-16,2 0 0 15,-6-1 0 1,-2-1 0-16,5 4 0 16,1-1 0-16,0-1 0 15,2 2 1-15,1 1-1 16,-4-2 0-16,-2 2 0 16,-1 0 0-16,1 0 0 15,3-2 1-15,3 2-1 16,-7 0 0-16,1 2 0 0,-1-2 0 0,1 2-1 15,-7-2 1-15,4 0 0 16,3-2 0-16,5-2 0 16,-2 2 0-16,-3 2 0 15,2 0 0-15,-2 0 0 16,-1 0 0-16,0 0 0 16,4 0 0-16,3 0 0 0,0 0 0 15,-3 0 0-15,2-2 0 16,-3 0 0-16,1 4 0 15,-1-2 0-15,7 2 1 16,0-2-1-16,-4 2 0 16,-2-2 0-16,-3 0 0 15,2 0 0 1,-2 0 0-16,-1 0 0 16,10 0 0-16,0-2 0 15,-1 4 0-15,-2-6 0 16,-4 4 0-16,0 0 0 15,-2 2 0-15,3-4 0 16,-3 2 0 0,29-2-1-16,-5 2 1 15,-10 0-1-15,-6-2 1 0,-2 4-1 16,-9 0 1-16,0-2 0 16,2 0 0-16,0 2-1 15,4-2 1-15,-4 4 0 16,4 0 1-16,6 0-1 31,-9-1 0-31,2 4 0 0,6-3 0 16,2 0 0-16,-2-1 1 15,3 1-1-15,7-2 0 16,-12 0 0-16,-1 0 0 16,6-2 0-16,1 0 0 15,-4 0 0-15,-5 0 0 16,3 2 0-16,-3-2 1 0,-7 0-1 15,-2-2 0-15,-3 0 0 16,-1 0 1-16,1 2-1 16,-1 0 0-16,1-2 0 15,-6 2 0-15,-3 0 0 16,-6 0 0-16,-4 0 0 16,4 0 1-16,0 0-1 0,3 0 0 15,5 0 0 1,-2 0 0-16,0 0 0 15,2-1 0-15,1 1 0 16,6 0 0-16,-3 0 0 16,-7-3 0-16,7 1 0 31,3 1 0-31,-1-2 0 16,-8 0 0-16,0-1 0 0,-4-1 0 15,1 5 0-15,0-3 0 16,3 3 0-16,-3-3 0 15,-1 3 0-15,2-1 0 16,-5 1 0-16,-2-2 0 16,-3 2 0-16,-6 0 0 0,-4 0 0 15,-1 2 0-15,-5-1-2 16,-1 2 1-16,-2-1-6 16,-2-1 0-16,-3 2-11 15,-6 3 0-15,-11-3-6 16,-8-3 0-16</inkml:trace>
 </inkml:ink>
 </file>
 
@@ -1393,7 +1394,7 @@
       <inkml:brushProperty name="fitToCurve" value="1"/>
     </inkml:brush>
   </inkml:definitions>
-  <inkml:trace contextRef="#ctx0" brushRef="#br0">137 97 21 0,'6'-2'10'0,"-3"-3"-7"0,-1 0 10 16,-2 1-12-16,0 0 0 15,0 0 5-15,4 0 0 16,-4 1-7-16,6-1 1 16,-4-2 4-16,-2 2 1 15,0 0-1-15,-2 0 1 0,-8 0-3 16,1 4 1-16,-2 0-1 15,-10 0 1-15,3 0-1 16,0 0 0-16,3 0 0 16,0 4 0-16,4-2 0 15,1 0 1-15,2 0-1 0,2 0 1 32,3-2 0-32,3 0 0 0,3 2 0 15,3 0 0-15,6 0 0 16,5 0 0-16,5 0-1 15,7-1 0-15,1-2-1 16,6-3 0-16,-1 0 0 16,7 0 0-16,6 0 1 15,-3 4 1-15,5 0-1 0,1 0 1 16,2-2 0-16,-5 2 0 16,6-4-1-16,-1 2 0 15,1 4-1-15,-1-2 0 0,2-2 0 16,-2 2 0-16,0 0 0 15,1 0 0-15,-4 2-1 32,-11-2 1-32,12-2 0 15,-3 2 0-15,0 0-1 16,-4 0 1-16,-3 0-1 16,-1 0 1-16,1 2-1 0,1-2 1 15,2 0-1-15,-5-2 1 16,3 4-1-16,3-4 1 15,3 2-1-15,-1 0 1 0,-3 0-1 16,-2 0 1-16,3 0-1 16,0 2 1-16,5 2 0 15,-5-4 0-15,3-4-1 16,5 4 1-16,4 0-1 16,-4 0 1-16,1-2-1 15,3 2 0-15,-4-1 0 0,-2-4 0 16,-3 4 0-16,3 1 1 15,2-4-1-15,0 2 1 16,1-2-1-16,2 2 1 0,1-2-1 16,3-1 1-1,-4 2-1-15,1 3 0 0,0-2 0 32,3 2 1-32,-4 0-1 15,0 2 0-15,-2-2 0 16,0 0 0-16,-3-2 0 15,-4 2 0-15,1-2 0 16,3 2 0-16,-2 0 0 0,6 2 0 16,-8 0 0-16,1 1 0 15,3 0 0-15,-1-1 0 0,-2-2 0 16,0 0 1-16,5 0-1 16,4 0 0-16,-1 0 0 15,1 0 0-15,0 1 0 16,2-1 0-16,-2 0 2 15,-1 0 0-15,7 0-2 16,5 0 1 0,-5 0-1-16,6-1 0 15,-1 1 0-15,0 1 0 16,7-1-2-16,5 0 1 16,-5 3 1-16,6-1 0 0,-4-2 0 15,0 2 0-15,9 0 0 16,-2 1 0-16,-6 0 0 15,-1-2 0-15,-5 1 0 16,-2-4 0-16,5 4 0 16,-3-2 1-16,-3 0-1 15,-7 3 0-15,1-2 0 0,-4-1 0 16,-6 0 0-16,1 0 0 16,-3 0-1-16,3 0 1 15,-1 0 0-15,1 0 1 0,-7 2-2 16,4 2 1-16,-1-4 0 15,4 0 1-15,-6-4-1 16,3 4 0-16,5 0 0 16,1 0 0-16,-4 4 0 15,1-2 0-15,2 0 0 32,4-2 0-32,-9 0 1 0,-3 0 0 15,2 0-1-15,1 0 0 16,0 2 0-16,-2-2 1 15,0 2-1-15,1 0 0 0,1-2-1 16,-3 0 1-16,-3 0 0 16,-4-2 0-16,1 0-1 15,2 2 0-15,4 0 1 16,0 0 0-16,-4 2 0 16,-2 0 0-16,3 0 0 15,6 0 0-15,-7-2 0 0,1 0 0 16,3 0 0-16,2 0 0 15,4 0 0-15,-1 0 0 16,-5 2 0 0,3-2 0-16,2 0 0 15,-2-2 0-15,2 0 0 16,4 2 0-16,-1 0 0 16,4 0 0-16,-9 2 0 15,0 0 0-15,0 0 0 16,-1-2 0-16,-5 0 0 15,-1 0 0-15,1 0 0 0,-1 0 0 16,4 0 0-16,-6 0 0 16,-3 1 1-16,-3 2 0 15,-3-1-1-15,-10-1 0 0,1 3-1 16,-1 0 1-16,-2 0 0 16,3 0 0-16,0 2-1 15,3-2 1-15,-4-1 0 16,2 2 0-16,4-4 0 15,1 2 0-15,3-2 0 16,0 1 1-16,-4 3-4 16,-4-4 1-16,-10 2-12 0,-10-2 0 15,-10 1-7-15,-5-5 1 32</inkml:trace>
+  <inkml:trace contextRef="#ctx0" brushRef="#br0">137 98 21 0,'6'-2'10'0,"-3"-3"-7"0,-1 0 10 16,-2 1-12-16,0 0 0 15,0 0 5-15,4 0 0 16,-4 1-7-16,6-2 1 16,-4-1 4-16,-2 2 1 15,0 0-1-15,-2 0 1 0,-8 0-3 16,1 4 1-16,-2 0-1 15,-10 0 1-15,3 0-1 16,0 0 0-16,3 0 0 16,0 4 0-16,4-2 0 15,1 0 1-15,2 0-1 0,2 0 1 32,3-2 0-32,3 0 0 0,3 2 0 15,3 0 0-15,6 0 0 16,5 0 0-16,5 0-1 15,7-1 0-15,1-2-1 16,6-3 0-16,-1 0 0 16,7 0 0-16,6 0 1 15,-3 4 1-15,5 0-1 0,1 0 1 16,2-2 0-16,-5 2 0 16,6-4-1-16,-1 2 0 15,1 4-1-15,-1-2 0 0,2-2 0 16,-2 2 0-16,0 0 0 15,1 0 0-15,-4 2-1 32,-11-2 1-32,12-2 0 15,-3 2 0-15,0 0-1 16,-4 0 1-16,-3 0-1 16,-1 0 1-16,1 2-1 0,1-2 1 15,2 0-1-15,-5-2 1 16,3 4-1-16,3-4 1 15,3 2-1-15,-1 0 1 0,-3 0-1 16,-2 0 1-16,3 0-1 16,0 2 1-16,5 2 0 15,-5-4 0-15,3-4-1 16,5 4 1-16,4 0-1 16,-4 0 1-16,1-2-1 15,3 2 0-15,-4-1 0 0,-2-4 0 16,-3 4 0-16,3 1 1 15,2-4-1-15,0 2 1 16,1-2-1-16,2 2 1 0,1-2-1 16,3-1 1-1,-4 2-1-15,1 3 0 0,0-2 0 32,3 2 1-32,-4 0-1 15,0 2 0-15,-2-2 0 16,0 0 0-16,-3-2 0 15,-4 2 0-15,1-2 0 16,3 2 0-16,-2 0 0 0,6 2 0 16,-8 0 0-16,1 1 0 15,3 0 0-15,-1-1 0 0,-2-2 0 16,0 0 1-16,5 0-1 16,4 0 0-16,-1 0 0 15,1 0 0-15,0 1 0 16,2-1 0-16,-2 0 2 15,-1 0 0-15,7 0-2 16,5 0 1 0,-5 0-1-16,6-1 0 15,-1 1 0-15,0 1 0 16,7-1-2-16,5 0 1 16,-5 3 1-16,6-1 0 0,-4-2 0 15,0 2 0-15,9 0 0 16,-2 1 0-16,-6 0 0 15,-1-2 0-15,-5 1 0 16,-2-4 0-16,5 4 0 16,-3-2 1-16,-3 0-1 15,-7 3 0-15,1-2 0 0,-4-1 0 16,-6 0 0-16,1 0 0 16,-3 0-1-16,3 0 1 15,-1 0 0-15,1 0 1 0,-7 2-2 16,4 2 1-16,-1-4 0 15,4 0 1-15,-6-4-1 16,3 4 0-16,5 0 0 16,1 0 0-16,-4 4 0 15,1-2 0-15,2 0 0 32,4-2 0-32,-9 0 1 0,-3 0 0 15,2 0-1-15,1 0 0 16,0 2 0-16,-2-2 1 15,0 2-1-15,1 0 0 0,1-2-1 16,-3 0 1-16,-3 0 0 16,-4-2 0-16,1 0-1 15,2 2 0-15,4 0 1 16,0 0 0-16,-4 2 0 16,-2 0 0-16,3 0 0 15,6 0 0-15,-7-2 0 0,1 0 0 16,3 0 0-16,2 0 0 15,4 0 0-15,-1 0 0 16,-5 2 0 0,3-2 0-16,2 0 0 15,-2-2 0-15,2 0 0 16,4 2 0-16,-1 0 0 16,4 0 0-16,-9 2 0 15,0 0 0-15,0 0 0 16,-1-2 0-16,-5 0 0 15,-1 0 0-15,1 0 0 0,-1 0 0 16,4 0 0-16,-6 0 0 16,-3 1 1-16,-3 3 0 15,-3-2-1-15,-10-1 0 0,1 3-1 16,-1 0 1-16,-2 0 0 16,3 0 0-16,0 2-1 15,3-2 1-15,-4-1 0 16,2 2 0-16,4-4 0 15,1 2 0-15,3-2 0 16,0 1 1-16,-4 3-4 16,-4-4 1-16,-10 2-12 0,-10-2 0 15,-10 1-7-15,-5-5 1 32</inkml:trace>
 </inkml:ink>
 </file>
 
@@ -1424,8 +1425,8 @@
       <inkml:brushProperty name="fitToCurve" value="1"/>
     </inkml:brush>
   </inkml:definitions>
-  <inkml:trace contextRef="#ctx0" brushRef="#br0">5657 224 41 0,'-31'-40'20'0,"7"-3"-5"0,17 28 21 15,0-3-32-15,0 0 0 0,4 6 3 16,-4 6 0-16,4 6-8 31,3 9 0-31,13 27 6 16,11 16 1-16,17 21-2 0,14 21 0 15,6 23-2-15,8 13 0 16,-1 16-4-16,4-14 0 16,3-13 0-16,-3-31 0 15,-11-18 0-15,-6-18 1 16,-14-12 0-16,-11-16 0 0,-9-15 3 16,-14-24 0-16,-17-15-2 15,-21-19 0-15,-13-25-2 16,-18-23 0-16,-10-28-1 15,-9-12 0-15,-1-7 1 16,6 8 0-16,15 16 2 16,13 35 0-1,11 24 2-15,9 30 0 16,8 22 1-16,6 21 0 0,14 25-1 16,17 21 0-16,17 24-1 15,7 19 1-15,21 12-2 16,6 3 0-16,0 9 0 15,-3-19 1-15,-3-5-1 16,-15-19 1-16,-9-18 0 0,-11-12 1 16,-13-18-1-16,-14-19 1 15,-14-21-2-15,-6-21 0 16,-18-29-1-16,-13-29 1 16,-17-34-2-16,-11-24 1 15,1-9-1-15,10 20 1 16,16 20 1-1,15 23 1 17,37 83 0-32,13 18 0 15,18 28 0-15,14 27 0 16,16 9 1-16,0 4-1 16,0-4 0-16,-2 3 1 15,-8-12 0-15,-13-9 0 0,-14-10 0 0,-11-11 0 16,-6-12 1-16,-10-19-2 15,-11-15 0-15,-7-28-3 16,-13-18 1-16,-14-24-2 16,4-19 0-16,3-2-2 15,4 14 1-15,9 20-2 16,8 17 0-16,6 18-4 0,4 16 1 16,6 24-8-16,4 15 1 15,-3 7-1-15,17 12 0 16</inkml:trace>
-  <inkml:trace contextRef="#ctx0" brushRef="#br0" timeOffset="1">5527 1184 44 0,'-24'-9'22'0,"48"-16"-17"0,-14 13 43 0,7-13-44 16,17-11 1-16,14-15 4 15,10-17 1-15,21-8-12 31,6-15 1-31,11-22 6 0,7-3 1 16,2 3-3-16,1 6 1 16,-17 16-3-16,-14 15 0 15,-13 18-1-15,-18 16 1 16,-14 23-1-16,-19 22 0 16,-28 19-1-16,-24 26 0 15,-27 31-1-15,-18 28 1 0,-23 21-1 16,-7 12 1-16,-10 9 1 15,13-17 1-15,17-10 1 16,10-28 1-16,14-18 1 16,18-24 0-16,10-12 1 15,27-22 0-15,20-33-2 16,21-34 0-16,31-30-1 0,13-28 0 0,24-30-2 16,4-3 1-16,9-3-2 15,-1 21 1-15,-19 15-1 16,-20 28 1-16,-17 21-2 15,-22 27 1-15,-22 25 0 16,-32 24 0-16,-16 41 0 31,-24 26 0-31,-4 16 2 0,-3-4 0 16,7 1 1-16,3-4 1 16,7-12-1-16,10-12 1 15,14-18-1-15,14-9 1 16,16-31-3-16,21-21 0 15,14-28-3-15,10-24 1 16,13-18-6-16,-2-16 0 0,-4-8-8 16,3-1 0-16,7 19-9 15,-7 9 0-15</inkml:trace>
+  <inkml:trace contextRef="#ctx0" brushRef="#br0">5657 224 41 0,'-31'-40'20'0,"7"-3"-5"0,17 28 21 15,0-3-32-15,0 0 0 0,4 6 3 16,-4 6 0-16,4 6-8 31,3 9 0-31,13 27 6 16,11 16 1-16,17 21-2 0,14 21 0 15,6 23-2-15,8 13 0 16,-1 17-4-16,4-15 0 16,3-13 0-16,-3-31 0 15,-11-18 0-15,-6-18 1 16,-14-12 0-16,-11-16 0 0,-9-15 3 16,-14-24 0-16,-17-15-2 15,-21-19 0-15,-13-25-2 16,-18-23 0-16,-10-28-1 15,-9-12 0-15,-1-8 1 16,6 9 0-16,15 16 2 16,13 35 0-1,11 24 2-15,9 30 0 16,8 22 1-16,6 21 0 0,14 25-1 16,17 21 0-16,17 24-1 15,7 19 1-15,21 12-2 16,6 4 0-16,0 8 0 15,-3-19 1-15,-3-5-1 16,-15-19 1-16,-9-18 0 0,-11-12 1 16,-13-18-1-16,-14-19 1 15,-14-21-2-15,-6-21 0 16,-18-29-1-16,-13-29 1 16,-17-34-2-16,-11-24 1 15,1-10-1-15,10 21 1 16,16 20 1-1,15 23 1 17,37 83 0-32,13 18 0 15,18 28 0-15,14 27 0 16,16 9 1-16,0 4-1 16,0-3 0-16,-2 2 1 15,-8-12 0-15,-13-9 0 0,-14-10 0 0,-11-11 0 16,-6-12 1-16,-10-19-2 15,-11-15 0-15,-7-28-3 16,-13-18 1-16,-14-24-2 16,4-19 0-16,3-3-2 15,4 15 1-15,9 20-2 16,8 17 0-16,6 18-4 0,4 16 1 16,6 24-8-16,4 15 1 15,-3 7-1-15,17 12 0 16</inkml:trace>
+  <inkml:trace contextRef="#ctx0" brushRef="#br0" timeOffset="1">5527 1185 44 0,'-24'-9'22'0,"48"-16"-17"0,-14 13 43 0,7-13-44 16,17-11 1-16,14-15 4 15,10-17 1-15,21-8-12 31,6-15 1-31,11-22 6 0,7-4 1 16,2 4-3-16,1 6 1 16,-17 16-3-16,-14 15 0 15,-13 18-1-15,-18 16 1 16,-14 23-1-16,-19 22 0 16,-28 19-1-16,-24 26 0 15,-27 31-1-15,-18 28 1 0,-23 21-1 16,-7 12 1-16,-10 10 1 15,13-18 1-15,17-10 1 16,10-28 1-16,14-18 1 16,18-24 0-16,10-12 1 15,27-22 0-15,20-33-2 16,21-34 0-16,31-30-1 0,13-28 0 0,24-30-2 16,4-3 1-16,9-4-2 15,-1 22 1-15,-19 15-1 16,-20 28 1-16,-17 21-2 15,-22 27 1-15,-22 25 0 16,-32 24 0-16,-16 41 0 31,-24 26 0-31,-4 16 2 0,-3-4 0 16,7 1 1-16,3-3 1 16,7-13-1-16,10-12 1 15,14-18-1-15,14-9 1 16,16-31-3-16,21-21 0 15,14-28-3-15,10-24 1 16,13-18-6-16,-2-16 0 0,-4-9-8 16,3 0 0-16,7 19-9 15,-7 9 0-15</inkml:trace>
 </inkml:ink>
 </file>
 
@@ -1493,7 +1494,7 @@
       <inkml:brushProperty name="fitToCurve" value="1"/>
     </inkml:brush>
   </inkml:definitions>
-  <inkml:trace contextRef="#ctx0" brushRef="#br0">61 359 22 0,'-10'0'11'0,"3"-19"-9"0,0 13 10 15,0 3-10-15,1-3 1 16,-1 0 3-16,0 3 1 16,3 3-7-16,1 3 0 0,-1 0 6 15,4-3 0-15,0 3 1 32,0-3 0-32,11 0-1 15,-1 3 1-15,4 0-2 16,3-3 1-16,7 0-2 15,7 0 1-15,10 0-2 16,4 3 1-16,3 0-1 16,10 0 1-16,0-3-1 15,-3 0 1-15,7-3-1 0,10 3 1 0,0-3-1 16,0 0 0-16,4 3-2 16,2 0 1-16,-9 0-1 15,0-3 0-15,-1 6 0 16,4-6 0-16,-4 0-1 15,1 0 1-15,3 3 0 16,-7-3 0-16,1 3-1 0,-2 0 1 16,5-3 0-16,-1 3 0 15,-2-3-1-15,-4-1 1 16,-1-2 0-16,5 3 0 16,-9-3-1-16,-1 0 1 0,-5 3-1 15,4 0 1-15,-4 0-1 31,4 3 1-31,-7 0 0 16,-4 0 0-16,-5 0 0 16,-2 3 0-16,-2-3 0 15,-1 3 1-15,0-3-1 16,0 3 1-16,1 3-1 0,-8-3 0 16,1 0 0-16,-1 0 1 15,0 3-2-15,1-2 1 0,3-1-1 16,-4 3 0-16,1 3 0 15,-1-3 0-15,4 0 0 16,0 0 0-16,0 4 0 16,-4-4 1-16,0 3-1 15,1-9 0-15,-1-3 0 32,4 0 0-32,-3 3 0 0,-4-3 1 15,-4 3-2-15,1-3 1 16,-4 6 0-16,-3-3 0 15,-4 0 0-15,0 3 0 16,4 0 0-16,-7-3 0 0,0 3 0 16,-4-3 1-16,0 0-1 15,-3 0 0-15,4 0 0 16,-1-6 1-16,-3 6-1 16,-3-9 0-16,-7-1-1 15,-8 1 1-15,-9-6-1 16,3-4 1-16,-3-2-1 15,-8-7 1-15,-6 4 0 0,-3-4 0 16,-8-2-1-16,8-4 0 0,2 3 0 16,5 7 0-16,-1-1-1 15,4 10 1-15,6 0-1 16,1 2 1-16,6 4-1 16,4 3 1-16,7 3 0 15,6 3 0-15,8 0 0 31,6 9 0-31,7 0 0 0,7 7 0 16,17 2 1-16,7-3 0 16,4 4 0-16,-1 5 0 15,8 1 0-15,-1 2 1 16,-7-2-1-16,1-1 0 16,-1-2 0-16,4-4 1 0,-4 1-1 15,-3-1 1-15,-6 0-1 16,-8-2 0-16,-10-1 0 15,-7 0 1-15,-7 1 0 16,-10-1 0-16,-10-3 0 16,-11 1 1-16,-3 2-2 15,-6 0 1-15,-8 4-1 0,-7 2 0 32,-3 0-2-32,-3 1 1 0,3-1-7 15,3-2 0-15,11-7-10 16,10-9 0-16,14-6-5 15,30-18 1-15</inkml:trace>
+  <inkml:trace contextRef="#ctx0" brushRef="#br0">61 358 22 0,'-10'0'11'0,"3"-19"-9"0,0 13 10 15,0 3-10-15,1-3 1 16,-1 0 3-16,0 3 1 16,3 3-7-16,1 3 0 0,-1 0 6 15,4-3 0-15,0 3 1 32,0-3 0-32,11 0-1 15,-1 3 1-15,4 0-2 16,3-3 1-16,7 0-2 15,7 0 1-15,10 0-2 16,4 3 1-16,3 0-1 16,10 0 1-16,0-3-1 15,-3 0 1-15,7-3-1 0,10 3 1 0,0-3-1 16,0 0 0-16,4 3-2 16,2 0 1-16,-9 0-1 15,0-3 0-15,-1 6 0 16,4-6 0-16,-4 0-1 15,1 0 1-15,3 3 0 16,-7-3 0-16,1 3-1 0,-2 0 1 16,5-3 0-16,-1 3 0 15,-2-3-1-15,-4-1 1 16,-1-2 0-16,5 3 0 16,-9-3-1-16,-1 1 1 0,-5 2-1 15,4 0 1-15,-4 0-1 31,4 3 1-31,-7 0 0 16,-4 0 0-16,-5 0 0 16,-2 3 0-16,-2-3 0 15,-1 3 1-15,0-3-1 16,0 3 1-16,1 2-1 0,-8-2 0 16,1 0 0-16,-1 0 1 15,0 3-2-15,1-2 1 0,3-1-1 16,-4 3 0-16,1 3 0 15,-1-3 0-15,4 0 0 16,0 0 0-16,0 4 0 16,-4-4 1-16,0 3-1 15,1-9 0-15,-1-3 0 32,4 0 0-32,-3 3 0 0,-4-3 1 15,-4 3-2-15,1-3 1 16,-4 6 0-16,-3-3 0 15,-4 0 0-15,0 3 0 16,4 0 0-16,-7-3 0 0,0 3 0 16,-4-3 1-16,0 0-1 15,-3 0 0-15,4 0 0 16,-1-6 1-16,-3 6-1 16,-3-9 0-16,-7-1-1 15,-8 1 1-15,-9-6-1 16,3-4 1-16,-3-1-1 15,-8-8 1-15,-6 4 0 0,-3-4 0 16,-8-2-1-16,8-4 0 0,2 3 0 16,5 7 0-16,-1-1-1 15,4 10 1-15,6 0-1 16,1 2 1-16,6 4-1 16,4 3 1-16,7 3 0 15,6 3 0-15,8 0 0 31,6 9 0-31,7 0 0 0,7 7 0 16,17 2 1-16,7-3 0 16,4 4 0-16,-1 5 0 15,8 1 0-15,-1 2 1 16,-7-2-1-16,1-1 0 16,-1-2 0-16,4-4 1 0,-4 1-1 15,-3-1 1-15,-6-1-1 16,-8-1 0-16,-10-1 0 15,-7 0 1-15,-7 1 0 16,-10-1 0-16,-10-3 0 16,-11 1 1-16,-3 2-2 15,-6 0 1-15,-8 4-1 0,-7 2 0 32,-3 0-2-32,-3 1 1 0,3-1-7 15,3-2 0-15,11-7-10 16,10-9 0-16,14-6-5 15,30-18 1-15</inkml:trace>
 </inkml:ink>
 </file>
 
@@ -1592,7 +1593,7 @@
       <inkml:brushProperty name="fitToCurve" value="1"/>
     </inkml:brush>
   </inkml:definitions>
-  <inkml:trace contextRef="#ctx0" brushRef="#br0">-803 6060 26 0,'-18'-4'13'0,"4"-4"-12"0,11 5 13 16,3-2-13-16,-3 0 1 15,0-2 3 1,0 2 1-16,0 0-5 16,-3 5 0-16,1 5 4 15,-5 0 0-15,1 3 1 16,0 2 0-16,3-4-1 16,0 6 0-16,4 5-1 15,-1 5 1-15,-3 2 0 0,-3 11 0 16,-3-2-1-16,-3 9 1 0,1 3-1 15,-1 9 1-15,-3 3-2 16,-2 3 1-16,-1 4-1 16,-6 4 1-16,3-2-2 15,1 6 0-15,2-1-1 16,7 4 1-16,-1-1-1 31,2-4 1-31,5-4-1 0,-1-1 0 16,0-8 0-16,1-4 0 15,-2-6-1-15,1-8 1 16,1-4-1-16,-1-5 0 16,3 2 0-16,0-2 0 15,0 0 0-15,1 2 0 16,-1 1 0-16,0-4 0 0,0 3 0 16,3-1 0-16,0-3 0 15,0-5 1-15,0-5-2 16,0-4 1-16,0-2-1 15,0-4 1-15,3-3-1 0,0 0 0 16,0-2 0-16,0 1 1 16,3-2 0-1,0 0 1-15,0 0-1 16,-3-2 1-16,0 0 0 16,3-4 1-16,0 0-1 15,-3-1 0-15,3-4-1 16,0 0 0-16,3-1-6 15,0-4 1-15,3-7-15 16,-1-9 1-16,1-7-3 0,11-16 1 16</inkml:trace>
+  <inkml:trace contextRef="#ctx0" brushRef="#br0">-803 6060 26 0,'-18'-4'13'0,"4"-4"-12"0,11 5 13 16,3-2-13-16,-3 0 1 15,0-2 3 1,0 2 1-16,0 0-5 16,-3 5 0-16,1 5 4 15,-5 0 0-15,1 3 1 16,0 2 0-16,3-4-1 16,0 6 0-16,4 5-1 15,-1 5 1-15,-3 2 0 0,-3 11 0 16,-3-2-1-16,-3 9 1 0,1 3-1 15,-1 9 1-15,-3 3-2 16,-2 3 1-16,-1 4-1 16,-6 4 1-16,3-2-2 15,1 6 0-15,2-1-1 16,7 4 1-16,-1 0-1 31,2-5 1-31,5-4-1 0,-1-1 0 16,0-8 0-16,1-4 0 15,-2-6-1-15,1-8 1 16,1-4-1-16,-1-5 0 16,3 2 0-16,0-2 0 15,0 0 0-15,1 2 0 16,-1 1 0-16,0-4 0 0,0 3 0 16,3-1 0-16,0-3 0 15,0-5 1-15,0-5-2 16,0-4 1-16,0-2-1 15,0-4 1-15,3-3-1 0,0 0 0 16,0-2 0-16,0 1 1 16,3-2 0-1,0 0 1-15,0 0-1 16,-3-2 1-16,0 0 0 16,3-4 1-16,0 0-1 15,-3-1 0-15,3-4-1 16,0 0 0-16,3-1-6 15,0-4 1-15,3-7-15 16,-1-9 1-16,1-7-3 0,11-16 1 16</inkml:trace>
 </inkml:ink>
 </file>
 
@@ -2144,7 +2145,7 @@
           <a:p>
             <a:fld id="{9D1F5F2B-0730-4A54-A5DD-3928CCCEE122}" type="datetimeFigureOut">
               <a:rPr lang="en-GB" smtClean="0"/>
-              <a:t>17/09/2016</a:t>
+              <a:t>18/09/2016</a:t>
             </a:fld>
             <a:endParaRPr lang="en-GB"/>
           </a:p>
@@ -3607,7 +3608,63 @@
             </a:pPr>
             <a:r>
               <a:rPr lang="en-US" dirty="0"/>
-              <a:t>"static if" is a name given to the compile-time counterpart of the `if` statement - its inclusion in the C++ language has been controversially proposed multiple times, but it has found a home in other languages. (C++17 will finally introduce a compile-time branching construct that we're going to analyze in this talk.)</a:t>
+              <a:t>"static if" is </a:t>
+            </a:r>
+            <a:r>
+              <a:rPr lang="en-US" dirty="0" smtClean="0"/>
+              <a:t>the compile-time counterpart of the `</a:t>
+            </a:r>
+            <a:r>
+              <a:rPr lang="en-US" dirty="0"/>
+              <a:t>if` statement - its inclusion in </a:t>
+            </a:r>
+            <a:r>
+              <a:rPr lang="en-US" dirty="0" smtClean="0"/>
+              <a:t>C</a:t>
+            </a:r>
+            <a:r>
+              <a:rPr lang="en-US" dirty="0"/>
+              <a:t>++ </a:t>
+            </a:r>
+            <a:r>
+              <a:rPr lang="en-US" dirty="0" smtClean="0"/>
+              <a:t>has </a:t>
+            </a:r>
+            <a:r>
+              <a:rPr lang="en-US" dirty="0"/>
+              <a:t>been controversially proposed multiple times, but it has found a home in other languages. (C++17 will </a:t>
+            </a:r>
+            <a:r>
+              <a:rPr lang="en-US" dirty="0" smtClean="0"/>
+              <a:t>introduce compile-time branching:</a:t>
+            </a:r>
+            <a:r>
+              <a:rPr lang="en-US" baseline="0" dirty="0" smtClean="0"/>
+              <a:t> </a:t>
+            </a:r>
+            <a:r>
+              <a:rPr lang="en-US" dirty="0" smtClean="0"/>
+              <a:t>we're </a:t>
+            </a:r>
+            <a:r>
+              <a:rPr lang="en-US" dirty="0"/>
+              <a:t>going to </a:t>
+            </a:r>
+            <a:r>
+              <a:rPr lang="en-US" dirty="0" smtClean="0"/>
+              <a:t>look</a:t>
+            </a:r>
+            <a:r>
+              <a:rPr lang="en-US" baseline="0" dirty="0" smtClean="0"/>
+              <a:t> at it </a:t>
+            </a:r>
+            <a:r>
+              <a:rPr lang="en-US" dirty="0" smtClean="0"/>
+              <a:t>in </a:t>
+            </a:r>
+            <a:r>
+              <a:rPr lang="en-US" dirty="0"/>
+              <a:t>this talk.)</a:t>
             </a:r>
           </a:p>
           <a:p>
@@ -3617,7 +3674,23 @@
             </a:pPr>
             <a:r>
               <a:rPr lang="en-US" dirty="0"/>
-              <a:t>C++ developers often feel that the functional purity of template metaprogramming and its lack of explicit control flow options make compile-time code harder to implement and to reason about.</a:t>
+              <a:t>C++ developers </a:t>
+            </a:r>
+            <a:r>
+              <a:rPr lang="en-US" dirty="0" smtClean="0"/>
+              <a:t>may feel </a:t>
+            </a:r>
+            <a:r>
+              <a:rPr lang="en-US" dirty="0"/>
+              <a:t>that the functional purity of </a:t>
+            </a:r>
+            <a:r>
+              <a:rPr lang="en-US" dirty="0" smtClean="0"/>
+              <a:t>TMP </a:t>
+            </a:r>
+            <a:r>
+              <a:rPr lang="en-US" dirty="0"/>
+              <a:t>and its lack of explicit control flow options make compile-time code harder to implement and to reason about.</a:t>
             </a:r>
           </a:p>
           <a:p>
@@ -3788,7 +3861,7 @@
           <a:p>
             <a:fld id="{FCA4862E-9507-4BEC-B7E3-B3B5E302CC7C}" type="slidenum">
               <a:rPr lang="it-IT" smtClean="0"/>
-              <a:t>27</a:t>
+              <a:t>28</a:t>
             </a:fld>
             <a:endParaRPr lang="it-IT"/>
           </a:p>
@@ -3877,7 +3950,7 @@
           <a:p>
             <a:fld id="{2F06AD33-72D2-4A0B-9DE7-EE3CF26210B9}" type="slidenum">
               <a:rPr lang="en-US" smtClean="0"/>
-              <a:t>29</a:t>
+              <a:t>30</a:t>
             </a:fld>
             <a:endParaRPr lang="en-US"/>
           </a:p>
@@ -4207,8 +4280,43 @@
               <a:buChar char="•"/>
             </a:pPr>
             <a:r>
+              <a:rPr lang="en-US" dirty="0" smtClean="0"/>
+              <a:t>Assume we had a</a:t>
+            </a:r>
+            <a:r>
+              <a:rPr lang="en-US" baseline="0" dirty="0" smtClean="0"/>
+              <a:t> `static </a:t>
+            </a:r>
+            <a:r>
+              <a:rPr lang="en-US" baseline="0" dirty="0" err="1" smtClean="0"/>
+              <a:t>if`in</a:t>
+            </a:r>
+            <a:r>
+              <a:rPr lang="en-US" baseline="0" dirty="0" smtClean="0"/>
+              <a:t> C++ called `if </a:t>
+            </a:r>
+            <a:r>
+              <a:rPr lang="en-US" baseline="0" dirty="0" err="1" smtClean="0"/>
+              <a:t>constexpr</a:t>
+            </a:r>
+            <a:r>
+              <a:rPr lang="en-US" baseline="0" dirty="0" smtClean="0"/>
+              <a:t>(….)`.</a:t>
+            </a:r>
+            <a:endParaRPr lang="en-US" dirty="0" smtClean="0"/>
+          </a:p>
+          <a:p>
+            <a:pPr marL="171450" indent="-171450">
+              <a:buFont typeface="Arial" panose="020B0604020202020204" pitchFamily="34" charset="0"/>
+              <a:buChar char="•"/>
+            </a:pPr>
+            <a:r>
+              <a:rPr lang="en-US" dirty="0" smtClean="0"/>
+              <a:t>Static </a:t>
+            </a:r>
+            <a:r>
               <a:rPr lang="en-US" dirty="0"/>
-              <a:t>Static if: a</a:t>
+              <a:t>if: a</a:t>
             </a:r>
             <a:r>
               <a:rPr lang="en-US" baseline="0" dirty="0"/>
@@ -4887,7 +4995,7 @@
           <a:p>
             <a:fld id="{0CCCAA47-7A5E-0248-86A4-50D01CC2A0C7}" type="datetimeFigureOut">
               <a:rPr lang="en-US" smtClean="0"/>
-              <a:t>9/17/2016</a:t>
+              <a:t>9/18/2016</a:t>
             </a:fld>
             <a:endParaRPr lang="en-US"/>
           </a:p>
@@ -5120,7 +5228,7 @@
           <a:p>
             <a:fld id="{0CCCAA47-7A5E-0248-86A4-50D01CC2A0C7}" type="datetimeFigureOut">
               <a:rPr lang="en-US" smtClean="0"/>
-              <a:t>9/17/2016</a:t>
+              <a:t>9/18/2016</a:t>
             </a:fld>
             <a:endParaRPr lang="en-US"/>
           </a:p>
@@ -5337,7 +5445,7 @@
           <a:p>
             <a:fld id="{0CCCAA47-7A5E-0248-86A4-50D01CC2A0C7}" type="datetimeFigureOut">
               <a:rPr lang="en-US" smtClean="0"/>
-              <a:t>9/17/2016</a:t>
+              <a:t>9/18/2016</a:t>
             </a:fld>
             <a:endParaRPr lang="en-US"/>
           </a:p>
@@ -5609,7 +5717,7 @@
           <a:p>
             <a:fld id="{026E4F01-8FA7-E241-A48E-5E0147CC8DFB}" type="datetimeFigureOut">
               <a:rPr lang="en-US" smtClean="0"/>
-              <a:t>9/17/2016</a:t>
+              <a:t>9/18/2016</a:t>
             </a:fld>
             <a:endParaRPr lang="en-US"/>
           </a:p>
@@ -5978,7 +6086,7 @@
           <a:p>
             <a:fld id="{026E4F01-8FA7-E241-A48E-5E0147CC8DFB}" type="datetimeFigureOut">
               <a:rPr lang="en-US" smtClean="0"/>
-              <a:t>9/17/2016</a:t>
+              <a:t>9/18/2016</a:t>
             </a:fld>
             <a:endParaRPr lang="en-US"/>
           </a:p>
@@ -6266,7 +6374,7 @@
           <a:p>
             <a:fld id="{026E4F01-8FA7-E241-A48E-5E0147CC8DFB}" type="datetimeFigureOut">
               <a:rPr lang="en-US" smtClean="0"/>
-              <a:t>9/17/2016</a:t>
+              <a:t>9/18/2016</a:t>
             </a:fld>
             <a:endParaRPr lang="en-US"/>
           </a:p>
@@ -6603,7 +6711,7 @@
           <a:p>
             <a:fld id="{026E4F01-8FA7-E241-A48E-5E0147CC8DFB}" type="datetimeFigureOut">
               <a:rPr lang="en-US" smtClean="0"/>
-              <a:t>9/17/2016</a:t>
+              <a:t>9/18/2016</a:t>
             </a:fld>
             <a:endParaRPr lang="en-US"/>
           </a:p>
@@ -7208,7 +7316,7 @@
           <a:p>
             <a:fld id="{026E4F01-8FA7-E241-A48E-5E0147CC8DFB}" type="datetimeFigureOut">
               <a:rPr lang="en-US" smtClean="0"/>
-              <a:t>9/17/2016</a:t>
+              <a:t>9/18/2016</a:t>
             </a:fld>
             <a:endParaRPr lang="en-US"/>
           </a:p>
@@ -7493,7 +7601,7 @@
           <a:p>
             <a:fld id="{026E4F01-8FA7-E241-A48E-5E0147CC8DFB}" type="datetimeFigureOut">
               <a:rPr lang="en-US" smtClean="0"/>
-              <a:t>9/17/2016</a:t>
+              <a:t>9/18/2016</a:t>
             </a:fld>
             <a:endParaRPr lang="en-US"/>
           </a:p>
@@ -7619,7 +7727,7 @@
           <a:p>
             <a:fld id="{026E4F01-8FA7-E241-A48E-5E0147CC8DFB}" type="datetimeFigureOut">
               <a:rPr lang="en-US" smtClean="0"/>
-              <a:t>9/17/2016</a:t>
+              <a:t>9/18/2016</a:t>
             </a:fld>
             <a:endParaRPr lang="en-US"/>
           </a:p>
@@ -7936,7 +8044,7 @@
           <a:p>
             <a:fld id="{026E4F01-8FA7-E241-A48E-5E0147CC8DFB}" type="datetimeFigureOut">
               <a:rPr lang="en-US" smtClean="0"/>
-              <a:t>9/17/2016</a:t>
+              <a:t>9/18/2016</a:t>
             </a:fld>
             <a:endParaRPr lang="en-US"/>
           </a:p>
@@ -8153,7 +8261,7 @@
           <a:p>
             <a:fld id="{0CCCAA47-7A5E-0248-86A4-50D01CC2A0C7}" type="datetimeFigureOut">
               <a:rPr lang="en-US" smtClean="0"/>
-              <a:t>9/17/2016</a:t>
+              <a:t>9/18/2016</a:t>
             </a:fld>
             <a:endParaRPr lang="en-US"/>
           </a:p>
@@ -8446,7 +8554,7 @@
           <a:p>
             <a:fld id="{026E4F01-8FA7-E241-A48E-5E0147CC8DFB}" type="datetimeFigureOut">
               <a:rPr lang="en-US" smtClean="0"/>
-              <a:t>9/17/2016</a:t>
+              <a:t>9/18/2016</a:t>
             </a:fld>
             <a:endParaRPr lang="en-US"/>
           </a:p>
@@ -8663,7 +8771,7 @@
           <a:p>
             <a:fld id="{026E4F01-8FA7-E241-A48E-5E0147CC8DFB}" type="datetimeFigureOut">
               <a:rPr lang="en-US" smtClean="0"/>
-              <a:t>9/17/2016</a:t>
+              <a:t>9/18/2016</a:t>
             </a:fld>
             <a:endParaRPr lang="en-US"/>
           </a:p>
@@ -8880,7 +8988,7 @@
           <a:p>
             <a:fld id="{026E4F01-8FA7-E241-A48E-5E0147CC8DFB}" type="datetimeFigureOut">
               <a:rPr lang="en-US" smtClean="0"/>
-              <a:t>9/17/2016</a:t>
+              <a:t>9/18/2016</a:t>
             </a:fld>
             <a:endParaRPr lang="en-US"/>
           </a:p>
@@ -9163,7 +9271,7 @@
           <a:p>
             <a:fld id="{0CCCAA47-7A5E-0248-86A4-50D01CC2A0C7}" type="datetimeFigureOut">
               <a:rPr lang="en-US" smtClean="0"/>
-              <a:t>9/17/2016</a:t>
+              <a:t>9/18/2016</a:t>
             </a:fld>
             <a:endParaRPr lang="en-US"/>
           </a:p>
@@ -9489,7 +9597,7 @@
           <a:p>
             <a:fld id="{0CCCAA47-7A5E-0248-86A4-50D01CC2A0C7}" type="datetimeFigureOut">
               <a:rPr lang="en-US" smtClean="0"/>
-              <a:t>9/17/2016</a:t>
+              <a:t>9/18/2016</a:t>
             </a:fld>
             <a:endParaRPr lang="en-US"/>
           </a:p>
@@ -9955,7 +10063,7 @@
           <a:p>
             <a:fld id="{0CCCAA47-7A5E-0248-86A4-50D01CC2A0C7}" type="datetimeFigureOut">
               <a:rPr lang="en-US" smtClean="0"/>
-              <a:t>9/17/2016</a:t>
+              <a:t>9/18/2016</a:t>
             </a:fld>
             <a:endParaRPr lang="en-US"/>
           </a:p>
@@ -10105,7 +10213,7 @@
           <a:p>
             <a:fld id="{0CCCAA47-7A5E-0248-86A4-50D01CC2A0C7}" type="datetimeFigureOut">
               <a:rPr lang="en-US" smtClean="0"/>
-              <a:t>9/17/2016</a:t>
+              <a:t>9/18/2016</a:t>
             </a:fld>
             <a:endParaRPr lang="en-US"/>
           </a:p>
@@ -10224,7 +10332,7 @@
           <a:p>
             <a:fld id="{0CCCAA47-7A5E-0248-86A4-50D01CC2A0C7}" type="datetimeFigureOut">
               <a:rPr lang="en-US" smtClean="0"/>
-              <a:t>9/17/2016</a:t>
+              <a:t>9/18/2016</a:t>
             </a:fld>
             <a:endParaRPr lang="en-US"/>
           </a:p>
@@ -10534,7 +10642,7 @@
           <a:p>
             <a:fld id="{0CCCAA47-7A5E-0248-86A4-50D01CC2A0C7}" type="datetimeFigureOut">
               <a:rPr lang="en-US" smtClean="0"/>
-              <a:t>9/17/2016</a:t>
+              <a:t>9/18/2016</a:t>
             </a:fld>
             <a:endParaRPr lang="en-US"/>
           </a:p>
@@ -10827,7 +10935,7 @@
           <a:p>
             <a:fld id="{0CCCAA47-7A5E-0248-86A4-50D01CC2A0C7}" type="datetimeFigureOut">
               <a:rPr lang="en-US" smtClean="0"/>
-              <a:t>9/17/2016</a:t>
+              <a:t>9/18/2016</a:t>
             </a:fld>
             <a:endParaRPr lang="en-US"/>
           </a:p>
@@ -11642,11 +11750,96 @@
           <a:lstStyle/>
           <a:p>
             <a:pPr algn="l"/>
-            <a:endParaRPr lang="en-US" sz="1500" dirty="0">
-              <a:solidFill>
-                <a:schemeClr val="bg1"/>
-              </a:solidFill>
-            </a:endParaRPr>
+            <a:r>
+              <a:rPr lang="en-US" sz="1500" dirty="0" smtClean="0">
+                <a:solidFill>
+                  <a:schemeClr val="bg1"/>
+                </a:solidFill>
+              </a:rPr>
+              <a:t>TODO: other Bloomberg talks</a:t>
+            </a:r>
+          </a:p>
+          <a:p>
+            <a:pPr marL="285750" indent="-285750" algn="l">
+              <a:buFont typeface="Arial" panose="020B0604020202020204" pitchFamily="34" charset="0"/>
+              <a:buChar char="•"/>
+            </a:pPr>
+            <a:r>
+              <a:rPr lang="en-US" sz="1500" dirty="0" err="1" smtClean="0">
+                <a:solidFill>
+                  <a:schemeClr val="bg1"/>
+                </a:solidFill>
+              </a:rPr>
+              <a:t>Dietmar</a:t>
+            </a:r>
+            <a:r>
+              <a:rPr lang="en-US" sz="1500" dirty="0" smtClean="0">
+                <a:solidFill>
+                  <a:schemeClr val="bg1"/>
+                </a:solidFill>
+              </a:rPr>
+              <a:t> </a:t>
+            </a:r>
+            <a:r>
+              <a:rPr lang="en-US" sz="1500" dirty="0" err="1" smtClean="0">
+                <a:solidFill>
+                  <a:schemeClr val="bg1"/>
+                </a:solidFill>
+              </a:rPr>
+              <a:t>Kuhl</a:t>
+            </a:r>
+            <a:r>
+              <a:rPr lang="en-US" sz="1500" dirty="0" smtClean="0">
+                <a:solidFill>
+                  <a:schemeClr val="bg1"/>
+                </a:solidFill>
+              </a:rPr>
+              <a:t>: “Constant Fun”</a:t>
+            </a:r>
+          </a:p>
+          <a:p>
+            <a:pPr marL="285750" indent="-285750" algn="l">
+              <a:buFont typeface="Arial" panose="020B0604020202020204" pitchFamily="34" charset="0"/>
+              <a:buChar char="•"/>
+            </a:pPr>
+            <a:r>
+              <a:rPr lang="en-US" sz="1500" dirty="0" smtClean="0">
+                <a:solidFill>
+                  <a:schemeClr val="bg1"/>
+                </a:solidFill>
+              </a:rPr>
+              <a:t>John </a:t>
+            </a:r>
+            <a:r>
+              <a:rPr lang="en-US" sz="1500" dirty="0" err="1" smtClean="0">
+                <a:solidFill>
+                  <a:schemeClr val="bg1"/>
+                </a:solidFill>
+              </a:rPr>
+              <a:t>Lakos</a:t>
+            </a:r>
+            <a:r>
+              <a:rPr lang="en-US" sz="1500" dirty="0" smtClean="0">
+                <a:solidFill>
+                  <a:schemeClr val="bg1"/>
+                </a:solidFill>
+              </a:rPr>
+              <a:t>: “???”</a:t>
+            </a:r>
+          </a:p>
+          <a:p>
+            <a:pPr marL="285750" indent="-285750" algn="l">
+              <a:buFont typeface="Arial" panose="020B0604020202020204" pitchFamily="34" charset="0"/>
+              <a:buChar char="•"/>
+            </a:pPr>
+            <a:r>
+              <a:rPr lang="en-US" sz="1500" dirty="0" smtClean="0">
+                <a:solidFill>
+                  <a:schemeClr val="bg1"/>
+                </a:solidFill>
+              </a:rPr>
+              <a:t>???</a:t>
+            </a:r>
           </a:p>
         </p:txBody>
       </p:sp>
@@ -11695,7 +11888,17 @@
                 <a:latin typeface="Arial"/>
                 <a:cs typeface="Arial"/>
               </a:rPr>
-              <a:t>#cppcon2016</a:t>
+              <a:t>#</a:t>
+            </a:r>
+            <a:r>
+              <a:rPr lang="en-US" sz="2000" dirty="0" err="1" smtClean="0">
+                <a:solidFill>
+                  <a:srgbClr val="FFFFFF"/>
+                </a:solidFill>
+                <a:latin typeface="Arial"/>
+                <a:cs typeface="Arial"/>
+              </a:rPr>
+              <a:t>CppCon</a:t>
             </a:r>
             <a:endParaRPr lang="en-US" sz="2000" dirty="0">
               <a:solidFill>
@@ -11754,7 +11957,7 @@
         <p:spPr>
           <a:xfrm>
             <a:off x="-1" y="476250"/>
-            <a:ext cx="5588975" cy="562721"/>
+            <a:ext cx="6564924" cy="562721"/>
           </a:xfrm>
           <a:prstGeom prst="rect">
             <a:avLst/>
@@ -11783,6 +11986,16 @@
           <a:p>
             <a:pPr algn="l"/>
             <a:r>
+              <a:rPr lang="en-US" sz="3600" b="1" spc="-150" dirty="0" smtClean="0">
+                <a:solidFill>
+                  <a:srgbClr val="FFFFFF"/>
+                </a:solidFill>
+                <a:latin typeface="Arial"/>
+                <a:cs typeface="Arial"/>
+              </a:rPr>
+              <a:t>Bloomberg @ </a:t>
+            </a:r>
+            <a:r>
               <a:rPr lang="en-US" sz="3600" b="1" spc="-150" dirty="0" err="1" smtClean="0">
                 <a:solidFill>
                   <a:srgbClr val="FFFFFF"/>
@@ -11800,7 +12013,17 @@
                 <a:latin typeface="Arial"/>
                 <a:cs typeface="Arial"/>
               </a:rPr>
-              <a:t> 2016</a:t>
+              <a:t> </a:t>
+            </a:r>
+            <a:r>
+              <a:rPr lang="en-US" sz="3600" b="1" spc="-150" dirty="0" smtClean="0">
+                <a:solidFill>
+                  <a:srgbClr val="FFFFFF"/>
+                </a:solidFill>
+                <a:latin typeface="Arial"/>
+                <a:cs typeface="Arial"/>
+              </a:rPr>
+              <a:t>2016</a:t>
             </a:r>
             <a:endParaRPr lang="en-US" sz="3600" b="1" spc="-150" dirty="0">
               <a:solidFill>
@@ -14687,7 +14910,7 @@
 </file>
 
 <file path=ppt/slides/slide17.xml><?xml version="1.0" encoding="utf-8"?>
-<p:sld xmlns:a="http://schemas.openxmlformats.org/drawingml/2006/main" xmlns:r="http://schemas.openxmlformats.org/officeDocument/2006/relationships" xmlns:p="http://schemas.openxmlformats.org/presentationml/2006/main">
+<p:sld xmlns:a="http://schemas.openxmlformats.org/drawingml/2006/main" xmlns:r="http://schemas.openxmlformats.org/officeDocument/2006/relationships" xmlns:p="http://schemas.openxmlformats.org/presentationml/2006/main" showMasterSp="0">
   <p:cSld>
     <p:spTree>
       <p:nvGrpSpPr>
@@ -14958,8 +15181,8 @@
           </a:p>
         </p:txBody>
       </p:sp>
-      <mc:AlternateContent xmlns:mc="http://schemas.openxmlformats.org/markup-compatibility/2006" xmlns:p14="http://schemas.microsoft.com/office/powerpoint/2010/main">
-        <mc:Choice Requires="p14">
+      <mc:AlternateContent xmlns:mc="http://schemas.openxmlformats.org/markup-compatibility/2006">
+        <mc:Choice xmlns:p14="http://schemas.microsoft.com/office/powerpoint/2010/main" Requires="p14">
           <p:contentPart p14:bwMode="auto" r:id="rId3">
             <p14:nvContentPartPr>
               <p14:cNvPr id="12" name="Ink 11"/>
@@ -14968,11 +15191,11 @@
             </p14:nvContentPartPr>
             <p14:xfrm>
               <a:off x="6906360" y="1278946"/>
-              <a:ext cx="1176559" cy="129048"/>
+              <a:ext cx="1176560" cy="129048"/>
             </p14:xfrm>
           </p:contentPart>
         </mc:Choice>
-        <mc:Fallback xmlns="">
+        <mc:Fallback>
           <p:pic>
             <p:nvPicPr>
               <p:cNvPr id="12" name="Ink 11"/>
@@ -14987,8 +15210,8 @@
             </p:blipFill>
             <p:spPr>
               <a:xfrm>
-                <a:off x="6893043" y="1259841"/>
-                <a:ext cx="1203193" cy="172665"/>
+                <a:off x="6879718" y="1233527"/>
+                <a:ext cx="1230204" cy="223851"/>
               </a:xfrm>
               <a:prstGeom prst="rect">
                 <a:avLst/>
@@ -14997,8 +15220,8 @@
           </p:pic>
         </mc:Fallback>
       </mc:AlternateContent>
-      <mc:AlternateContent xmlns:mc="http://schemas.openxmlformats.org/markup-compatibility/2006" xmlns:p14="http://schemas.microsoft.com/office/powerpoint/2010/main">
-        <mc:Choice Requires="p14">
+      <mc:AlternateContent xmlns:mc="http://schemas.openxmlformats.org/markup-compatibility/2006">
+        <mc:Choice xmlns:p14="http://schemas.microsoft.com/office/powerpoint/2010/main" Requires="p14">
           <p:contentPart p14:bwMode="auto" r:id="rId5">
             <p14:nvContentPartPr>
               <p14:cNvPr id="13" name="Ink 12"/>
@@ -15007,11 +15230,11 @@
             </p14:nvContentPartPr>
             <p14:xfrm>
               <a:off x="6820230" y="2124785"/>
-              <a:ext cx="1129996" cy="144647"/>
+              <a:ext cx="1129996" cy="144648"/>
             </p14:xfrm>
           </p:contentPart>
         </mc:Choice>
-        <mc:Fallback xmlns="">
+        <mc:Fallback>
           <p:pic>
             <p:nvPicPr>
               <p:cNvPr id="13" name="Ink 12"/>
@@ -15026,8 +15249,8 @@
             </p:blipFill>
             <p:spPr>
               <a:xfrm>
-                <a:off x="6815550" y="2112911"/>
-                <a:ext cx="1145475" cy="178470"/>
+                <a:off x="6810517" y="2101037"/>
+                <a:ext cx="1161295" cy="211935"/>
               </a:xfrm>
               <a:prstGeom prst="rect">
                 <a:avLst/>
@@ -15036,8 +15259,8 @@
           </p:pic>
         </mc:Fallback>
       </mc:AlternateContent>
-      <mc:AlternateContent xmlns:mc="http://schemas.openxmlformats.org/markup-compatibility/2006" xmlns:p14="http://schemas.microsoft.com/office/powerpoint/2010/main">
-        <mc:Choice Requires="p14">
+      <mc:AlternateContent xmlns:mc="http://schemas.openxmlformats.org/markup-compatibility/2006">
+        <mc:Choice xmlns:p14="http://schemas.microsoft.com/office/powerpoint/2010/main" Requires="p14">
           <p:contentPart p14:bwMode="auto" r:id="rId7">
             <p14:nvContentPartPr>
               <p14:cNvPr id="14" name="Ink 13"/>
@@ -15045,12 +15268,12 @@
               <p14:nvPr/>
             </p14:nvContentPartPr>
             <p14:xfrm>
-              <a:off x="6820230" y="3039776"/>
-              <a:ext cx="1249588" cy="115103"/>
+              <a:off x="6705600" y="3039776"/>
+              <a:ext cx="1364218" cy="115104"/>
             </p14:xfrm>
           </p:contentPart>
         </mc:Choice>
-        <mc:Fallback xmlns="">
+        <mc:Fallback>
           <p:pic>
             <p:nvPicPr>
               <p:cNvPr id="14" name="Ink 13"/>
@@ -15065,8 +15288,8 @@
             </p:blipFill>
             <p:spPr>
               <a:xfrm>
-                <a:off x="6816271" y="3019993"/>
-                <a:ext cx="1266504" cy="158267"/>
+                <a:off x="6697681" y="3000209"/>
+                <a:ext cx="1398053" cy="201792"/>
               </a:xfrm>
               <a:prstGeom prst="rect">
                 <a:avLst/>
@@ -15075,8 +15298,8 @@
           </p:pic>
         </mc:Fallback>
       </mc:AlternateContent>
-      <mc:AlternateContent xmlns:mc="http://schemas.openxmlformats.org/markup-compatibility/2006" xmlns:p14="http://schemas.microsoft.com/office/powerpoint/2010/main">
-        <mc:Choice Requires="p14">
+      <mc:AlternateContent xmlns:mc="http://schemas.openxmlformats.org/markup-compatibility/2006">
+        <mc:Choice xmlns:p14="http://schemas.microsoft.com/office/powerpoint/2010/main" Requires="p14">
           <p:contentPart p14:bwMode="auto" r:id="rId9">
             <p14:nvContentPartPr>
               <p14:cNvPr id="15" name="Ink 14"/>
@@ -15089,7 +15312,7 @@
             </p14:xfrm>
           </p:contentPart>
         </mc:Choice>
-        <mc:Fallback xmlns="">
+        <mc:Fallback>
           <p:pic>
             <p:nvPicPr>
               <p:cNvPr id="15" name="Ink 14"/>
@@ -15104,8 +15327,8 @@
             </p:blipFill>
             <p:spPr>
               <a:xfrm>
-                <a:off x="6862800" y="3925081"/>
-                <a:ext cx="1331858" cy="112674"/>
+                <a:off x="6856678" y="3902474"/>
+                <a:ext cx="1350226" cy="157852"/>
               </a:xfrm>
               <a:prstGeom prst="rect">
                 <a:avLst/>
@@ -15620,11 +15843,11 @@
             </a:r>
             <a:r>
               <a:rPr lang="en-US" b="1" dirty="0"/>
-              <a:t>static” </a:t>
+              <a:t>static</a:t>
             </a:r>
             <a:r>
               <a:rPr lang="en-US" b="1" dirty="0" smtClean="0"/>
-              <a:t/>
+              <a:t>”</a:t>
             </a:r>
             <a:br>
               <a:rPr lang="en-US" b="1" dirty="0" smtClean="0"/>
@@ -15649,140 +15872,6 @@
           </a:p>
         </p:txBody>
       </p:sp>
-      <p:sp>
-        <p:nvSpPr>
-          <p:cNvPr id="5" name="Subtitle 4"/>
-          <p:cNvSpPr>
-            <a:spLocks noGrp="1"/>
-          </p:cNvSpPr>
-          <p:nvPr>
-            <p:ph type="subTitle" idx="1"/>
-          </p:nvPr>
-        </p:nvSpPr>
-        <p:spPr>
-          <a:xfrm>
-            <a:off x="-1714500" y="-1459230"/>
-            <a:ext cx="6400800" cy="1314450"/>
-          </a:xfrm>
-        </p:spPr>
-        <p:txBody>
-          <a:bodyPr/>
-          <a:lstStyle/>
-          <a:p>
-            <a:endParaRPr lang="en-GB" dirty="0"/>
-          </a:p>
-        </p:txBody>
-      </p:sp>
-      <p:grpSp>
-        <p:nvGrpSpPr>
-          <p:cNvPr id="6" name="Group 5"/>
-          <p:cNvGrpSpPr/>
-          <p:nvPr/>
-        </p:nvGrpSpPr>
-        <p:grpSpPr>
-          <a:xfrm>
-            <a:off x="5372872" y="-1338933"/>
-            <a:ext cx="5763441" cy="830997"/>
-            <a:chOff x="1092569" y="3918247"/>
-            <a:chExt cx="5763441" cy="830997"/>
-          </a:xfrm>
-        </p:grpSpPr>
-        <p:sp>
-          <p:nvSpPr>
-            <p:cNvPr id="7" name="CasellaDiTesto 8"/>
-            <p:cNvSpPr txBox="1"/>
-            <p:nvPr/>
-          </p:nvSpPr>
-          <p:spPr>
-            <a:xfrm>
-              <a:off x="1742110" y="3918247"/>
-              <a:ext cx="5113900" cy="830997"/>
-            </a:xfrm>
-            <a:prstGeom prst="rect">
-              <a:avLst/>
-            </a:prstGeom>
-            <a:noFill/>
-          </p:spPr>
-          <p:txBody>
-            <a:bodyPr wrap="none" rtlCol="0">
-              <a:spAutoFit/>
-            </a:bodyPr>
-            <a:lstStyle/>
-            <a:p>
-              <a:r>
-                <a:rPr lang="it-IT" sz="2800" dirty="0">
-                  <a:latin typeface="Consolas" panose="020B0609020204030204" pitchFamily="49" charset="0"/>
-                  <a:cs typeface="Consolas" panose="020B0609020204030204" pitchFamily="49" charset="0"/>
-                  <a:hlinkClick r:id="rId2"/>
-                </a:rPr>
-                <a:t>http://</a:t>
-              </a:r>
-              <a:r>
-                <a:rPr lang="it-IT" sz="2800" b="1" dirty="0">
-                  <a:latin typeface="Consolas" panose="020B0609020204030204" pitchFamily="49" charset="0"/>
-                  <a:cs typeface="Consolas" panose="020B0609020204030204" pitchFamily="49" charset="0"/>
-                  <a:hlinkClick r:id="rId2"/>
-                </a:rPr>
-                <a:t>vittorioromeo.info</a:t>
-              </a:r>
-              <a:endParaRPr lang="it-IT" sz="2800" b="1" dirty="0">
-                <a:latin typeface="Consolas" panose="020B0609020204030204" pitchFamily="49" charset="0"/>
-                <a:cs typeface="Consolas" panose="020B0609020204030204" pitchFamily="49" charset="0"/>
-              </a:endParaRPr>
-            </a:p>
-            <a:p>
-              <a:r>
-                <a:rPr lang="it-IT" sz="2000" b="1" dirty="0" smtClean="0">
-                  <a:latin typeface="Consolas" panose="020B0609020204030204" pitchFamily="49" charset="0"/>
-                  <a:cs typeface="Consolas" panose="020B0609020204030204" pitchFamily="49" charset="0"/>
-                </a:rPr>
-                <a:t>vittorio.romeo@</a:t>
-              </a:r>
-              <a:r>
-                <a:rPr lang="it-IT" sz="2000" b="0" dirty="0" smtClean="0">
-                  <a:latin typeface="Consolas" panose="020B0609020204030204" pitchFamily="49" charset="0"/>
-                  <a:cs typeface="Consolas" panose="020B0609020204030204" pitchFamily="49" charset="0"/>
-                </a:rPr>
-                <a:t>outlook.com</a:t>
-              </a:r>
-              <a:endParaRPr lang="it-IT" sz="2000" b="0" dirty="0">
-                <a:latin typeface="Consolas" panose="020B0609020204030204" pitchFamily="49" charset="0"/>
-                <a:cs typeface="Consolas" panose="020B0609020204030204" pitchFamily="49" charset="0"/>
-              </a:endParaRPr>
-            </a:p>
-          </p:txBody>
-        </p:sp>
-        <p:pic>
-          <p:nvPicPr>
-            <p:cNvPr id="8" name="Immagine 9"/>
-            <p:cNvPicPr>
-              <a:picLocks noChangeAspect="1"/>
-            </p:cNvPicPr>
-            <p:nvPr/>
-          </p:nvPicPr>
-          <p:blipFill>
-            <a:blip r:embed="rId3" cstate="print">
-              <a:extLst>
-                <a:ext uri="{28A0092B-C50C-407E-A947-70E740481C1C}">
-                  <a14:useLocalDpi xmlns:a14="http://schemas.microsoft.com/office/drawing/2010/main" val="0"/>
-                </a:ext>
-              </a:extLst>
-            </a:blip>
-            <a:stretch>
-              <a:fillRect/>
-            </a:stretch>
-          </p:blipFill>
-          <p:spPr>
-            <a:xfrm>
-              <a:off x="1092569" y="4000179"/>
-              <a:ext cx="658496" cy="683800"/>
-            </a:xfrm>
-            <a:prstGeom prst="rect">
-              <a:avLst/>
-            </a:prstGeom>
-          </p:spPr>
-        </p:pic>
-      </p:grpSp>
       <p:sp>
         <p:nvSpPr>
           <p:cNvPr id="9" name="Rettangolo 23"/>
@@ -15807,31 +15896,31 @@
             <a:pPr algn="ctr"/>
             <a:r>
               <a:rPr lang="it-IT" sz="3200" i="0" dirty="0">
-                <a:hlinkClick r:id="rId4"/>
+                <a:hlinkClick r:id="rId2"/>
               </a:rPr>
               <a:t>http:</a:t>
             </a:r>
             <a:r>
               <a:rPr lang="en-US" sz="3200" i="0" dirty="0">
-                <a:hlinkClick r:id="rId4"/>
+                <a:hlinkClick r:id="rId2"/>
               </a:rPr>
               <a:t>//</a:t>
             </a:r>
             <a:r>
               <a:rPr lang="it-IT" sz="3200" i="0" dirty="0">
-                <a:hlinkClick r:id="rId4"/>
+                <a:hlinkClick r:id="rId2"/>
               </a:rPr>
               <a:t>github.com/SuperV12</a:t>
             </a:r>
             <a:r>
               <a:rPr lang="it-IT" sz="3200" b="0" i="0" dirty="0">
-                <a:hlinkClick r:id="rId4"/>
+                <a:hlinkClick r:id="rId2"/>
               </a:rPr>
               <a:t>3</a:t>
             </a:r>
             <a:r>
               <a:rPr lang="it-IT" sz="3200" i="0" dirty="0">
-                <a:hlinkClick r:id="rId4"/>
+                <a:hlinkClick r:id="rId2"/>
               </a:rPr>
               <a:t>4/cppcon2016</a:t>
             </a:r>
@@ -15848,7 +15937,7 @@
           <p:nvPr/>
         </p:nvPicPr>
         <p:blipFill>
-          <a:blip r:embed="rId5">
+          <a:blip r:embed="rId3">
             <a:extLst>
               <a:ext uri="{28A0092B-C50C-407E-A947-70E740481C1C}">
                 <a14:useLocalDpi xmlns:a14="http://schemas.microsoft.com/office/drawing/2010/main" val="0"/>
@@ -15878,7 +15967,7 @@
           <p:nvPr/>
         </p:nvPicPr>
         <p:blipFill>
-          <a:blip r:embed="rId6">
+          <a:blip r:embed="rId4">
             <a:extLst>
               <a:ext uri="{28A0092B-C50C-407E-A947-70E740481C1C}">
                 <a14:useLocalDpi xmlns:a14="http://schemas.microsoft.com/office/drawing/2010/main" val="0"/>
@@ -15908,7 +15997,7 @@
           <p:nvPr/>
         </p:nvPicPr>
         <p:blipFill>
-          <a:blip r:embed="rId7">
+          <a:blip r:embed="rId5">
             <a:extLst>
               <a:ext uri="{28A0092B-C50C-407E-A947-70E740481C1C}">
                 <a14:useLocalDpi xmlns:a14="http://schemas.microsoft.com/office/drawing/2010/main" val="0"/>
@@ -17545,7 +17634,7 @@
         <p:spPr>
           <a:xfrm>
             <a:off x="336388" y="666735"/>
-            <a:ext cx="3435511" cy="3624069"/>
+            <a:ext cx="3525620" cy="3624069"/>
           </a:xfrm>
           <a:prstGeom prst="rect">
             <a:avLst/>
@@ -17591,7 +17680,23 @@
             </a:r>
             <a:r>
               <a:rPr lang="en-US" sz="2100" dirty="0"/>
-              <a:t> as a template function that will only be instantiated if the predicate matches. </a:t>
+              <a:t> as a template function that </a:t>
+            </a:r>
+            <a:r>
+              <a:rPr lang="en-US" sz="2100" b="1" dirty="0"/>
+              <a:t>will</a:t>
+            </a:r>
+            <a:r>
+              <a:rPr lang="en-US" sz="2100" dirty="0"/>
+              <a:t> </a:t>
+            </a:r>
+            <a:r>
+              <a:rPr lang="en-US" sz="2100" b="1" dirty="0"/>
+              <a:t>only be instantiated if the predicate matches</a:t>
+            </a:r>
+            <a:r>
+              <a:rPr lang="en-US" sz="2100" dirty="0"/>
+              <a:t>. </a:t>
             </a:r>
           </a:p>
           <a:p>
@@ -17616,7 +17721,15 @@
             </a:r>
             <a:r>
               <a:rPr lang="en-US" sz="2100" dirty="0"/>
-              <a:t> does not exist, we won't get a compilation error, because the branch won't be </a:t>
+              <a:t> does not exist, </a:t>
+            </a:r>
+            <a:r>
+              <a:rPr lang="en-US" sz="2100" b="1" dirty="0"/>
+              <a:t>we won't get a compilation error</a:t>
+            </a:r>
+            <a:r>
+              <a:rPr lang="en-US" sz="2100" dirty="0"/>
+              <a:t>, because the branch won't be </a:t>
             </a:r>
             <a:r>
               <a:rPr lang="en-US" sz="2100" dirty="0" smtClean="0"/>
@@ -19344,8 +19457,12 @@
           <a:lstStyle/>
           <a:p>
             <a:r>
+              <a:rPr lang="en-US" sz="1800" dirty="0" smtClean="0"/>
+              <a:t>What </a:t>
+            </a:r>
+            <a:r>
               <a:rPr lang="en-US" sz="1800" dirty="0"/>
-              <a:t> What allows </a:t>
+              <a:t>allows </a:t>
             </a:r>
             <a:r>
               <a:rPr lang="en-US" sz="1800" dirty="0" err="1">
@@ -19433,8 +19550,8 @@
           </a:prstGeom>
         </p:spPr>
       </p:pic>
-      <mc:AlternateContent xmlns:mc="http://schemas.openxmlformats.org/markup-compatibility/2006" xmlns:p14="http://schemas.microsoft.com/office/powerpoint/2010/main">
-        <mc:Choice Requires="p14">
+      <mc:AlternateContent xmlns:mc="http://schemas.openxmlformats.org/markup-compatibility/2006">
+        <mc:Choice xmlns:p14="http://schemas.microsoft.com/office/powerpoint/2010/main" Requires="p14">
           <p:contentPart p14:bwMode="auto" r:id="rId3">
             <p14:nvContentPartPr>
               <p14:cNvPr id="8" name="Ink 7"/>
@@ -19442,12 +19559,12 @@
               <p14:nvPr/>
             </p14:nvContentPartPr>
             <p14:xfrm>
-              <a:off x="5816599" y="1137179"/>
-              <a:ext cx="465381" cy="263790"/>
+              <a:off x="5543551" y="1137179"/>
+              <a:ext cx="738430" cy="263790"/>
             </p14:xfrm>
           </p:contentPart>
         </mc:Choice>
-        <mc:Fallback xmlns="">
+        <mc:Fallback>
           <p:pic>
             <p:nvPicPr>
               <p:cNvPr id="8" name="Ink 7"/>
@@ -19462,8 +19579,8 @@
             </p:blipFill>
             <p:spPr>
               <a:xfrm>
-                <a:off x="5805793" y="1127089"/>
-                <a:ext cx="486993" cy="285412"/>
+                <a:off x="5532750" y="1127102"/>
+                <a:ext cx="760032" cy="285383"/>
               </a:xfrm>
               <a:prstGeom prst="rect">
                 <a:avLst/>
@@ -19547,7 +19664,118 @@
   <p:timing>
     <p:tnLst>
       <p:par>
-        <p:cTn id="1" dur="indefinite" restart="never" nodeType="tmRoot"/>
+        <p:cTn id="1" dur="indefinite" restart="never" nodeType="tmRoot">
+          <p:childTnLst>
+            <p:seq concurrent="1" nextAc="seek">
+              <p:cTn id="2" dur="indefinite" nodeType="mainSeq">
+                <p:childTnLst>
+                  <p:par>
+                    <p:cTn id="3" fill="hold">
+                      <p:stCondLst>
+                        <p:cond delay="indefinite"/>
+                      </p:stCondLst>
+                      <p:childTnLst>
+                        <p:par>
+                          <p:cTn id="4" fill="hold">
+                            <p:stCondLst>
+                              <p:cond delay="0"/>
+                            </p:stCondLst>
+                            <p:childTnLst>
+                              <p:par>
+                                <p:cTn id="5" presetID="10" presetClass="entr" presetSubtype="0" fill="hold" nodeType="clickEffect">
+                                  <p:stCondLst>
+                                    <p:cond delay="0"/>
+                                  </p:stCondLst>
+                                  <p:childTnLst>
+                                    <p:set>
+                                      <p:cBhvr>
+                                        <p:cTn id="6" dur="1" fill="hold">
+                                          <p:stCondLst>
+                                            <p:cond delay="0"/>
+                                          </p:stCondLst>
+                                        </p:cTn>
+                                        <p:tgtEl>
+                                          <p:spTgt spid="8"/>
+                                        </p:tgtEl>
+                                        <p:attrNameLst>
+                                          <p:attrName>style.visibility</p:attrName>
+                                        </p:attrNameLst>
+                                      </p:cBhvr>
+                                      <p:to>
+                                        <p:strVal val="visible"/>
+                                      </p:to>
+                                    </p:set>
+                                    <p:animEffect transition="in" filter="fade">
+                                      <p:cBhvr>
+                                        <p:cTn id="7" dur="500"/>
+                                        <p:tgtEl>
+                                          <p:spTgt spid="8"/>
+                                        </p:tgtEl>
+                                      </p:cBhvr>
+                                    </p:animEffect>
+                                  </p:childTnLst>
+                                </p:cTn>
+                              </p:par>
+                              <p:par>
+                                <p:cTn id="8" presetID="10" presetClass="entr" presetSubtype="0" fill="hold" nodeType="withEffect">
+                                  <p:stCondLst>
+                                    <p:cond delay="0"/>
+                                  </p:stCondLst>
+                                  <p:childTnLst>
+                                    <p:set>
+                                      <p:cBhvr>
+                                        <p:cTn id="9" dur="1" fill="hold">
+                                          <p:stCondLst>
+                                            <p:cond delay="0"/>
+                                          </p:stCondLst>
+                                        </p:cTn>
+                                        <p:tgtEl>
+                                          <p:spTgt spid="10"/>
+                                        </p:tgtEl>
+                                        <p:attrNameLst>
+                                          <p:attrName>style.visibility</p:attrName>
+                                        </p:attrNameLst>
+                                      </p:cBhvr>
+                                      <p:to>
+                                        <p:strVal val="visible"/>
+                                      </p:to>
+                                    </p:set>
+                                    <p:animEffect transition="in" filter="fade">
+                                      <p:cBhvr>
+                                        <p:cTn id="10" dur="500"/>
+                                        <p:tgtEl>
+                                          <p:spTgt spid="10"/>
+                                        </p:tgtEl>
+                                      </p:cBhvr>
+                                    </p:animEffect>
+                                  </p:childTnLst>
+                                </p:cTn>
+                              </p:par>
+                            </p:childTnLst>
+                          </p:cTn>
+                        </p:par>
+                      </p:childTnLst>
+                    </p:cTn>
+                  </p:par>
+                </p:childTnLst>
+              </p:cTn>
+              <p:prevCondLst>
+                <p:cond evt="onPrev" delay="0">
+                  <p:tgtEl>
+                    <p:sldTgt/>
+                  </p:tgtEl>
+                </p:cond>
+              </p:prevCondLst>
+              <p:nextCondLst>
+                <p:cond evt="onNext" delay="0">
+                  <p:tgtEl>
+                    <p:sldTgt/>
+                  </p:tgtEl>
+                </p:cond>
+              </p:nextCondLst>
+            </p:seq>
+          </p:childTnLst>
+        </p:cTn>
       </p:par>
     </p:tnLst>
   </p:timing>
@@ -19573,6 +19801,94 @@
       </p:grpSpPr>
       <p:sp>
         <p:nvSpPr>
+          <p:cNvPr id="6" name="Title 3"/>
+          <p:cNvSpPr txBox="1">
+            <a:spLocks/>
+          </p:cNvSpPr>
+          <p:nvPr/>
+        </p:nvSpPr>
+        <p:spPr>
+          <a:xfrm>
+            <a:off x="685800" y="1781811"/>
+            <a:ext cx="7772400" cy="1579879"/>
+          </a:xfrm>
+          <a:prstGeom prst="rect">
+            <a:avLst/>
+          </a:prstGeom>
+        </p:spPr>
+        <p:txBody>
+          <a:bodyPr lIns="68580" tIns="34290" rIns="68580" bIns="34290"/>
+          <a:lstStyle>
+            <a:lvl1pPr algn="ctr" defTabSz="457200" rtl="0" eaLnBrk="1" latinLnBrk="0" hangingPunct="1">
+              <a:spcBef>
+                <a:spcPct val="0"/>
+              </a:spcBef>
+              <a:buNone/>
+              <a:defRPr sz="4400" kern="1200">
+                <a:solidFill>
+                  <a:schemeClr val="tx1"/>
+                </a:solidFill>
+                <a:latin typeface="+mj-lt"/>
+                <a:ea typeface="+mj-ea"/>
+                <a:cs typeface="+mj-cs"/>
+              </a:defRPr>
+            </a:lvl1pPr>
+          </a:lstStyle>
+          <a:p>
+            <a:r>
+              <a:rPr lang="en-US" i="1" dirty="0" smtClean="0"/>
+              <a:t>Let’s analyze the technique, </a:t>
+            </a:r>
+            <a:br>
+              <a:rPr lang="en-US" i="1" dirty="0" smtClean="0"/>
+            </a:br>
+            <a:r>
+              <a:rPr lang="en-US" i="1" dirty="0" smtClean="0"/>
+              <a:t>step-by-step.</a:t>
+            </a:r>
+            <a:endParaRPr lang="it-IT" i="1" dirty="0"/>
+          </a:p>
+        </p:txBody>
+      </p:sp>
+    </p:spTree>
+    <p:extLst>
+      <p:ext uri="{BB962C8B-B14F-4D97-AF65-F5344CB8AC3E}">
+        <p14:creationId xmlns:p14="http://schemas.microsoft.com/office/powerpoint/2010/main" val="3050252604"/>
+      </p:ext>
+    </p:extLst>
+  </p:cSld>
+  <p:clrMapOvr>
+    <a:masterClrMapping/>
+  </p:clrMapOvr>
+  <p:timing>
+    <p:tnLst>
+      <p:par>
+        <p:cTn id="1" dur="indefinite" restart="never" nodeType="tmRoot"/>
+      </p:par>
+    </p:tnLst>
+  </p:timing>
+</p:sld>
+</file>
+
+<file path=ppt/slides/slide25.xml><?xml version="1.0" encoding="utf-8"?>
+<p:sld xmlns:a="http://schemas.openxmlformats.org/drawingml/2006/main" xmlns:r="http://schemas.openxmlformats.org/officeDocument/2006/relationships" xmlns:p="http://schemas.openxmlformats.org/presentationml/2006/main" showMasterSp="0">
+  <p:cSld>
+    <p:spTree>
+      <p:nvGrpSpPr>
+        <p:cNvPr id="1" name=""/>
+        <p:cNvGrpSpPr/>
+        <p:nvPr/>
+      </p:nvGrpSpPr>
+      <p:grpSpPr>
+        <a:xfrm>
+          <a:off x="0" y="0"/>
+          <a:ext cx="0" cy="0"/>
+          <a:chOff x="0" y="0"/>
+          <a:chExt cx="0" cy="0"/>
+        </a:xfrm>
+      </p:grpSpPr>
+      <p:sp>
+        <p:nvSpPr>
           <p:cNvPr id="4" name="Titolo 3"/>
           <p:cNvSpPr>
             <a:spLocks noGrp="1"/>
@@ -19628,7 +19944,7 @@
         </p:blipFill>
         <p:spPr>
           <a:xfrm>
-            <a:off x="824488" y="2569957"/>
+            <a:off x="783392" y="2487765"/>
             <a:ext cx="2756459" cy="338513"/>
           </a:xfrm>
           <a:prstGeom prst="rect">
@@ -19658,16 +19974,16 @@
         </p:blipFill>
         <p:spPr>
           <a:xfrm>
-            <a:off x="4608780" y="918948"/>
-            <a:ext cx="4061932" cy="3640534"/>
+            <a:off x="4592139" y="835200"/>
+            <a:ext cx="4071600" cy="3649198"/>
           </a:xfrm>
           <a:prstGeom prst="rect">
             <a:avLst/>
           </a:prstGeom>
         </p:spPr>
       </p:pic>
-      <mc:AlternateContent xmlns:mc="http://schemas.openxmlformats.org/markup-compatibility/2006" xmlns:p14="http://schemas.microsoft.com/office/powerpoint/2010/main">
-        <mc:Choice Requires="p14">
+      <mc:AlternateContent xmlns:mc="http://schemas.openxmlformats.org/markup-compatibility/2006">
+        <mc:Choice xmlns:p14="http://schemas.microsoft.com/office/powerpoint/2010/main" Requires="p14">
           <p:contentPart p14:bwMode="auto" r:id="rId4">
             <p14:nvContentPartPr>
               <p14:cNvPr id="16" name="Input penna 15"/>
@@ -19675,12 +19991,12 @@
               <p14:nvPr/>
             </p14:nvContentPartPr>
             <p14:xfrm>
-              <a:off x="1835680" y="2339431"/>
+              <a:off x="1794584" y="2257239"/>
               <a:ext cx="1662930" cy="728190"/>
             </p14:xfrm>
           </p:contentPart>
         </mc:Choice>
-        <mc:Fallback xmlns="">
+        <mc:Fallback>
           <p:pic>
             <p:nvPicPr>
               <p:cNvPr id="16" name="Input penna 15"/>
@@ -19695,8 +20011,8 @@
             </p:blipFill>
             <p:spPr>
               <a:xfrm>
-                <a:off x="2437493" y="3108081"/>
-                <a:ext cx="2239200" cy="993240"/>
+                <a:off x="1784503" y="2246080"/>
+                <a:ext cx="1684891" cy="750507"/>
               </a:xfrm>
               <a:prstGeom prst="rect">
                 <a:avLst/>
@@ -19705,8 +20021,8 @@
           </p:pic>
         </mc:Fallback>
       </mc:AlternateContent>
-      <mc:AlternateContent xmlns:mc="http://schemas.openxmlformats.org/markup-compatibility/2006" xmlns:p14="http://schemas.microsoft.com/office/powerpoint/2010/main">
-        <mc:Choice Requires="p14">
+      <mc:AlternateContent xmlns:mc="http://schemas.openxmlformats.org/markup-compatibility/2006">
+        <mc:Choice xmlns:p14="http://schemas.microsoft.com/office/powerpoint/2010/main" Requires="p14">
           <p:contentPart p14:bwMode="auto" r:id="rId6">
             <p14:nvContentPartPr>
               <p14:cNvPr id="19" name="Input penna 18"/>
@@ -19714,12 +20030,12 @@
               <p14:nvPr/>
             </p14:nvContentPartPr>
             <p14:xfrm>
-              <a:off x="2749630" y="1108771"/>
+              <a:off x="2708534" y="1026579"/>
               <a:ext cx="3133620" cy="1240650"/>
             </p14:xfrm>
           </p:contentPart>
         </mc:Choice>
-        <mc:Fallback xmlns="">
+        <mc:Fallback>
           <p:pic>
             <p:nvPicPr>
               <p:cNvPr id="19" name="Input penna 18"/>
@@ -19734,8 +20050,8 @@
             </p:blipFill>
             <p:spPr>
               <a:xfrm>
-                <a:off x="3659693" y="1469001"/>
-                <a:ext cx="4194000" cy="1668600"/>
+                <a:off x="2702054" y="1017218"/>
+                <a:ext cx="3149461" cy="1255051"/>
               </a:xfrm>
               <a:prstGeom prst="rect">
                 <a:avLst/>
@@ -19744,8 +20060,8 @@
           </p:pic>
         </mc:Fallback>
       </mc:AlternateContent>
-      <mc:AlternateContent xmlns:mc="http://schemas.openxmlformats.org/markup-compatibility/2006" xmlns:p14="http://schemas.microsoft.com/office/powerpoint/2010/main">
-        <mc:Choice Requires="p14">
+      <mc:AlternateContent xmlns:mc="http://schemas.openxmlformats.org/markup-compatibility/2006">
+        <mc:Choice xmlns:p14="http://schemas.microsoft.com/office/powerpoint/2010/main" Requires="p14">
           <p:contentPart p14:bwMode="auto" r:id="rId8">
             <p14:nvContentPartPr>
               <p14:cNvPr id="20" name="Input penna 19"/>
@@ -19753,12 +20069,12 @@
               <p14:nvPr/>
             </p14:nvContentPartPr>
             <p14:xfrm>
-              <a:off x="5840050" y="1105531"/>
+              <a:off x="5798954" y="1023339"/>
               <a:ext cx="509220" cy="336960"/>
             </p14:xfrm>
           </p:contentPart>
         </mc:Choice>
-        <mc:Fallback xmlns="">
+        <mc:Fallback>
           <p:pic>
             <p:nvPicPr>
               <p:cNvPr id="20" name="Input penna 19"/>
@@ -19773,8 +20089,8 @@
             </p:blipFill>
             <p:spPr>
               <a:xfrm>
-                <a:off x="7777373" y="1465761"/>
-                <a:ext cx="696600" cy="466200"/>
+                <a:off x="5789597" y="1015059"/>
+                <a:ext cx="526854" cy="353880"/>
               </a:xfrm>
               <a:prstGeom prst="rect">
                 <a:avLst/>
@@ -19800,7 +20116,7 @@
           <a:p>
             <a:fld id="{DA00CEBC-9AC0-446C-9417-17B7E0F2B36C}" type="slidenum">
               <a:rPr lang="it-IT" smtClean="0"/>
-              <a:t>24</a:t>
+              <a:t>25</a:t>
             </a:fld>
             <a:endParaRPr lang="it-IT"/>
           </a:p>
@@ -19983,6 +20299,204 @@
                       </p:childTnLst>
                     </p:cTn>
                   </p:par>
+                  <p:par>
+                    <p:cTn id="18" fill="hold">
+                      <p:stCondLst>
+                        <p:cond delay="indefinite"/>
+                      </p:stCondLst>
+                      <p:childTnLst>
+                        <p:par>
+                          <p:cTn id="19" fill="hold">
+                            <p:stCondLst>
+                              <p:cond delay="0"/>
+                            </p:stCondLst>
+                            <p:childTnLst>
+                              <p:par>
+                                <p:cTn id="20" presetID="10" presetClass="exit" presetSubtype="0" fill="hold" nodeType="clickEffect">
+                                  <p:stCondLst>
+                                    <p:cond delay="0"/>
+                                  </p:stCondLst>
+                                  <p:childTnLst>
+                                    <p:animEffect transition="out" filter="fade">
+                                      <p:cBhvr>
+                                        <p:cTn id="21" dur="500"/>
+                                        <p:tgtEl>
+                                          <p:spTgt spid="16"/>
+                                        </p:tgtEl>
+                                      </p:cBhvr>
+                                    </p:animEffect>
+                                    <p:set>
+                                      <p:cBhvr>
+                                        <p:cTn id="22" dur="1" fill="hold">
+                                          <p:stCondLst>
+                                            <p:cond delay="499"/>
+                                          </p:stCondLst>
+                                        </p:cTn>
+                                        <p:tgtEl>
+                                          <p:spTgt spid="16"/>
+                                        </p:tgtEl>
+                                        <p:attrNameLst>
+                                          <p:attrName>style.visibility</p:attrName>
+                                        </p:attrNameLst>
+                                      </p:cBhvr>
+                                      <p:to>
+                                        <p:strVal val="hidden"/>
+                                      </p:to>
+                                    </p:set>
+                                  </p:childTnLst>
+                                </p:cTn>
+                              </p:par>
+                              <p:par>
+                                <p:cTn id="23" presetID="10" presetClass="exit" presetSubtype="0" fill="hold" nodeType="withEffect">
+                                  <p:stCondLst>
+                                    <p:cond delay="0"/>
+                                  </p:stCondLst>
+                                  <p:childTnLst>
+                                    <p:animEffect transition="out" filter="fade">
+                                      <p:cBhvr>
+                                        <p:cTn id="24" dur="500"/>
+                                        <p:tgtEl>
+                                          <p:spTgt spid="19"/>
+                                        </p:tgtEl>
+                                      </p:cBhvr>
+                                    </p:animEffect>
+                                    <p:set>
+                                      <p:cBhvr>
+                                        <p:cTn id="25" dur="1" fill="hold">
+                                          <p:stCondLst>
+                                            <p:cond delay="499"/>
+                                          </p:stCondLst>
+                                        </p:cTn>
+                                        <p:tgtEl>
+                                          <p:spTgt spid="19"/>
+                                        </p:tgtEl>
+                                        <p:attrNameLst>
+                                          <p:attrName>style.visibility</p:attrName>
+                                        </p:attrNameLst>
+                                      </p:cBhvr>
+                                      <p:to>
+                                        <p:strVal val="hidden"/>
+                                      </p:to>
+                                    </p:set>
+                                  </p:childTnLst>
+                                </p:cTn>
+                              </p:par>
+                              <p:par>
+                                <p:cTn id="26" presetID="10" presetClass="exit" presetSubtype="0" fill="hold" nodeType="withEffect">
+                                  <p:stCondLst>
+                                    <p:cond delay="0"/>
+                                  </p:stCondLst>
+                                  <p:childTnLst>
+                                    <p:animEffect transition="out" filter="fade">
+                                      <p:cBhvr>
+                                        <p:cTn id="27" dur="500"/>
+                                        <p:tgtEl>
+                                          <p:spTgt spid="20"/>
+                                        </p:tgtEl>
+                                      </p:cBhvr>
+                                    </p:animEffect>
+                                    <p:set>
+                                      <p:cBhvr>
+                                        <p:cTn id="28" dur="1" fill="hold">
+                                          <p:stCondLst>
+                                            <p:cond delay="499"/>
+                                          </p:stCondLst>
+                                        </p:cTn>
+                                        <p:tgtEl>
+                                          <p:spTgt spid="20"/>
+                                        </p:tgtEl>
+                                        <p:attrNameLst>
+                                          <p:attrName>style.visibility</p:attrName>
+                                        </p:attrNameLst>
+                                      </p:cBhvr>
+                                      <p:to>
+                                        <p:strVal val="hidden"/>
+                                      </p:to>
+                                    </p:set>
+                                  </p:childTnLst>
+                                </p:cTn>
+                              </p:par>
+                              <p:par>
+                                <p:cTn id="29" presetID="10" presetClass="exit" presetSubtype="0" fill="hold" nodeType="withEffect">
+                                  <p:stCondLst>
+                                    <p:cond delay="0"/>
+                                  </p:stCondLst>
+                                  <p:childTnLst>
+                                    <p:animEffect transition="out" filter="fade">
+                                      <p:cBhvr>
+                                        <p:cTn id="30" dur="500"/>
+                                        <p:tgtEl>
+                                          <p:spTgt spid="6"/>
+                                        </p:tgtEl>
+                                      </p:cBhvr>
+                                    </p:animEffect>
+                                    <p:set>
+                                      <p:cBhvr>
+                                        <p:cTn id="31" dur="1" fill="hold">
+                                          <p:stCondLst>
+                                            <p:cond delay="499"/>
+                                          </p:stCondLst>
+                                        </p:cTn>
+                                        <p:tgtEl>
+                                          <p:spTgt spid="6"/>
+                                        </p:tgtEl>
+                                        <p:attrNameLst>
+                                          <p:attrName>style.visibility</p:attrName>
+                                        </p:attrNameLst>
+                                      </p:cBhvr>
+                                      <p:to>
+                                        <p:strVal val="hidden"/>
+                                      </p:to>
+                                    </p:set>
+                                  </p:childTnLst>
+                                </p:cTn>
+                              </p:par>
+                            </p:childTnLst>
+                          </p:cTn>
+                        </p:par>
+                      </p:childTnLst>
+                    </p:cTn>
+                  </p:par>
+                  <p:par>
+                    <p:cTn id="32" fill="hold">
+                      <p:stCondLst>
+                        <p:cond delay="indefinite"/>
+                      </p:stCondLst>
+                      <p:childTnLst>
+                        <p:par>
+                          <p:cTn id="33" fill="hold">
+                            <p:stCondLst>
+                              <p:cond delay="0"/>
+                            </p:stCondLst>
+                            <p:childTnLst>
+                              <p:par>
+                                <p:cTn id="34" presetID="35" presetClass="path" presetSubtype="0" accel="50000" decel="50000" fill="hold" nodeType="clickEffect">
+                                  <p:stCondLst>
+                                    <p:cond delay="0"/>
+                                  </p:stCondLst>
+                                  <p:childTnLst>
+                                    <p:animMotion origin="layout" path="M 3.61111E-6 4.69136E-6 L -0.41702 4.69136E-6 " pathEditMode="relative" rAng="0" ptsTypes="AA">
+                                      <p:cBhvr>
+                                        <p:cTn id="35" dur="2000" fill="hold"/>
+                                        <p:tgtEl>
+                                          <p:spTgt spid="7"/>
+                                        </p:tgtEl>
+                                        <p:attrNameLst>
+                                          <p:attrName>ppt_x</p:attrName>
+                                          <p:attrName>ppt_y</p:attrName>
+                                        </p:attrNameLst>
+                                      </p:cBhvr>
+                                      <p:rCtr x="-20851" y="0"/>
+                                    </p:animMotion>
+                                  </p:childTnLst>
+                                </p:cTn>
+                              </p:par>
+                            </p:childTnLst>
+                          </p:cTn>
+                        </p:par>
+                      </p:childTnLst>
+                    </p:cTn>
+                  </p:par>
                 </p:childTnLst>
               </p:cTn>
               <p:prevCondLst>
@@ -20008,7 +20522,7 @@
 </p:sld>
 </file>
 
-<file path=ppt/slides/slide25.xml><?xml version="1.0" encoding="utf-8"?>
+<file path=ppt/slides/slide26.xml><?xml version="1.0" encoding="utf-8"?>
 <p:sld xmlns:a="http://schemas.openxmlformats.org/drawingml/2006/main" xmlns:r="http://schemas.openxmlformats.org/officeDocument/2006/relationships" xmlns:p="http://schemas.openxmlformats.org/presentationml/2006/main" showMasterSp="0">
   <p:cSld>
     <p:spTree>
@@ -20076,16 +20590,16 @@
         </p:blipFill>
         <p:spPr>
           <a:xfrm>
-            <a:off x="782428" y="917194"/>
-            <a:ext cx="4009406" cy="3593456"/>
+            <a:off x="782427" y="834934"/>
+            <a:ext cx="4072037" cy="3649589"/>
           </a:xfrm>
           <a:prstGeom prst="rect">
             <a:avLst/>
           </a:prstGeom>
         </p:spPr>
       </p:pic>
-      <mc:AlternateContent xmlns:mc="http://schemas.openxmlformats.org/markup-compatibility/2006" xmlns:p14="http://schemas.microsoft.com/office/powerpoint/2010/main">
-        <mc:Choice Requires="p14">
+      <mc:AlternateContent xmlns:mc="http://schemas.openxmlformats.org/markup-compatibility/2006">
+        <mc:Choice xmlns:p14="http://schemas.microsoft.com/office/powerpoint/2010/main" Requires="p14">
           <p:contentPart p14:bwMode="auto" r:id="rId3">
             <p14:nvContentPartPr>
               <p14:cNvPr id="20" name="Input penna 19"/>
@@ -20093,12 +20607,12 @@
               <p14:nvPr/>
             </p14:nvContentPartPr>
             <p14:xfrm>
-              <a:off x="1730668" y="1407712"/>
-              <a:ext cx="2107350" cy="400140"/>
+              <a:off x="1730668" y="1329333"/>
+              <a:ext cx="2107350" cy="365284"/>
             </p14:xfrm>
           </p:contentPart>
         </mc:Choice>
-        <mc:Fallback xmlns="">
+        <mc:Fallback>
           <p:pic>
             <p:nvPicPr>
               <p:cNvPr id="20" name="Input penna 19"/>
@@ -20113,8 +20627,8 @@
             </p:blipFill>
             <p:spPr>
               <a:xfrm>
-                <a:off x="2294595" y="1868315"/>
-                <a:ext cx="2837524" cy="557264"/>
+                <a:off x="1717709" y="1320336"/>
+                <a:ext cx="2135069" cy="389756"/>
               </a:xfrm>
               <a:prstGeom prst="rect">
                 <a:avLst/>
@@ -20123,8 +20637,8 @@
           </p:pic>
         </mc:Fallback>
       </mc:AlternateContent>
-      <mc:AlternateContent xmlns:mc="http://schemas.openxmlformats.org/markup-compatibility/2006" xmlns:p14="http://schemas.microsoft.com/office/powerpoint/2010/main">
-        <mc:Choice Requires="p14">
+      <mc:AlternateContent xmlns:mc="http://schemas.openxmlformats.org/markup-compatibility/2006">
+        <mc:Choice xmlns:p14="http://schemas.microsoft.com/office/powerpoint/2010/main" Requires="p14">
           <p:contentPart p14:bwMode="auto" r:id="rId5">
             <p14:nvContentPartPr>
               <p14:cNvPr id="35" name="Input penna 34"/>
@@ -20132,12 +20646,12 @@
               <p14:nvPr/>
             </p14:nvContentPartPr>
             <p14:xfrm>
-              <a:off x="2015248" y="2498384"/>
+              <a:off x="2015248" y="2428715"/>
               <a:ext cx="2155680" cy="338580"/>
             </p14:xfrm>
           </p:contentPart>
         </mc:Choice>
-        <mc:Fallback xmlns="">
+        <mc:Fallback>
           <p:pic>
             <p:nvPicPr>
               <p:cNvPr id="35" name="Input penna 34"/>
@@ -20152,8 +20666,8 @@
             </p:blipFill>
             <p:spPr>
               <a:xfrm>
-                <a:off x="2675120" y="3318051"/>
-                <a:ext cx="2899794" cy="478424"/>
+                <a:off x="2003368" y="2415762"/>
+                <a:ext cx="2181240" cy="365206"/>
               </a:xfrm>
               <a:prstGeom prst="rect">
                 <a:avLst/>
@@ -20201,8 +20715,8 @@
           </p:pic>
         </mc:Fallback>
       </mc:AlternateContent>
-      <mc:AlternateContent xmlns:mc="http://schemas.openxmlformats.org/markup-compatibility/2006" xmlns:p14="http://schemas.microsoft.com/office/powerpoint/2010/main">
-        <mc:Choice Requires="p14">
+      <mc:AlternateContent xmlns:mc="http://schemas.openxmlformats.org/markup-compatibility/2006">
+        <mc:Choice xmlns:p14="http://schemas.microsoft.com/office/powerpoint/2010/main" Requires="p14">
           <p:contentPart p14:bwMode="auto" r:id="rId9">
             <p14:nvContentPartPr>
               <p14:cNvPr id="50" name="Input penna 49"/>
@@ -20210,12 +20724,12 @@
               <p14:nvPr/>
             </p14:nvContentPartPr>
             <p14:xfrm>
-              <a:off x="1730668" y="2975823"/>
+              <a:off x="1730668" y="2923570"/>
               <a:ext cx="3405240" cy="646739"/>
             </p14:xfrm>
           </p:contentPart>
         </mc:Choice>
-        <mc:Fallback xmlns="">
+        <mc:Fallback>
           <p:pic>
             <p:nvPicPr>
               <p:cNvPr id="50" name="Input penna 49"/>
@@ -20230,8 +20744,8 @@
             </p:blipFill>
             <p:spPr>
               <a:xfrm>
-                <a:off x="2296399" y="3959482"/>
-                <a:ext cx="4564076" cy="884281"/>
+                <a:off x="1719508" y="2915292"/>
+                <a:ext cx="3429000" cy="668333"/>
               </a:xfrm>
               <a:prstGeom prst="rect">
                 <a:avLst/>
@@ -20240,8 +20754,8 @@
           </p:pic>
         </mc:Fallback>
       </mc:AlternateContent>
-      <mc:AlternateContent xmlns:mc="http://schemas.openxmlformats.org/markup-compatibility/2006" xmlns:p14="http://schemas.microsoft.com/office/powerpoint/2010/main">
-        <mc:Choice Requires="p14">
+      <mc:AlternateContent xmlns:mc="http://schemas.openxmlformats.org/markup-compatibility/2006">
+        <mc:Choice xmlns:p14="http://schemas.microsoft.com/office/powerpoint/2010/main" Requires="p14">
           <p:contentPart p14:bwMode="auto" r:id="rId11">
             <p14:nvContentPartPr>
               <p14:cNvPr id="55" name="Input penna 54"/>
@@ -20249,12 +20763,12 @@
               <p14:nvPr/>
             </p14:nvContentPartPr>
             <p14:xfrm>
-              <a:off x="1800309" y="2961513"/>
+              <a:off x="1800309" y="2909260"/>
               <a:ext cx="3467631" cy="44021"/>
             </p14:xfrm>
           </p:contentPart>
         </mc:Choice>
-        <mc:Fallback xmlns="">
+        <mc:Fallback>
           <p:pic>
             <p:nvPicPr>
               <p:cNvPr id="55" name="Input penna 54"/>
@@ -20269,8 +20783,8 @@
             </p:blipFill>
             <p:spPr>
               <a:xfrm>
-                <a:off x="2392129" y="3937089"/>
-                <a:ext cx="4641868" cy="79708"/>
+                <a:off x="1792029" y="2897807"/>
+                <a:ext cx="3485992" cy="65137"/>
               </a:xfrm>
               <a:prstGeom prst="rect">
                 <a:avLst/>
@@ -20279,8 +20793,8 @@
           </p:pic>
         </mc:Fallback>
       </mc:AlternateContent>
-      <mc:AlternateContent xmlns:mc="http://schemas.openxmlformats.org/markup-compatibility/2006" xmlns:p14="http://schemas.microsoft.com/office/powerpoint/2010/main">
-        <mc:Choice Requires="p14">
+      <mc:AlternateContent xmlns:mc="http://schemas.openxmlformats.org/markup-compatibility/2006">
+        <mc:Choice xmlns:p14="http://schemas.microsoft.com/office/powerpoint/2010/main" Requires="p14">
           <p:contentPart p14:bwMode="auto" r:id="rId13">
             <p14:nvContentPartPr>
               <p14:cNvPr id="87" name="Input penna 86"/>
@@ -20288,12 +20802,12 @@
               <p14:nvPr/>
             </p14:nvContentPartPr>
             <p14:xfrm>
-              <a:off x="6894918" y="1336946"/>
+              <a:off x="6894918" y="1275985"/>
               <a:ext cx="378810" cy="436050"/>
             </p14:xfrm>
           </p:contentPart>
         </mc:Choice>
-        <mc:Fallback xmlns="">
+        <mc:Fallback>
           <p:pic>
             <p:nvPicPr>
               <p:cNvPr id="87" name="Input penna 86"/>
@@ -20308,8 +20822,8 @@
             </p:blipFill>
             <p:spPr>
               <a:xfrm>
-                <a:off x="9187464" y="1771795"/>
-                <a:ext cx="521640" cy="604080"/>
+                <a:off x="6889157" y="1265192"/>
+                <a:ext cx="395374" cy="458716"/>
               </a:xfrm>
               <a:prstGeom prst="rect">
                 <a:avLst/>
@@ -20318,8 +20832,8 @@
           </p:pic>
         </mc:Fallback>
       </mc:AlternateContent>
-      <mc:AlternateContent xmlns:mc="http://schemas.openxmlformats.org/markup-compatibility/2006" xmlns:p14="http://schemas.microsoft.com/office/powerpoint/2010/main">
-        <mc:Choice Requires="p14">
+      <mc:AlternateContent xmlns:mc="http://schemas.openxmlformats.org/markup-compatibility/2006">
+        <mc:Choice xmlns:p14="http://schemas.microsoft.com/office/powerpoint/2010/main" Requires="p14">
           <p:contentPart p14:bwMode="auto" r:id="rId15">
             <p14:nvContentPartPr>
               <p14:cNvPr id="88" name="Input penna 87"/>
@@ -20327,12 +20841,12 @@
               <p14:nvPr/>
             </p14:nvContentPartPr>
             <p14:xfrm>
-              <a:off x="4021848" y="1314266"/>
+              <a:off x="4021848" y="1279430"/>
               <a:ext cx="2217510" cy="503010"/>
             </p14:xfrm>
           </p:contentPart>
         </mc:Choice>
-        <mc:Fallback xmlns="">
+        <mc:Fallback>
           <p:pic>
             <p:nvPicPr>
               <p:cNvPr id="88" name="Input penna 87"/>
@@ -20347,8 +20861,8 @@
             </p:blipFill>
             <p:spPr>
               <a:xfrm>
-                <a:off x="5357424" y="1748035"/>
-                <a:ext cx="2968920" cy="680040"/>
+                <a:off x="4016808" y="1275109"/>
+                <a:ext cx="2229750" cy="512372"/>
               </a:xfrm>
               <a:prstGeom prst="rect">
                 <a:avLst/>
@@ -20357,8 +20871,8 @@
           </p:pic>
         </mc:Fallback>
       </mc:AlternateContent>
-      <mc:AlternateContent xmlns:mc="http://schemas.openxmlformats.org/markup-compatibility/2006" xmlns:p14="http://schemas.microsoft.com/office/powerpoint/2010/main">
-        <mc:Choice Requires="p14">
+      <mc:AlternateContent xmlns:mc="http://schemas.openxmlformats.org/markup-compatibility/2006">
+        <mc:Choice xmlns:p14="http://schemas.microsoft.com/office/powerpoint/2010/main" Requires="p14">
           <p:contentPart p14:bwMode="auto" r:id="rId17">
             <p14:nvContentPartPr>
               <p14:cNvPr id="89" name="Input penna 88"/>
@@ -20366,12 +20880,12 @@
               <p14:nvPr/>
             </p14:nvContentPartPr>
             <p14:xfrm>
-              <a:off x="4004028" y="1504886"/>
+              <a:off x="4004028" y="1426508"/>
               <a:ext cx="1247670" cy="207900"/>
             </p14:xfrm>
           </p:contentPart>
         </mc:Choice>
-        <mc:Fallback xmlns="">
+        <mc:Fallback>
           <p:pic>
             <p:nvPicPr>
               <p:cNvPr id="89" name="Input penna 88"/>
@@ -20386,8 +20900,8 @@
             </p:blipFill>
             <p:spPr>
               <a:xfrm>
-                <a:off x="5331504" y="1994995"/>
-                <a:ext cx="1682640" cy="297720"/>
+                <a:off x="3996829" y="1414978"/>
+                <a:ext cx="1266749" cy="228438"/>
               </a:xfrm>
               <a:prstGeom prst="rect">
                 <a:avLst/>
@@ -20396,8 +20910,8 @@
           </p:pic>
         </mc:Fallback>
       </mc:AlternateContent>
-      <mc:AlternateContent xmlns:mc="http://schemas.openxmlformats.org/markup-compatibility/2006" xmlns:p14="http://schemas.microsoft.com/office/powerpoint/2010/main">
-        <mc:Choice Requires="p14">
+      <mc:AlternateContent xmlns:mc="http://schemas.openxmlformats.org/markup-compatibility/2006">
+        <mc:Choice xmlns:p14="http://schemas.microsoft.com/office/powerpoint/2010/main" Requires="p14">
           <p:contentPart p14:bwMode="auto" r:id="rId19">
             <p14:nvContentPartPr>
               <p14:cNvPr id="90" name="Input penna 89"/>
@@ -20405,12 +20919,12 @@
               <p14:nvPr/>
             </p14:nvContentPartPr>
             <p14:xfrm>
-              <a:off x="6876058" y="2280764"/>
+              <a:off x="6876058" y="2211095"/>
               <a:ext cx="496260" cy="594000"/>
             </p14:xfrm>
           </p:contentPart>
         </mc:Choice>
-        <mc:Fallback xmlns="">
+        <mc:Fallback>
           <p:pic>
             <p:nvPicPr>
               <p:cNvPr id="90" name="Input penna 89"/>
@@ -20425,8 +20939,8 @@
             </p:blipFill>
             <p:spPr>
               <a:xfrm>
-                <a:off x="9159802" y="3029888"/>
-                <a:ext cx="681109" cy="814259"/>
+                <a:off x="6867421" y="2199935"/>
+                <a:ext cx="516053" cy="616320"/>
               </a:xfrm>
               <a:prstGeom prst="rect">
                 <a:avLst/>
@@ -20435,8 +20949,8 @@
           </p:pic>
         </mc:Fallback>
       </mc:AlternateContent>
-      <mc:AlternateContent xmlns:mc="http://schemas.openxmlformats.org/markup-compatibility/2006" xmlns:p14="http://schemas.microsoft.com/office/powerpoint/2010/main">
-        <mc:Choice Requires="p14">
+      <mc:AlternateContent xmlns:mc="http://schemas.openxmlformats.org/markup-compatibility/2006">
+        <mc:Choice xmlns:p14="http://schemas.microsoft.com/office/powerpoint/2010/main" Requires="p14">
           <p:contentPart p14:bwMode="auto" r:id="rId21">
             <p14:nvContentPartPr>
               <p14:cNvPr id="91" name="Input penna 90"/>
@@ -20444,12 +20958,12 @@
               <p14:nvPr/>
             </p14:nvContentPartPr>
             <p14:xfrm>
-              <a:off x="4340488" y="2437094"/>
+              <a:off x="4340488" y="2367425"/>
               <a:ext cx="2041740" cy="345060"/>
             </p14:xfrm>
           </p:contentPart>
         </mc:Choice>
-        <mc:Fallback xmlns="">
+        <mc:Fallback>
           <p:pic>
             <p:nvPicPr>
               <p:cNvPr id="91" name="Input penna 90"/>
@@ -20464,8 +20978,8 @@
             </p:blipFill>
             <p:spPr>
               <a:xfrm>
-                <a:off x="5779397" y="3242618"/>
-                <a:ext cx="2736360" cy="475200"/>
+                <a:off x="4332569" y="2360589"/>
+                <a:ext cx="2055779" cy="360172"/>
               </a:xfrm>
               <a:prstGeom prst="rect">
                 <a:avLst/>
@@ -20474,8 +20988,8 @@
           </p:pic>
         </mc:Fallback>
       </mc:AlternateContent>
-      <mc:AlternateContent xmlns:mc="http://schemas.openxmlformats.org/markup-compatibility/2006" xmlns:p14="http://schemas.microsoft.com/office/powerpoint/2010/main">
-        <mc:Choice Requires="p14">
+      <mc:AlternateContent xmlns:mc="http://schemas.openxmlformats.org/markup-compatibility/2006">
+        <mc:Choice xmlns:p14="http://schemas.microsoft.com/office/powerpoint/2010/main" Requires="p14">
           <p:contentPart p14:bwMode="auto" r:id="rId23">
             <p14:nvContentPartPr>
               <p14:cNvPr id="92" name="Input penna 91"/>
@@ -20483,12 +20997,12 @@
               <p14:nvPr/>
             </p14:nvContentPartPr>
             <p14:xfrm>
-              <a:off x="5123315" y="3012274"/>
+              <a:off x="5123315" y="2960021"/>
               <a:ext cx="181075" cy="633341"/>
             </p14:xfrm>
           </p:contentPart>
         </mc:Choice>
-        <mc:Fallback xmlns="">
+        <mc:Fallback>
           <p:pic>
             <p:nvPicPr>
               <p:cNvPr id="92" name="Input penna 91"/>
@@ -20503,8 +21017,8 @@
             </p:blipFill>
             <p:spPr>
               <a:xfrm>
-                <a:off x="6820028" y="4010241"/>
-                <a:ext cx="256054" cy="861740"/>
+                <a:off x="5112155" y="2953904"/>
+                <a:ext cx="195835" cy="650614"/>
               </a:xfrm>
               <a:prstGeom prst="rect">
                 <a:avLst/>
@@ -20569,7 +21083,7 @@
           <a:p>
             <a:fld id="{DA00CEBC-9AC0-446C-9417-17B7E0F2B36C}" type="slidenum">
               <a:rPr lang="it-IT" smtClean="0"/>
-              <a:t>25</a:t>
+              <a:t>26</a:t>
             </a:fld>
             <a:endParaRPr lang="it-IT"/>
           </a:p>
@@ -21339,7 +21853,7 @@
 </p:sld>
 </file>
 
-<file path=ppt/slides/slide26.xml><?xml version="1.0" encoding="utf-8"?>
+<file path=ppt/slides/slide27.xml><?xml version="1.0" encoding="utf-8"?>
 <p:sld xmlns:a="http://schemas.openxmlformats.org/drawingml/2006/main" xmlns:r="http://schemas.openxmlformats.org/officeDocument/2006/relationships" xmlns:p="http://schemas.openxmlformats.org/presentationml/2006/main" showMasterSp="0">
   <p:cSld>
     <p:spTree>
@@ -22004,7 +22518,7 @@
           <a:p>
             <a:fld id="{DA00CEBC-9AC0-446C-9417-17B7E0F2B36C}" type="slidenum">
               <a:rPr lang="it-IT" smtClean="0"/>
-              <a:t>26</a:t>
+              <a:t>27</a:t>
             </a:fld>
             <a:endParaRPr lang="it-IT"/>
           </a:p>
@@ -22926,7 +23440,7 @@
 </p:sld>
 </file>
 
-<file path=ppt/slides/slide27.xml><?xml version="1.0" encoding="utf-8"?>
+<file path=ppt/slides/slide28.xml><?xml version="1.0" encoding="utf-8"?>
 <p:sld xmlns:a="http://schemas.openxmlformats.org/drawingml/2006/main" xmlns:r="http://schemas.openxmlformats.org/officeDocument/2006/relationships" xmlns:p="http://schemas.openxmlformats.org/presentationml/2006/main" showMasterSp="0">
   <p:cSld>
     <p:spTree>
@@ -23277,7 +23791,7 @@
           <a:p>
             <a:fld id="{DA00CEBC-9AC0-446C-9417-17B7E0F2B36C}" type="slidenum">
               <a:rPr lang="it-IT" smtClean="0"/>
-              <a:t>27</a:t>
+              <a:t>28</a:t>
             </a:fld>
             <a:endParaRPr lang="it-IT"/>
           </a:p>
@@ -23656,113 +24170,6 @@
 </p:sld>
 </file>
 
-<file path=ppt/slides/slide28.xml><?xml version="1.0" encoding="utf-8"?>
-<p:sld xmlns:a="http://schemas.openxmlformats.org/drawingml/2006/main" xmlns:r="http://schemas.openxmlformats.org/officeDocument/2006/relationships" xmlns:p="http://schemas.openxmlformats.org/presentationml/2006/main">
-  <p:cSld>
-    <p:spTree>
-      <p:nvGrpSpPr>
-        <p:cNvPr id="1" name=""/>
-        <p:cNvGrpSpPr/>
-        <p:nvPr/>
-      </p:nvGrpSpPr>
-      <p:grpSpPr>
-        <a:xfrm>
-          <a:off x="0" y="0"/>
-          <a:ext cx="0" cy="0"/>
-          <a:chOff x="0" y="0"/>
-          <a:chExt cx="0" cy="0"/>
-        </a:xfrm>
-      </p:grpSpPr>
-      <p:sp>
-        <p:nvSpPr>
-          <p:cNvPr id="5" name="Title 4"/>
-          <p:cNvSpPr>
-            <a:spLocks noGrp="1"/>
-          </p:cNvSpPr>
-          <p:nvPr>
-            <p:ph type="title"/>
-          </p:nvPr>
-        </p:nvSpPr>
-        <p:spPr/>
-        <p:txBody>
-          <a:bodyPr lIns="68580" tIns="34290" rIns="68580" bIns="34290"/>
-          <a:lstStyle/>
-          <a:p>
-            <a:r>
-              <a:rPr lang="en-US" dirty="0"/>
-              <a:t>code();</a:t>
-            </a:r>
-            <a:endParaRPr lang="it-IT" dirty="0"/>
-          </a:p>
-        </p:txBody>
-      </p:sp>
-      <p:sp>
-        <p:nvSpPr>
-          <p:cNvPr id="6" name="Text Placeholder 5"/>
-          <p:cNvSpPr>
-            <a:spLocks noGrp="1"/>
-          </p:cNvSpPr>
-          <p:nvPr>
-            <p:ph type="body" idx="1"/>
-          </p:nvPr>
-        </p:nvSpPr>
-        <p:spPr/>
-        <p:txBody>
-          <a:bodyPr lIns="68580" tIns="34290" rIns="68580" bIns="34290"/>
-          <a:lstStyle/>
-          <a:p>
-            <a:endParaRPr lang="it-IT"/>
-          </a:p>
-        </p:txBody>
-      </p:sp>
-      <p:sp>
-        <p:nvSpPr>
-          <p:cNvPr id="4" name="Slide Number Placeholder 3"/>
-          <p:cNvSpPr>
-            <a:spLocks noGrp="1"/>
-          </p:cNvSpPr>
-          <p:nvPr>
-            <p:ph type="sldNum" sz="quarter" idx="12"/>
-          </p:nvPr>
-        </p:nvSpPr>
-        <p:spPr>
-          <a:xfrm>
-            <a:off x="6553200" y="4485912"/>
-            <a:ext cx="2133600" cy="274637"/>
-          </a:xfrm>
-        </p:spPr>
-        <p:txBody>
-          <a:bodyPr lIns="68580" tIns="34290" rIns="68580" bIns="34290"/>
-          <a:lstStyle/>
-          <a:p>
-            <a:fld id="{DA00CEBC-9AC0-446C-9417-17B7E0F2B36C}" type="slidenum">
-              <a:rPr lang="it-IT" smtClean="0"/>
-              <a:t>28</a:t>
-            </a:fld>
-            <a:endParaRPr lang="it-IT" dirty="0"/>
-          </a:p>
-        </p:txBody>
-      </p:sp>
-    </p:spTree>
-    <p:extLst>
-      <p:ext uri="{BB962C8B-B14F-4D97-AF65-F5344CB8AC3E}">
-        <p14:creationId xmlns:p14="http://schemas.microsoft.com/office/powerpoint/2010/main" val="1307489908"/>
-      </p:ext>
-    </p:extLst>
-  </p:cSld>
-  <p:clrMapOvr>
-    <a:masterClrMapping/>
-  </p:clrMapOvr>
-  <p:timing>
-    <p:tnLst>
-      <p:par>
-        <p:cTn id="1" dur="indefinite" restart="never" nodeType="tmRoot"/>
-      </p:par>
-    </p:tnLst>
-  </p:timing>
-</p:sld>
-</file>
-
 <file path=ppt/slides/slide29.xml><?xml version="1.0" encoding="utf-8"?>
 <p:sld xmlns:a="http://schemas.openxmlformats.org/drawingml/2006/main" xmlns:r="http://schemas.openxmlformats.org/officeDocument/2006/relationships" xmlns:p="http://schemas.openxmlformats.org/presentationml/2006/main">
   <p:cSld>
@@ -23782,178 +24189,49 @@
       </p:grpSpPr>
       <p:sp>
         <p:nvSpPr>
-          <p:cNvPr id="4" name="Content Placeholder 3"/>
+          <p:cNvPr id="5" name="Title 4"/>
           <p:cNvSpPr>
             <a:spLocks noGrp="1"/>
           </p:cNvSpPr>
           <p:nvPr>
-            <p:ph idx="1"/>
+            <p:ph type="title"/>
           </p:nvPr>
         </p:nvSpPr>
-        <p:spPr>
-          <a:xfrm>
-            <a:off x="628650" y="608164"/>
-            <a:ext cx="7886700" cy="3562313"/>
-          </a:xfrm>
-        </p:spPr>
+        <p:spPr/>
         <p:txBody>
-          <a:bodyPr lIns="68580" tIns="34290" rIns="68580" bIns="34290">
-            <a:normAutofit fontScale="85000" lnSpcReduction="20000"/>
-          </a:bodyPr>
+          <a:bodyPr lIns="68580" tIns="34290" rIns="68580" bIns="34290"/>
           <a:lstStyle/>
           <a:p>
-            <a:pPr marL="0" indent="0" algn="ctr">
-              <a:buNone/>
-            </a:pPr>
-            <a:r>
-              <a:rPr lang="it-IT" sz="4500" b="1" dirty="0" err="1"/>
-              <a:t>Questions</a:t>
-            </a:r>
-            <a:r>
-              <a:rPr lang="it-IT" sz="4500" b="1" dirty="0"/>
-              <a:t>?</a:t>
-            </a:r>
-          </a:p>
-          <a:p>
-            <a:pPr marL="0" indent="0" algn="ctr">
-              <a:buNone/>
-            </a:pPr>
-            <a:endParaRPr lang="it-IT" dirty="0">
-              <a:latin typeface="Consolas" panose="020B0609020204030204" pitchFamily="49" charset="0"/>
-              <a:cs typeface="Consolas" panose="020B0609020204030204" pitchFamily="49" charset="0"/>
-              <a:hlinkClick r:id=""/>
-            </a:endParaRPr>
-          </a:p>
-          <a:p>
-            <a:pPr marL="0" indent="0" algn="ctr">
-              <a:lnSpc>
-                <a:spcPct val="150000"/>
-              </a:lnSpc>
-              <a:buNone/>
-            </a:pPr>
-            <a:r>
-              <a:rPr lang="it-IT" dirty="0">
-                <a:latin typeface="Consolas" panose="020B0609020204030204" pitchFamily="49" charset="0"/>
-                <a:cs typeface="Consolas" panose="020B0609020204030204" pitchFamily="49" charset="0"/>
-                <a:hlinkClick r:id=""/>
-              </a:rPr>
-              <a:t>http://</a:t>
-            </a:r>
-            <a:r>
-              <a:rPr lang="it-IT" b="1" dirty="0">
-                <a:latin typeface="Consolas" panose="020B0609020204030204" pitchFamily="49" charset="0"/>
-                <a:cs typeface="Consolas" panose="020B0609020204030204" pitchFamily="49" charset="0"/>
-                <a:hlinkClick r:id="rId3"/>
-              </a:rPr>
-              <a:t>vittorioromeo.info</a:t>
-            </a:r>
-            <a:r>
-              <a:rPr lang="it-IT" dirty="0">
-                <a:latin typeface="Consolas" panose="020B0609020204030204" pitchFamily="49" charset="0"/>
-                <a:cs typeface="Consolas" panose="020B0609020204030204" pitchFamily="49" charset="0"/>
-              </a:rPr>
-              <a:t/>
-            </a:r>
-            <a:br>
-              <a:rPr lang="it-IT" dirty="0">
-                <a:latin typeface="Consolas" panose="020B0609020204030204" pitchFamily="49" charset="0"/>
-                <a:cs typeface="Consolas" panose="020B0609020204030204" pitchFamily="49" charset="0"/>
-              </a:rPr>
-            </a:br>
-            <a:r>
-              <a:rPr lang="it-IT" b="1" dirty="0">
-                <a:latin typeface="Consolas" panose="020B0609020204030204" pitchFamily="49" charset="0"/>
-                <a:cs typeface="Consolas" panose="020B0609020204030204" pitchFamily="49" charset="0"/>
-                <a:hlinkClick r:id="rId4"/>
-              </a:rPr>
-              <a:t>vittorio.romeo</a:t>
-            </a:r>
-            <a:r>
-              <a:rPr lang="it-IT" dirty="0">
-                <a:latin typeface="Consolas" panose="020B0609020204030204" pitchFamily="49" charset="0"/>
-                <a:cs typeface="Consolas" panose="020B0609020204030204" pitchFamily="49" charset="0"/>
-                <a:hlinkClick r:id="rId4"/>
-              </a:rPr>
-              <a:t>@outlook.com</a:t>
-            </a:r>
-            <a:r>
-              <a:rPr lang="it-IT" dirty="0">
-                <a:latin typeface="Consolas" panose="020B0609020204030204" pitchFamily="49" charset="0"/>
-                <a:cs typeface="Consolas" panose="020B0609020204030204" pitchFamily="49" charset="0"/>
-              </a:rPr>
-              <a:t/>
-            </a:r>
-            <a:br>
-              <a:rPr lang="it-IT" dirty="0">
-                <a:latin typeface="Consolas" panose="020B0609020204030204" pitchFamily="49" charset="0"/>
-                <a:cs typeface="Consolas" panose="020B0609020204030204" pitchFamily="49" charset="0"/>
-              </a:rPr>
-            </a:br>
-            <a:r>
-              <a:rPr lang="it-IT" dirty="0">
-                <a:latin typeface="Consolas" panose="020B0609020204030204" pitchFamily="49" charset="0"/>
-                <a:cs typeface="Consolas" panose="020B0609020204030204" pitchFamily="49" charset="0"/>
-                <a:hlinkClick r:id="rId5"/>
-              </a:rPr>
-              <a:t>http://github.com/</a:t>
-            </a:r>
-            <a:r>
-              <a:rPr lang="it-IT" b="1" dirty="0">
-                <a:latin typeface="Consolas" panose="020B0609020204030204" pitchFamily="49" charset="0"/>
-                <a:cs typeface="Consolas" panose="020B0609020204030204" pitchFamily="49" charset="0"/>
-                <a:hlinkClick r:id="rId5"/>
-              </a:rPr>
-              <a:t>SuperV1234</a:t>
-            </a:r>
-            <a:r>
-              <a:rPr lang="it-IT" dirty="0">
-                <a:latin typeface="Consolas" panose="020B0609020204030204" pitchFamily="49" charset="0"/>
-                <a:cs typeface="Consolas" panose="020B0609020204030204" pitchFamily="49" charset="0"/>
-              </a:rPr>
-              <a:t/>
-            </a:r>
-            <a:br>
-              <a:rPr lang="it-IT" dirty="0">
-                <a:latin typeface="Consolas" panose="020B0609020204030204" pitchFamily="49" charset="0"/>
-                <a:cs typeface="Consolas" panose="020B0609020204030204" pitchFamily="49" charset="0"/>
-              </a:rPr>
-            </a:br>
-            <a:endParaRPr lang="it-IT" sz="4500" dirty="0"/>
-          </a:p>
-          <a:p>
-            <a:pPr marL="0" indent="0" algn="ctr">
-              <a:buNone/>
-            </a:pPr>
-            <a:r>
-              <a:rPr lang="it-IT" sz="4500" dirty="0" err="1"/>
-              <a:t>Thank</a:t>
-            </a:r>
-            <a:r>
-              <a:rPr lang="it-IT" sz="4500" dirty="0"/>
-              <a:t> </a:t>
-            </a:r>
-            <a:r>
-              <a:rPr lang="it-IT" sz="4500" dirty="0" err="1"/>
-              <a:t>you</a:t>
-            </a:r>
-            <a:r>
-              <a:rPr lang="it-IT" sz="4500" dirty="0"/>
-              <a:t> for </a:t>
-            </a:r>
-            <a:r>
-              <a:rPr lang="it-IT" sz="4500" dirty="0" err="1"/>
-              <a:t>attending</a:t>
-            </a:r>
-            <a:r>
-              <a:rPr lang="it-IT" sz="4500" dirty="0"/>
-              <a:t>!</a:t>
-            </a:r>
+            <a:r>
+              <a:rPr lang="en-US" dirty="0"/>
+              <a:t>code();</a:t>
+            </a:r>
+            <a:endParaRPr lang="it-IT" dirty="0"/>
           </a:p>
         </p:txBody>
       </p:sp>
       <p:sp>
         <p:nvSpPr>
-          <p:cNvPr id="2" name="Slide Number Placeholder 1"/>
+          <p:cNvPr id="6" name="Text Placeholder 5"/>
+          <p:cNvSpPr>
+            <a:spLocks noGrp="1"/>
+          </p:cNvSpPr>
+          <p:nvPr>
+            <p:ph type="body" idx="1"/>
+          </p:nvPr>
+        </p:nvSpPr>
+        <p:spPr/>
+        <p:txBody>
+          <a:bodyPr lIns="68580" tIns="34290" rIns="68580" bIns="34290"/>
+          <a:lstStyle/>
+          <a:p>
+            <a:endParaRPr lang="it-IT"/>
+          </a:p>
+        </p:txBody>
+      </p:sp>
+      <p:sp>
+        <p:nvSpPr>
+          <p:cNvPr id="4" name="Slide Number Placeholder 3"/>
           <p:cNvSpPr>
             <a:spLocks noGrp="1"/>
           </p:cNvSpPr>
@@ -23961,7 +24239,12 @@
             <p:ph type="sldNum" sz="quarter" idx="12"/>
           </p:nvPr>
         </p:nvSpPr>
-        <p:spPr/>
+        <p:spPr>
+          <a:xfrm>
+            <a:off x="6553200" y="4485912"/>
+            <a:ext cx="2133600" cy="274637"/>
+          </a:xfrm>
+        </p:spPr>
         <p:txBody>
           <a:bodyPr lIns="68580" tIns="34290" rIns="68580" bIns="34290"/>
           <a:lstStyle/>
@@ -23970,14 +24253,14 @@
               <a:rPr lang="it-IT" smtClean="0"/>
               <a:t>29</a:t>
             </a:fld>
-            <a:endParaRPr lang="it-IT"/>
+            <a:endParaRPr lang="it-IT" dirty="0"/>
           </a:p>
         </p:txBody>
       </p:sp>
     </p:spTree>
     <p:extLst>
       <p:ext uri="{BB962C8B-B14F-4D97-AF65-F5344CB8AC3E}">
-        <p14:creationId xmlns:p14="http://schemas.microsoft.com/office/powerpoint/2010/main" val="2864412103"/>
+        <p14:creationId xmlns:p14="http://schemas.microsoft.com/office/powerpoint/2010/main" val="1307489908"/>
       </p:ext>
     </p:extLst>
   </p:cSld>
@@ -24604,6 +24887,287 @@
 </p:sld>
 </file>
 
+<file path=ppt/slides/slide30.xml><?xml version="1.0" encoding="utf-8"?>
+<p:sld xmlns:a="http://schemas.openxmlformats.org/drawingml/2006/main" xmlns:r="http://schemas.openxmlformats.org/officeDocument/2006/relationships" xmlns:p="http://schemas.openxmlformats.org/presentationml/2006/main">
+  <p:cSld>
+    <p:spTree>
+      <p:nvGrpSpPr>
+        <p:cNvPr id="1" name=""/>
+        <p:cNvGrpSpPr/>
+        <p:nvPr/>
+      </p:nvGrpSpPr>
+      <p:grpSpPr>
+        <a:xfrm>
+          <a:off x="0" y="0"/>
+          <a:ext cx="0" cy="0"/>
+          <a:chOff x="0" y="0"/>
+          <a:chExt cx="0" cy="0"/>
+        </a:xfrm>
+      </p:grpSpPr>
+      <p:sp>
+        <p:nvSpPr>
+          <p:cNvPr id="4" name="Content Placeholder 3"/>
+          <p:cNvSpPr>
+            <a:spLocks noGrp="1"/>
+          </p:cNvSpPr>
+          <p:nvPr>
+            <p:ph idx="1"/>
+          </p:nvPr>
+        </p:nvSpPr>
+        <p:spPr>
+          <a:xfrm>
+            <a:off x="628650" y="503991"/>
+            <a:ext cx="7886700" cy="3562313"/>
+          </a:xfrm>
+        </p:spPr>
+        <p:txBody>
+          <a:bodyPr lIns="68580" tIns="34290" rIns="68580" bIns="34290">
+            <a:normAutofit fontScale="77500" lnSpcReduction="20000"/>
+          </a:bodyPr>
+          <a:lstStyle/>
+          <a:p>
+            <a:pPr marL="0" indent="0" algn="ctr">
+              <a:buNone/>
+            </a:pPr>
+            <a:r>
+              <a:rPr lang="it-IT" sz="4500" b="1" dirty="0" err="1"/>
+              <a:t>Questions</a:t>
+            </a:r>
+            <a:r>
+              <a:rPr lang="it-IT" sz="4500" b="1" dirty="0"/>
+              <a:t>?</a:t>
+            </a:r>
+          </a:p>
+          <a:p>
+            <a:pPr marL="0" indent="0" algn="ctr">
+              <a:buNone/>
+            </a:pPr>
+            <a:endParaRPr lang="it-IT" dirty="0">
+              <a:latin typeface="Consolas" panose="020B0609020204030204" pitchFamily="49" charset="0"/>
+              <a:cs typeface="Consolas" panose="020B0609020204030204" pitchFamily="49" charset="0"/>
+              <a:hlinkClick r:id=""/>
+            </a:endParaRPr>
+          </a:p>
+          <a:p>
+            <a:pPr marL="0" indent="0" algn="ctr">
+              <a:lnSpc>
+                <a:spcPct val="120000"/>
+              </a:lnSpc>
+              <a:buNone/>
+            </a:pPr>
+            <a:r>
+              <a:rPr lang="it-IT" dirty="0">
+                <a:latin typeface="Consolas" panose="020B0609020204030204" pitchFamily="49" charset="0"/>
+                <a:cs typeface="Consolas" panose="020B0609020204030204" pitchFamily="49" charset="0"/>
+                <a:hlinkClick r:id="rId3"/>
+              </a:rPr>
+              <a:t>http://</a:t>
+            </a:r>
+            <a:r>
+              <a:rPr lang="it-IT" b="1" dirty="0" smtClean="0">
+                <a:latin typeface="Consolas" panose="020B0609020204030204" pitchFamily="49" charset="0"/>
+                <a:cs typeface="Consolas" panose="020B0609020204030204" pitchFamily="49" charset="0"/>
+                <a:hlinkClick r:id="rId3"/>
+              </a:rPr>
+              <a:t>vittorioromeo.info</a:t>
+            </a:r>
+            <a:r>
+              <a:rPr lang="it-IT" dirty="0">
+                <a:latin typeface="Consolas" panose="020B0609020204030204" pitchFamily="49" charset="0"/>
+                <a:cs typeface="Consolas" panose="020B0609020204030204" pitchFamily="49" charset="0"/>
+              </a:rPr>
+              <a:t/>
+            </a:r>
+            <a:br>
+              <a:rPr lang="it-IT" dirty="0">
+                <a:latin typeface="Consolas" panose="020B0609020204030204" pitchFamily="49" charset="0"/>
+                <a:cs typeface="Consolas" panose="020B0609020204030204" pitchFamily="49" charset="0"/>
+              </a:rPr>
+            </a:br>
+            <a:r>
+              <a:rPr lang="it-IT" dirty="0">
+                <a:latin typeface="Consolas" panose="020B0609020204030204" pitchFamily="49" charset="0"/>
+                <a:cs typeface="Consolas" panose="020B0609020204030204" pitchFamily="49" charset="0"/>
+                <a:hlinkClick r:id="rId4"/>
+              </a:rPr>
+              <a:t>http://</a:t>
+            </a:r>
+            <a:r>
+              <a:rPr lang="it-IT" dirty="0" smtClean="0">
+                <a:latin typeface="Consolas" panose="020B0609020204030204" pitchFamily="49" charset="0"/>
+                <a:cs typeface="Consolas" panose="020B0609020204030204" pitchFamily="49" charset="0"/>
+                <a:hlinkClick r:id="rId4"/>
+              </a:rPr>
+              <a:t>github.com/</a:t>
+            </a:r>
+            <a:r>
+              <a:rPr lang="it-IT" b="1" dirty="0" smtClean="0">
+                <a:latin typeface="Consolas" panose="020B0609020204030204" pitchFamily="49" charset="0"/>
+                <a:cs typeface="Consolas" panose="020B0609020204030204" pitchFamily="49" charset="0"/>
+                <a:hlinkClick r:id="rId4"/>
+              </a:rPr>
+              <a:t>SuperV1234</a:t>
+            </a:r>
+            <a:r>
+              <a:rPr lang="it-IT" b="1" dirty="0" smtClean="0">
+                <a:latin typeface="Consolas" panose="020B0609020204030204" pitchFamily="49" charset="0"/>
+                <a:cs typeface="Consolas" panose="020B0609020204030204" pitchFamily="49" charset="0"/>
+              </a:rPr>
+              <a:t/>
+            </a:r>
+            <a:br>
+              <a:rPr lang="it-IT" b="1" dirty="0" smtClean="0">
+                <a:latin typeface="Consolas" panose="020B0609020204030204" pitchFamily="49" charset="0"/>
+                <a:cs typeface="Consolas" panose="020B0609020204030204" pitchFamily="49" charset="0"/>
+              </a:rPr>
+            </a:br>
+            <a:r>
+              <a:rPr lang="it-IT" dirty="0" smtClean="0">
+                <a:latin typeface="Consolas" panose="020B0609020204030204" pitchFamily="49" charset="0"/>
+                <a:cs typeface="Consolas" panose="020B0609020204030204" pitchFamily="49" charset="0"/>
+              </a:rPr>
+              <a:t/>
+            </a:r>
+            <a:br>
+              <a:rPr lang="it-IT" dirty="0" smtClean="0">
+                <a:latin typeface="Consolas" panose="020B0609020204030204" pitchFamily="49" charset="0"/>
+                <a:cs typeface="Consolas" panose="020B0609020204030204" pitchFamily="49" charset="0"/>
+              </a:rPr>
+            </a:br>
+            <a:r>
+              <a:rPr lang="it-IT" b="1" dirty="0" smtClean="0">
+                <a:latin typeface="Consolas" panose="020B0609020204030204" pitchFamily="49" charset="0"/>
+                <a:cs typeface="Consolas" panose="020B0609020204030204" pitchFamily="49" charset="0"/>
+                <a:hlinkClick r:id="rId5"/>
+              </a:rPr>
+              <a:t>vittorio.romeo</a:t>
+            </a:r>
+            <a:r>
+              <a:rPr lang="it-IT" dirty="0" smtClean="0">
+                <a:latin typeface="Consolas" panose="020B0609020204030204" pitchFamily="49" charset="0"/>
+                <a:cs typeface="Consolas" panose="020B0609020204030204" pitchFamily="49" charset="0"/>
+                <a:hlinkClick r:id="rId5"/>
+              </a:rPr>
+              <a:t>@outlook.com</a:t>
+            </a:r>
+            <a:r>
+              <a:rPr lang="it-IT" dirty="0">
+                <a:latin typeface="Consolas" panose="020B0609020204030204" pitchFamily="49" charset="0"/>
+                <a:cs typeface="Consolas" panose="020B0609020204030204" pitchFamily="49" charset="0"/>
+              </a:rPr>
+              <a:t/>
+            </a:r>
+            <a:br>
+              <a:rPr lang="it-IT" dirty="0">
+                <a:latin typeface="Consolas" panose="020B0609020204030204" pitchFamily="49" charset="0"/>
+                <a:cs typeface="Consolas" panose="020B0609020204030204" pitchFamily="49" charset="0"/>
+              </a:rPr>
+            </a:br>
+            <a:r>
+              <a:rPr lang="it-IT" b="1" dirty="0" smtClean="0">
+                <a:latin typeface="Consolas" panose="020B0609020204030204" pitchFamily="49" charset="0"/>
+                <a:cs typeface="Consolas" panose="020B0609020204030204" pitchFamily="49" charset="0"/>
+                <a:hlinkClick r:id="rId6"/>
+              </a:rPr>
+              <a:t>vromeo5</a:t>
+            </a:r>
+            <a:r>
+              <a:rPr lang="it-IT" dirty="0" smtClean="0">
+                <a:latin typeface="Consolas" panose="020B0609020204030204" pitchFamily="49" charset="0"/>
+                <a:cs typeface="Consolas" panose="020B0609020204030204" pitchFamily="49" charset="0"/>
+                <a:hlinkClick r:id="rId6"/>
+              </a:rPr>
+              <a:t>@bloomberg.net</a:t>
+            </a:r>
+            <a:r>
+              <a:rPr lang="it-IT" dirty="0">
+                <a:latin typeface="Consolas" panose="020B0609020204030204" pitchFamily="49" charset="0"/>
+                <a:cs typeface="Consolas" panose="020B0609020204030204" pitchFamily="49" charset="0"/>
+              </a:rPr>
+              <a:t/>
+            </a:r>
+            <a:br>
+              <a:rPr lang="it-IT" dirty="0">
+                <a:latin typeface="Consolas" panose="020B0609020204030204" pitchFamily="49" charset="0"/>
+                <a:cs typeface="Consolas" panose="020B0609020204030204" pitchFamily="49" charset="0"/>
+              </a:rPr>
+            </a:br>
+            <a:endParaRPr lang="it-IT" sz="4500" dirty="0"/>
+          </a:p>
+          <a:p>
+            <a:pPr marL="0" indent="0" algn="ctr">
+              <a:buNone/>
+            </a:pPr>
+            <a:r>
+              <a:rPr lang="it-IT" sz="4500" dirty="0" err="1"/>
+              <a:t>Thank</a:t>
+            </a:r>
+            <a:r>
+              <a:rPr lang="it-IT" sz="4500" dirty="0"/>
+              <a:t> </a:t>
+            </a:r>
+            <a:r>
+              <a:rPr lang="it-IT" sz="4500" dirty="0" err="1"/>
+              <a:t>you</a:t>
+            </a:r>
+            <a:r>
+              <a:rPr lang="it-IT" sz="4500" dirty="0"/>
+              <a:t> for </a:t>
+            </a:r>
+            <a:r>
+              <a:rPr lang="it-IT" sz="4500" dirty="0" err="1"/>
+              <a:t>attending</a:t>
+            </a:r>
+            <a:r>
+              <a:rPr lang="it-IT" sz="4500" dirty="0"/>
+              <a:t>!</a:t>
+            </a:r>
+          </a:p>
+        </p:txBody>
+      </p:sp>
+      <p:sp>
+        <p:nvSpPr>
+          <p:cNvPr id="2" name="Slide Number Placeholder 1"/>
+          <p:cNvSpPr>
+            <a:spLocks noGrp="1"/>
+          </p:cNvSpPr>
+          <p:nvPr>
+            <p:ph type="sldNum" sz="quarter" idx="12"/>
+          </p:nvPr>
+        </p:nvSpPr>
+        <p:spPr/>
+        <p:txBody>
+          <a:bodyPr lIns="68580" tIns="34290" rIns="68580" bIns="34290"/>
+          <a:lstStyle/>
+          <a:p>
+            <a:fld id="{DA00CEBC-9AC0-446C-9417-17B7E0F2B36C}" type="slidenum">
+              <a:rPr lang="it-IT" smtClean="0"/>
+              <a:t>30</a:t>
+            </a:fld>
+            <a:endParaRPr lang="it-IT"/>
+          </a:p>
+        </p:txBody>
+      </p:sp>
+    </p:spTree>
+    <p:extLst>
+      <p:ext uri="{BB962C8B-B14F-4D97-AF65-F5344CB8AC3E}">
+        <p14:creationId xmlns:p14="http://schemas.microsoft.com/office/powerpoint/2010/main" val="2864412103"/>
+      </p:ext>
+    </p:extLst>
+  </p:cSld>
+  <p:clrMapOvr>
+    <a:masterClrMapping/>
+  </p:clrMapOvr>
+  <p:timing>
+    <p:tnLst>
+      <p:par>
+        <p:cTn id="1" dur="indefinite" restart="never" nodeType="tmRoot"/>
+      </p:par>
+    </p:tnLst>
+  </p:timing>
+</p:sld>
+</file>
+
 <file path=ppt/slides/slide4.xml><?xml version="1.0" encoding="utf-8"?>
 <p:sld xmlns:a="http://schemas.openxmlformats.org/drawingml/2006/main" xmlns:r="http://schemas.openxmlformats.org/officeDocument/2006/relationships" xmlns:p="http://schemas.openxmlformats.org/presentationml/2006/main">
   <p:cSld>
@@ -25272,6 +25836,129 @@
               <a:rPr lang="it-IT" smtClean="0"/>
               <a:t>6</a:t>
             </a:fld>
+            <a:endParaRPr lang="it-IT"/>
+          </a:p>
+        </p:txBody>
+      </p:sp>
+      <p:sp>
+        <p:nvSpPr>
+          <p:cNvPr id="4" name="Rectangle 3"/>
+          <p:cNvSpPr/>
+          <p:nvPr/>
+        </p:nvSpPr>
+        <p:spPr>
+          <a:xfrm>
+            <a:off x="4208318" y="3870612"/>
+            <a:ext cx="62346" cy="290946"/>
+          </a:xfrm>
+          <a:prstGeom prst="rect">
+            <a:avLst/>
+          </a:prstGeom>
+          <a:ln>
+            <a:noFill/>
+          </a:ln>
+        </p:spPr>
+        <p:style>
+          <a:lnRef idx="2">
+            <a:schemeClr val="dk1"/>
+          </a:lnRef>
+          <a:fillRef idx="1">
+            <a:schemeClr val="lt1"/>
+          </a:fillRef>
+          <a:effectRef idx="0">
+            <a:schemeClr val="dk1"/>
+          </a:effectRef>
+          <a:fontRef idx="minor">
+            <a:schemeClr val="dk1"/>
+          </a:fontRef>
+        </p:style>
+        <p:txBody>
+          <a:bodyPr rtlCol="0" anchor="ctr"/>
+          <a:lstStyle/>
+          <a:p>
+            <a:pPr algn="ctr"/>
+            <a:endParaRPr lang="it-IT"/>
+          </a:p>
+        </p:txBody>
+      </p:sp>
+      <p:sp>
+        <p:nvSpPr>
+          <p:cNvPr id="8" name="Rectangle 7"/>
+          <p:cNvSpPr/>
+          <p:nvPr/>
+        </p:nvSpPr>
+        <p:spPr>
+          <a:xfrm>
+            <a:off x="4027684" y="4161558"/>
+            <a:ext cx="400575" cy="152400"/>
+          </a:xfrm>
+          <a:prstGeom prst="rect">
+            <a:avLst/>
+          </a:prstGeom>
+          <a:ln>
+            <a:noFill/>
+          </a:ln>
+        </p:spPr>
+        <p:style>
+          <a:lnRef idx="2">
+            <a:schemeClr val="dk1"/>
+          </a:lnRef>
+          <a:fillRef idx="1">
+            <a:schemeClr val="lt1"/>
+          </a:fillRef>
+          <a:effectRef idx="0">
+            <a:schemeClr val="dk1"/>
+          </a:effectRef>
+          <a:fontRef idx="minor">
+            <a:schemeClr val="dk1"/>
+          </a:fontRef>
+        </p:style>
+        <p:txBody>
+          <a:bodyPr rtlCol="0" anchor="ctr"/>
+          <a:lstStyle/>
+          <a:p>
+            <a:pPr algn="ctr"/>
+            <a:endParaRPr lang="it-IT"/>
+          </a:p>
+        </p:txBody>
+      </p:sp>
+      <p:sp>
+        <p:nvSpPr>
+          <p:cNvPr id="9" name="Rectangle 8"/>
+          <p:cNvSpPr/>
+          <p:nvPr/>
+        </p:nvSpPr>
+        <p:spPr>
+          <a:xfrm>
+            <a:off x="4098126" y="3013038"/>
+            <a:ext cx="197349" cy="45719"/>
+          </a:xfrm>
+          <a:prstGeom prst="rect">
+            <a:avLst/>
+          </a:prstGeom>
+          <a:ln>
+            <a:noFill/>
+          </a:ln>
+        </p:spPr>
+        <p:style>
+          <a:lnRef idx="2">
+            <a:schemeClr val="dk1"/>
+          </a:lnRef>
+          <a:fillRef idx="1">
+            <a:schemeClr val="lt1"/>
+          </a:fillRef>
+          <a:effectRef idx="0">
+            <a:schemeClr val="dk1"/>
+          </a:effectRef>
+          <a:fontRef idx="minor">
+            <a:schemeClr val="dk1"/>
+          </a:fontRef>
+        </p:style>
+        <p:txBody>
+          <a:bodyPr rtlCol="0" anchor="ctr"/>
+          <a:lstStyle/>
+          <a:p>
+            <a:pPr algn="ctr"/>
             <a:endParaRPr lang="it-IT"/>
           </a:p>
         </p:txBody>

</xml_diff>